<commit_message>
paper progressed with new content, including image, citations and texts.
</commit_message>
<xml_diff>
--- a/paper/images/graphics.pptx
+++ b/paper/images/graphics.pptx
@@ -5,7 +5,7 @@
     <p:sldMasterId id="2147483648" r:id="rId1"/>
   </p:sldMasterIdLst>
   <p:sldIdLst>
-    <p:sldId id="256" r:id="rId2"/>
+    <p:sldId id="257" r:id="rId2"/>
   </p:sldIdLst>
   <p:sldSz cx="12192000" cy="6858000"/>
   <p:notesSz cx="6858000" cy="9144000"/>
@@ -104,6 +104,11 @@
       </a:defRPr>
     </a:lvl9pPr>
   </p:defaultTextStyle>
+  <p:extLst>
+    <p:ext uri="{EFAFB233-063F-42B5-8137-9DF3F51BA10A}">
+      <p15:sldGuideLst xmlns:p15="http://schemas.microsoft.com/office/powerpoint/2012/main"/>
+    </p:ext>
+  </p:extLst>
 </p:presentation>
 </file>
 
@@ -254,7 +259,7 @@
           <a:p>
             <a:fld id="{9F92018D-9D2C-0947-ADF2-96E7FE53AC27}" type="datetimeFigureOut">
               <a:rPr lang="en-US" smtClean="0"/>
-              <a:t>1/16/25</a:t>
+              <a:t>1/25/25</a:t>
             </a:fld>
             <a:endParaRPr lang="en-US"/>
           </a:p>
@@ -452,7 +457,7 @@
           <a:p>
             <a:fld id="{9F92018D-9D2C-0947-ADF2-96E7FE53AC27}" type="datetimeFigureOut">
               <a:rPr lang="en-US" smtClean="0"/>
-              <a:t>1/16/25</a:t>
+              <a:t>1/25/25</a:t>
             </a:fld>
             <a:endParaRPr lang="en-US"/>
           </a:p>
@@ -660,7 +665,7 @@
           <a:p>
             <a:fld id="{9F92018D-9D2C-0947-ADF2-96E7FE53AC27}" type="datetimeFigureOut">
               <a:rPr lang="en-US" smtClean="0"/>
-              <a:t>1/16/25</a:t>
+              <a:t>1/25/25</a:t>
             </a:fld>
             <a:endParaRPr lang="en-US"/>
           </a:p>
@@ -858,7 +863,7 @@
           <a:p>
             <a:fld id="{9F92018D-9D2C-0947-ADF2-96E7FE53AC27}" type="datetimeFigureOut">
               <a:rPr lang="en-US" smtClean="0"/>
-              <a:t>1/16/25</a:t>
+              <a:t>1/25/25</a:t>
             </a:fld>
             <a:endParaRPr lang="en-US"/>
           </a:p>
@@ -1133,7 +1138,7 @@
           <a:p>
             <a:fld id="{9F92018D-9D2C-0947-ADF2-96E7FE53AC27}" type="datetimeFigureOut">
               <a:rPr lang="en-US" smtClean="0"/>
-              <a:t>1/16/25</a:t>
+              <a:t>1/25/25</a:t>
             </a:fld>
             <a:endParaRPr lang="en-US"/>
           </a:p>
@@ -1398,7 +1403,7 @@
           <a:p>
             <a:fld id="{9F92018D-9D2C-0947-ADF2-96E7FE53AC27}" type="datetimeFigureOut">
               <a:rPr lang="en-US" smtClean="0"/>
-              <a:t>1/16/25</a:t>
+              <a:t>1/25/25</a:t>
             </a:fld>
             <a:endParaRPr lang="en-US"/>
           </a:p>
@@ -1810,7 +1815,7 @@
           <a:p>
             <a:fld id="{9F92018D-9D2C-0947-ADF2-96E7FE53AC27}" type="datetimeFigureOut">
               <a:rPr lang="en-US" smtClean="0"/>
-              <a:t>1/16/25</a:t>
+              <a:t>1/25/25</a:t>
             </a:fld>
             <a:endParaRPr lang="en-US"/>
           </a:p>
@@ -1951,7 +1956,7 @@
           <a:p>
             <a:fld id="{9F92018D-9D2C-0947-ADF2-96E7FE53AC27}" type="datetimeFigureOut">
               <a:rPr lang="en-US" smtClean="0"/>
-              <a:t>1/16/25</a:t>
+              <a:t>1/25/25</a:t>
             </a:fld>
             <a:endParaRPr lang="en-US"/>
           </a:p>
@@ -2064,7 +2069,7 @@
           <a:p>
             <a:fld id="{9F92018D-9D2C-0947-ADF2-96E7FE53AC27}" type="datetimeFigureOut">
               <a:rPr lang="en-US" smtClean="0"/>
-              <a:t>1/16/25</a:t>
+              <a:t>1/25/25</a:t>
             </a:fld>
             <a:endParaRPr lang="en-US"/>
           </a:p>
@@ -2375,7 +2380,7 @@
           <a:p>
             <a:fld id="{9F92018D-9D2C-0947-ADF2-96E7FE53AC27}" type="datetimeFigureOut">
               <a:rPr lang="en-US" smtClean="0"/>
-              <a:t>1/16/25</a:t>
+              <a:t>1/25/25</a:t>
             </a:fld>
             <a:endParaRPr lang="en-US"/>
           </a:p>
@@ -2663,7 +2668,7 @@
           <a:p>
             <a:fld id="{9F92018D-9D2C-0947-ADF2-96E7FE53AC27}" type="datetimeFigureOut">
               <a:rPr lang="en-US" smtClean="0"/>
-              <a:t>1/16/25</a:t>
+              <a:t>1/25/25</a:t>
             </a:fld>
             <a:endParaRPr lang="en-US"/>
           </a:p>
@@ -2904,7 +2909,7 @@
           <a:p>
             <a:fld id="{9F92018D-9D2C-0947-ADF2-96E7FE53AC27}" type="datetimeFigureOut">
               <a:rPr lang="en-US" smtClean="0"/>
-              <a:t>1/16/25</a:t>
+              <a:t>1/25/25</a:t>
             </a:fld>
             <a:endParaRPr lang="en-US"/>
           </a:p>
@@ -3321,141 +3326,656 @@
           <a:chExt cx="0" cy="0"/>
         </a:xfrm>
       </p:grpSpPr>
-      <p:sp>
-        <p:nvSpPr>
-          <p:cNvPr id="4" name="Rectangle 3">
-            <a:extLst>
-              <a:ext uri="{FF2B5EF4-FFF2-40B4-BE49-F238E27FC236}">
-                <a16:creationId xmlns:a16="http://schemas.microsoft.com/office/drawing/2014/main" id="{B5A0D610-3E7B-80C1-2F20-1E4B3021B4FB}"/>
-              </a:ext>
-            </a:extLst>
-          </p:cNvPr>
-          <p:cNvSpPr/>
-          <p:nvPr/>
-        </p:nvSpPr>
-        <p:spPr>
-          <a:xfrm>
-            <a:off x="2137893" y="1390918"/>
-            <a:ext cx="2238778" cy="708338"/>
-          </a:xfrm>
-          <a:prstGeom prst="rect">
-            <a:avLst/>
-          </a:prstGeom>
+      <p:cxnSp>
+        <p:nvCxnSpPr>
+          <p:cNvPr id="57" name="Straight Arrow Connector 56">
+            <a:extLst>
+              <a:ext uri="{FF2B5EF4-FFF2-40B4-BE49-F238E27FC236}">
+                <a16:creationId xmlns:a16="http://schemas.microsoft.com/office/drawing/2014/main" id="{F02D544E-C7BE-559A-4CF3-818ACD8004FC}"/>
+              </a:ext>
+            </a:extLst>
+          </p:cNvPr>
+          <p:cNvCxnSpPr>
+            <a:cxnSpLocks/>
+          </p:cNvCxnSpPr>
+          <p:nvPr/>
+        </p:nvCxnSpPr>
+        <p:spPr>
+          <a:xfrm>
+            <a:off x="2795249" y="3072604"/>
+            <a:ext cx="0" cy="222483"/>
+          </a:xfrm>
+          <a:prstGeom prst="straightConnector1">
+            <a:avLst/>
+          </a:prstGeom>
+          <a:ln w="28575">
+            <a:tailEnd type="triangle"/>
+          </a:ln>
         </p:spPr>
         <p:style>
-          <a:lnRef idx="2">
-            <a:schemeClr val="accent1">
-              <a:shade val="50000"/>
-            </a:schemeClr>
+          <a:lnRef idx="1">
+            <a:schemeClr val="accent6"/>
           </a:lnRef>
-          <a:fillRef idx="1">
+          <a:fillRef idx="3">
+            <a:schemeClr val="accent6"/>
+          </a:fillRef>
+          <a:effectRef idx="2">
+            <a:schemeClr val="accent6"/>
+          </a:effectRef>
+          <a:fontRef idx="minor">
+            <a:schemeClr val="lt1"/>
+          </a:fontRef>
+        </p:style>
+      </p:cxnSp>
+      <p:cxnSp>
+        <p:nvCxnSpPr>
+          <p:cNvPr id="58" name="Straight Arrow Connector 57">
+            <a:extLst>
+              <a:ext uri="{FF2B5EF4-FFF2-40B4-BE49-F238E27FC236}">
+                <a16:creationId xmlns:a16="http://schemas.microsoft.com/office/drawing/2014/main" id="{8DCE7366-04BE-1E61-A9F3-26707C320A30}"/>
+              </a:ext>
+            </a:extLst>
+          </p:cNvPr>
+          <p:cNvCxnSpPr>
+            <a:cxnSpLocks/>
+          </p:cNvCxnSpPr>
+          <p:nvPr/>
+        </p:nvCxnSpPr>
+        <p:spPr>
+          <a:xfrm>
+            <a:off x="3451342" y="3072604"/>
+            <a:ext cx="0" cy="222483"/>
+          </a:xfrm>
+          <a:prstGeom prst="straightConnector1">
+            <a:avLst/>
+          </a:prstGeom>
+          <a:ln w="28575">
+            <a:tailEnd type="triangle"/>
+          </a:ln>
+        </p:spPr>
+        <p:style>
+          <a:lnRef idx="1">
+            <a:schemeClr val="accent6"/>
+          </a:lnRef>
+          <a:fillRef idx="3">
+            <a:schemeClr val="accent6"/>
+          </a:fillRef>
+          <a:effectRef idx="2">
+            <a:schemeClr val="accent6"/>
+          </a:effectRef>
+          <a:fontRef idx="minor">
+            <a:schemeClr val="lt1"/>
+          </a:fontRef>
+        </p:style>
+      </p:cxnSp>
+      <p:cxnSp>
+        <p:nvCxnSpPr>
+          <p:cNvPr id="59" name="Straight Arrow Connector 58">
+            <a:extLst>
+              <a:ext uri="{FF2B5EF4-FFF2-40B4-BE49-F238E27FC236}">
+                <a16:creationId xmlns:a16="http://schemas.microsoft.com/office/drawing/2014/main" id="{92A5EDE1-DC32-0464-F221-D673C9E513D3}"/>
+              </a:ext>
+            </a:extLst>
+          </p:cNvPr>
+          <p:cNvCxnSpPr>
+            <a:cxnSpLocks/>
+          </p:cNvCxnSpPr>
+          <p:nvPr/>
+        </p:nvCxnSpPr>
+        <p:spPr>
+          <a:xfrm>
+            <a:off x="4661577" y="3072604"/>
+            <a:ext cx="0" cy="222483"/>
+          </a:xfrm>
+          <a:prstGeom prst="straightConnector1">
+            <a:avLst/>
+          </a:prstGeom>
+          <a:ln w="28575">
+            <a:tailEnd type="triangle"/>
+          </a:ln>
+        </p:spPr>
+        <p:style>
+          <a:lnRef idx="1">
+            <a:schemeClr val="accent6"/>
+          </a:lnRef>
+          <a:fillRef idx="3">
+            <a:schemeClr val="accent6"/>
+          </a:fillRef>
+          <a:effectRef idx="2">
+            <a:schemeClr val="accent6"/>
+          </a:effectRef>
+          <a:fontRef idx="minor">
+            <a:schemeClr val="lt1"/>
+          </a:fontRef>
+        </p:style>
+      </p:cxnSp>
+      <p:cxnSp>
+        <p:nvCxnSpPr>
+          <p:cNvPr id="76" name="Straight Arrow Connector 75">
+            <a:extLst>
+              <a:ext uri="{FF2B5EF4-FFF2-40B4-BE49-F238E27FC236}">
+                <a16:creationId xmlns:a16="http://schemas.microsoft.com/office/drawing/2014/main" id="{293DE820-3945-6CD4-CD32-019ACA4CA600}"/>
+              </a:ext>
+            </a:extLst>
+          </p:cNvPr>
+          <p:cNvCxnSpPr>
+            <a:cxnSpLocks/>
+          </p:cNvCxnSpPr>
+          <p:nvPr/>
+        </p:nvCxnSpPr>
+        <p:spPr>
+          <a:xfrm>
+            <a:off x="7164661" y="3057479"/>
+            <a:ext cx="0" cy="411459"/>
+          </a:xfrm>
+          <a:prstGeom prst="straightConnector1">
+            <a:avLst/>
+          </a:prstGeom>
+          <a:ln w="28575">
+            <a:tailEnd type="triangle"/>
+          </a:ln>
+        </p:spPr>
+        <p:style>
+          <a:lnRef idx="1">
+            <a:schemeClr val="accent6"/>
+          </a:lnRef>
+          <a:fillRef idx="3">
+            <a:schemeClr val="accent6"/>
+          </a:fillRef>
+          <a:effectRef idx="2">
+            <a:schemeClr val="accent6"/>
+          </a:effectRef>
+          <a:fontRef idx="minor">
+            <a:schemeClr val="lt1"/>
+          </a:fontRef>
+        </p:style>
+      </p:cxnSp>
+      <p:cxnSp>
+        <p:nvCxnSpPr>
+          <p:cNvPr id="77" name="Straight Arrow Connector 76">
+            <a:extLst>
+              <a:ext uri="{FF2B5EF4-FFF2-40B4-BE49-F238E27FC236}">
+                <a16:creationId xmlns:a16="http://schemas.microsoft.com/office/drawing/2014/main" id="{BE198794-5B39-1C6A-2467-BECF104AF9C6}"/>
+              </a:ext>
+            </a:extLst>
+          </p:cNvPr>
+          <p:cNvCxnSpPr>
+            <a:cxnSpLocks/>
+          </p:cNvCxnSpPr>
+          <p:nvPr/>
+        </p:nvCxnSpPr>
+        <p:spPr>
+          <a:xfrm>
+            <a:off x="6613181" y="3057479"/>
+            <a:ext cx="0" cy="411459"/>
+          </a:xfrm>
+          <a:prstGeom prst="straightConnector1">
+            <a:avLst/>
+          </a:prstGeom>
+          <a:ln w="28575">
+            <a:tailEnd type="triangle"/>
+          </a:ln>
+        </p:spPr>
+        <p:style>
+          <a:lnRef idx="1">
+            <a:schemeClr val="accent6"/>
+          </a:lnRef>
+          <a:fillRef idx="3">
+            <a:schemeClr val="accent6"/>
+          </a:fillRef>
+          <a:effectRef idx="2">
+            <a:schemeClr val="accent6"/>
+          </a:effectRef>
+          <a:fontRef idx="minor">
+            <a:schemeClr val="lt1"/>
+          </a:fontRef>
+        </p:style>
+      </p:cxnSp>
+      <p:cxnSp>
+        <p:nvCxnSpPr>
+          <p:cNvPr id="78" name="Straight Arrow Connector 77">
+            <a:extLst>
+              <a:ext uri="{FF2B5EF4-FFF2-40B4-BE49-F238E27FC236}">
+                <a16:creationId xmlns:a16="http://schemas.microsoft.com/office/drawing/2014/main" id="{C97D3853-2BD1-56D8-E2FC-D5B70A789D4B}"/>
+              </a:ext>
+            </a:extLst>
+          </p:cNvPr>
+          <p:cNvCxnSpPr>
+            <a:cxnSpLocks/>
+          </p:cNvCxnSpPr>
+          <p:nvPr/>
+        </p:nvCxnSpPr>
+        <p:spPr>
+          <a:xfrm>
+            <a:off x="5960961" y="3057479"/>
+            <a:ext cx="0" cy="411459"/>
+          </a:xfrm>
+          <a:prstGeom prst="straightConnector1">
+            <a:avLst/>
+          </a:prstGeom>
+          <a:ln w="28575">
+            <a:tailEnd type="triangle"/>
+          </a:ln>
+        </p:spPr>
+        <p:style>
+          <a:lnRef idx="1">
+            <a:schemeClr val="accent6"/>
+          </a:lnRef>
+          <a:fillRef idx="3">
+            <a:schemeClr val="accent6"/>
+          </a:fillRef>
+          <a:effectRef idx="2">
+            <a:schemeClr val="accent6"/>
+          </a:effectRef>
+          <a:fontRef idx="minor">
+            <a:schemeClr val="lt1"/>
+          </a:fontRef>
+        </p:style>
+      </p:cxnSp>
+      <p:cxnSp>
+        <p:nvCxnSpPr>
+          <p:cNvPr id="42" name="Straight Arrow Connector 41">
+            <a:extLst>
+              <a:ext uri="{FF2B5EF4-FFF2-40B4-BE49-F238E27FC236}">
+                <a16:creationId xmlns:a16="http://schemas.microsoft.com/office/drawing/2014/main" id="{46D48EDC-2114-5EC9-2DCD-FF089F66D092}"/>
+              </a:ext>
+            </a:extLst>
+          </p:cNvPr>
+          <p:cNvCxnSpPr>
+            <a:cxnSpLocks/>
+          </p:cNvCxnSpPr>
+          <p:nvPr/>
+        </p:nvCxnSpPr>
+        <p:spPr>
+          <a:xfrm>
+            <a:off x="7164661" y="2291902"/>
+            <a:ext cx="0" cy="411459"/>
+          </a:xfrm>
+          <a:prstGeom prst="straightConnector1">
+            <a:avLst/>
+          </a:prstGeom>
+          <a:ln w="28575">
+            <a:tailEnd type="triangle"/>
+          </a:ln>
+        </p:spPr>
+        <p:style>
+          <a:lnRef idx="1">
+            <a:schemeClr val="accent6"/>
+          </a:lnRef>
+          <a:fillRef idx="3">
+            <a:schemeClr val="accent6"/>
+          </a:fillRef>
+          <a:effectRef idx="2">
+            <a:schemeClr val="accent6"/>
+          </a:effectRef>
+          <a:fontRef idx="minor">
+            <a:schemeClr val="lt1"/>
+          </a:fontRef>
+        </p:style>
+      </p:cxnSp>
+      <p:cxnSp>
+        <p:nvCxnSpPr>
+          <p:cNvPr id="41" name="Straight Arrow Connector 40">
+            <a:extLst>
+              <a:ext uri="{FF2B5EF4-FFF2-40B4-BE49-F238E27FC236}">
+                <a16:creationId xmlns:a16="http://schemas.microsoft.com/office/drawing/2014/main" id="{D4AD8E6B-EA2C-61F3-2356-8C825F0BAE60}"/>
+              </a:ext>
+            </a:extLst>
+          </p:cNvPr>
+          <p:cNvCxnSpPr>
+            <a:cxnSpLocks/>
+          </p:cNvCxnSpPr>
+          <p:nvPr/>
+        </p:nvCxnSpPr>
+        <p:spPr>
+          <a:xfrm>
+            <a:off x="6613181" y="2291902"/>
+            <a:ext cx="0" cy="411459"/>
+          </a:xfrm>
+          <a:prstGeom prst="straightConnector1">
+            <a:avLst/>
+          </a:prstGeom>
+          <a:ln w="28575">
+            <a:tailEnd type="triangle"/>
+          </a:ln>
+        </p:spPr>
+        <p:style>
+          <a:lnRef idx="1">
+            <a:schemeClr val="accent6"/>
+          </a:lnRef>
+          <a:fillRef idx="3">
+            <a:schemeClr val="accent6"/>
+          </a:fillRef>
+          <a:effectRef idx="2">
+            <a:schemeClr val="accent6"/>
+          </a:effectRef>
+          <a:fontRef idx="minor">
+            <a:schemeClr val="lt1"/>
+          </a:fontRef>
+        </p:style>
+      </p:cxnSp>
+      <p:cxnSp>
+        <p:nvCxnSpPr>
+          <p:cNvPr id="15" name="Straight Arrow Connector 14">
+            <a:extLst>
+              <a:ext uri="{FF2B5EF4-FFF2-40B4-BE49-F238E27FC236}">
+                <a16:creationId xmlns:a16="http://schemas.microsoft.com/office/drawing/2014/main" id="{3CEA4C46-BFFA-13FA-4C14-B6994A48B546}"/>
+              </a:ext>
+            </a:extLst>
+          </p:cNvPr>
+          <p:cNvCxnSpPr>
+            <a:cxnSpLocks/>
+          </p:cNvCxnSpPr>
+          <p:nvPr/>
+        </p:nvCxnSpPr>
+        <p:spPr>
+          <a:xfrm>
+            <a:off x="3645622" y="2283193"/>
+            <a:ext cx="278141" cy="0"/>
+          </a:xfrm>
+          <a:prstGeom prst="straightConnector1">
+            <a:avLst/>
+          </a:prstGeom>
+          <a:ln w="28575">
+            <a:tailEnd type="triangle"/>
+          </a:ln>
+        </p:spPr>
+        <p:style>
+          <a:lnRef idx="1">
+            <a:schemeClr val="accent1"/>
+          </a:lnRef>
+          <a:fillRef idx="0">
             <a:schemeClr val="accent1"/>
           </a:fillRef>
           <a:effectRef idx="0">
             <a:schemeClr val="accent1"/>
           </a:effectRef>
           <a:fontRef idx="minor">
-            <a:schemeClr val="lt1"/>
+            <a:schemeClr val="tx1"/>
           </a:fontRef>
         </p:style>
-        <p:txBody>
-          <a:bodyPr rtlCol="0" anchor="ctr"/>
-          <a:lstStyle/>
-          <a:p>
-            <a:pPr algn="ctr"/>
-            <a:r>
-              <a:rPr lang="en-US" dirty="0"/>
-              <a:t>1. Saving States</a:t>
-            </a:r>
-          </a:p>
-        </p:txBody>
-      </p:sp>
-      <p:sp>
-        <p:nvSpPr>
-          <p:cNvPr id="5" name="Rectangle 4">
-            <a:extLst>
-              <a:ext uri="{FF2B5EF4-FFF2-40B4-BE49-F238E27FC236}">
-                <a16:creationId xmlns:a16="http://schemas.microsoft.com/office/drawing/2014/main" id="{A479FDD0-FB16-C0D7-AAFD-4620B28DD006}"/>
-              </a:ext>
-            </a:extLst>
-          </p:cNvPr>
-          <p:cNvSpPr/>
-          <p:nvPr/>
-        </p:nvSpPr>
-        <p:spPr>
-          <a:xfrm>
-            <a:off x="4976611" y="1390918"/>
-            <a:ext cx="2238778" cy="708338"/>
-          </a:xfrm>
-          <a:prstGeom prst="rect">
-            <a:avLst/>
-          </a:prstGeom>
+      </p:cxnSp>
+      <p:cxnSp>
+        <p:nvCxnSpPr>
+          <p:cNvPr id="14" name="Straight Arrow Connector 13">
+            <a:extLst>
+              <a:ext uri="{FF2B5EF4-FFF2-40B4-BE49-F238E27FC236}">
+                <a16:creationId xmlns:a16="http://schemas.microsoft.com/office/drawing/2014/main" id="{F6F13B1F-40E3-1F94-F857-EB700329ECE9}"/>
+              </a:ext>
+            </a:extLst>
+          </p:cNvPr>
+          <p:cNvCxnSpPr>
+            <a:cxnSpLocks/>
+          </p:cNvCxnSpPr>
+          <p:nvPr/>
+        </p:nvCxnSpPr>
+        <p:spPr>
+          <a:xfrm>
+            <a:off x="2991093" y="2283193"/>
+            <a:ext cx="278141" cy="0"/>
+          </a:xfrm>
+          <a:prstGeom prst="straightConnector1">
+            <a:avLst/>
+          </a:prstGeom>
+          <a:ln w="28575">
+            <a:tailEnd type="triangle"/>
+          </a:ln>
         </p:spPr>
         <p:style>
-          <a:lnRef idx="2">
-            <a:schemeClr val="accent1">
-              <a:shade val="50000"/>
-            </a:schemeClr>
+          <a:lnRef idx="1">
+            <a:schemeClr val="accent1"/>
           </a:lnRef>
-          <a:fillRef idx="1">
+          <a:fillRef idx="0">
             <a:schemeClr val="accent1"/>
           </a:fillRef>
           <a:effectRef idx="0">
             <a:schemeClr val="accent1"/>
           </a:effectRef>
           <a:fontRef idx="minor">
-            <a:schemeClr val="lt1"/>
+            <a:schemeClr val="tx1"/>
           </a:fontRef>
         </p:style>
-        <p:txBody>
-          <a:bodyPr rtlCol="0" anchor="ctr"/>
-          <a:lstStyle/>
-          <a:p>
-            <a:pPr algn="ctr"/>
-            <a:r>
-              <a:rPr lang="en-US" dirty="0"/>
-              <a:t>2. Saving Deltas</a:t>
-            </a:r>
-          </a:p>
-        </p:txBody>
-      </p:sp>
-      <p:sp>
-        <p:nvSpPr>
-          <p:cNvPr id="6" name="Rectangle 5">
-            <a:extLst>
-              <a:ext uri="{FF2B5EF4-FFF2-40B4-BE49-F238E27FC236}">
-                <a16:creationId xmlns:a16="http://schemas.microsoft.com/office/drawing/2014/main" id="{6B1FCF57-BA6D-A86F-F7B6-B2DCC9245DBB}"/>
-              </a:ext>
-            </a:extLst>
-          </p:cNvPr>
-          <p:cNvSpPr/>
-          <p:nvPr/>
-        </p:nvSpPr>
-        <p:spPr>
-          <a:xfrm>
-            <a:off x="7815329" y="1390918"/>
-            <a:ext cx="2238778" cy="708338"/>
-          </a:xfrm>
-          <a:prstGeom prst="rect">
-            <a:avLst/>
-          </a:prstGeom>
+      </p:cxnSp>
+      <p:cxnSp>
+        <p:nvCxnSpPr>
+          <p:cNvPr id="17" name="Straight Arrow Connector 16">
+            <a:extLst>
+              <a:ext uri="{FF2B5EF4-FFF2-40B4-BE49-F238E27FC236}">
+                <a16:creationId xmlns:a16="http://schemas.microsoft.com/office/drawing/2014/main" id="{5DC10F9D-D3FD-DBF1-488B-ED8C276960BD}"/>
+              </a:ext>
+            </a:extLst>
+          </p:cNvPr>
+          <p:cNvCxnSpPr>
+            <a:cxnSpLocks/>
+          </p:cNvCxnSpPr>
+          <p:nvPr/>
+        </p:nvCxnSpPr>
+        <p:spPr>
+          <a:xfrm>
+            <a:off x="4191632" y="2283193"/>
+            <a:ext cx="278141" cy="0"/>
+          </a:xfrm>
+          <a:prstGeom prst="straightConnector1">
+            <a:avLst/>
+          </a:prstGeom>
+          <a:ln w="28575">
+            <a:tailEnd type="triangle"/>
+          </a:ln>
         </p:spPr>
         <p:style>
-          <a:lnRef idx="2">
-            <a:schemeClr val="accent1">
-              <a:shade val="50000"/>
-            </a:schemeClr>
+          <a:lnRef idx="1">
+            <a:schemeClr val="accent1"/>
           </a:lnRef>
-          <a:fillRef idx="1">
+          <a:fillRef idx="0">
             <a:schemeClr val="accent1"/>
           </a:fillRef>
           <a:effectRef idx="0">
             <a:schemeClr val="accent1"/>
           </a:effectRef>
           <a:fontRef idx="minor">
+            <a:schemeClr val="tx1"/>
+          </a:fontRef>
+        </p:style>
+      </p:cxnSp>
+      <p:cxnSp>
+        <p:nvCxnSpPr>
+          <p:cNvPr id="36" name="Straight Arrow Connector 35">
+            <a:extLst>
+              <a:ext uri="{FF2B5EF4-FFF2-40B4-BE49-F238E27FC236}">
+                <a16:creationId xmlns:a16="http://schemas.microsoft.com/office/drawing/2014/main" id="{72A24830-4516-1E42-9A62-B8AAFE0B375E}"/>
+              </a:ext>
+            </a:extLst>
+          </p:cNvPr>
+          <p:cNvCxnSpPr>
+            <a:cxnSpLocks/>
+          </p:cNvCxnSpPr>
+          <p:nvPr/>
+        </p:nvCxnSpPr>
+        <p:spPr>
+          <a:xfrm>
+            <a:off x="5960961" y="2291902"/>
+            <a:ext cx="0" cy="411459"/>
+          </a:xfrm>
+          <a:prstGeom prst="straightConnector1">
+            <a:avLst/>
+          </a:prstGeom>
+          <a:ln w="28575">
+            <a:tailEnd type="triangle"/>
+          </a:ln>
+        </p:spPr>
+        <p:style>
+          <a:lnRef idx="1">
+            <a:schemeClr val="accent6"/>
+          </a:lnRef>
+          <a:fillRef idx="3">
+            <a:schemeClr val="accent6"/>
+          </a:fillRef>
+          <a:effectRef idx="2">
+            <a:schemeClr val="accent6"/>
+          </a:effectRef>
+          <a:fontRef idx="minor">
             <a:schemeClr val="lt1"/>
           </a:fontRef>
         </p:style>
+      </p:cxnSp>
+      <p:cxnSp>
+        <p:nvCxnSpPr>
+          <p:cNvPr id="30" name="Straight Arrow Connector 29">
+            <a:extLst>
+              <a:ext uri="{FF2B5EF4-FFF2-40B4-BE49-F238E27FC236}">
+                <a16:creationId xmlns:a16="http://schemas.microsoft.com/office/drawing/2014/main" id="{90E581D1-9A06-1F5A-3B97-3B8384D03557}"/>
+              </a:ext>
+            </a:extLst>
+          </p:cNvPr>
+          <p:cNvCxnSpPr>
+            <a:cxnSpLocks/>
+          </p:cNvCxnSpPr>
+          <p:nvPr/>
+        </p:nvCxnSpPr>
+        <p:spPr>
+          <a:xfrm>
+            <a:off x="5829811" y="2283193"/>
+            <a:ext cx="278141" cy="0"/>
+          </a:xfrm>
+          <a:prstGeom prst="straightConnector1">
+            <a:avLst/>
+          </a:prstGeom>
+          <a:ln w="28575">
+            <a:tailEnd type="triangle"/>
+          </a:ln>
+        </p:spPr>
+        <p:style>
+          <a:lnRef idx="1">
+            <a:schemeClr val="accent1"/>
+          </a:lnRef>
+          <a:fillRef idx="0">
+            <a:schemeClr val="accent1"/>
+          </a:fillRef>
+          <a:effectRef idx="0">
+            <a:schemeClr val="accent1"/>
+          </a:effectRef>
+          <a:fontRef idx="minor">
+            <a:schemeClr val="tx1"/>
+          </a:fontRef>
+        </p:style>
+      </p:cxnSp>
+      <p:cxnSp>
+        <p:nvCxnSpPr>
+          <p:cNvPr id="31" name="Straight Arrow Connector 30">
+            <a:extLst>
+              <a:ext uri="{FF2B5EF4-FFF2-40B4-BE49-F238E27FC236}">
+                <a16:creationId xmlns:a16="http://schemas.microsoft.com/office/drawing/2014/main" id="{CCA24714-633F-AC02-DF49-821415AAF5EB}"/>
+              </a:ext>
+            </a:extLst>
+          </p:cNvPr>
+          <p:cNvCxnSpPr>
+            <a:cxnSpLocks/>
+          </p:cNvCxnSpPr>
+          <p:nvPr/>
+        </p:nvCxnSpPr>
+        <p:spPr>
+          <a:xfrm>
+            <a:off x="6484340" y="2283193"/>
+            <a:ext cx="278141" cy="0"/>
+          </a:xfrm>
+          <a:prstGeom prst="straightConnector1">
+            <a:avLst/>
+          </a:prstGeom>
+          <a:ln w="28575">
+            <a:tailEnd type="triangle"/>
+          </a:ln>
+        </p:spPr>
+        <p:style>
+          <a:lnRef idx="1">
+            <a:schemeClr val="accent1"/>
+          </a:lnRef>
+          <a:fillRef idx="0">
+            <a:schemeClr val="accent1"/>
+          </a:fillRef>
+          <a:effectRef idx="0">
+            <a:schemeClr val="accent1"/>
+          </a:effectRef>
+          <a:fontRef idx="minor">
+            <a:schemeClr val="tx1"/>
+          </a:fontRef>
+        </p:style>
+      </p:cxnSp>
+      <p:cxnSp>
+        <p:nvCxnSpPr>
+          <p:cNvPr id="32" name="Straight Arrow Connector 31">
+            <a:extLst>
+              <a:ext uri="{FF2B5EF4-FFF2-40B4-BE49-F238E27FC236}">
+                <a16:creationId xmlns:a16="http://schemas.microsoft.com/office/drawing/2014/main" id="{61218A1D-C3CC-567C-2C50-2445C1D43FFA}"/>
+              </a:ext>
+            </a:extLst>
+          </p:cNvPr>
+          <p:cNvCxnSpPr>
+            <a:cxnSpLocks/>
+          </p:cNvCxnSpPr>
+          <p:nvPr/>
+        </p:nvCxnSpPr>
+        <p:spPr>
+          <a:xfrm>
+            <a:off x="7030350" y="2283193"/>
+            <a:ext cx="278141" cy="0"/>
+          </a:xfrm>
+          <a:prstGeom prst="straightConnector1">
+            <a:avLst/>
+          </a:prstGeom>
+          <a:ln w="28575">
+            <a:tailEnd type="triangle"/>
+          </a:ln>
+        </p:spPr>
+        <p:style>
+          <a:lnRef idx="1">
+            <a:schemeClr val="accent1"/>
+          </a:lnRef>
+          <a:fillRef idx="0">
+            <a:schemeClr val="accent1"/>
+          </a:fillRef>
+          <a:effectRef idx="0">
+            <a:schemeClr val="accent1"/>
+          </a:effectRef>
+          <a:fontRef idx="minor">
+            <a:schemeClr val="tx1"/>
+          </a:fontRef>
+        </p:style>
+      </p:cxnSp>
+      <p:sp>
+        <p:nvSpPr>
+          <p:cNvPr id="4" name="Rectangle 3">
+            <a:extLst>
+              <a:ext uri="{FF2B5EF4-FFF2-40B4-BE49-F238E27FC236}">
+                <a16:creationId xmlns:a16="http://schemas.microsoft.com/office/drawing/2014/main" id="{B5A0D610-3E7B-80C1-2F20-1E4B3021B4FB}"/>
+              </a:ext>
+            </a:extLst>
+          </p:cNvPr>
+          <p:cNvSpPr/>
+          <p:nvPr/>
+        </p:nvSpPr>
+        <p:spPr>
+          <a:xfrm>
+            <a:off x="2606272" y="865974"/>
+            <a:ext cx="2238778" cy="708338"/>
+          </a:xfrm>
+          <a:prstGeom prst="rect">
+            <a:avLst/>
+          </a:prstGeom>
+        </p:spPr>
+        <p:style>
+          <a:lnRef idx="1">
+            <a:schemeClr val="accent3"/>
+          </a:lnRef>
+          <a:fillRef idx="2">
+            <a:schemeClr val="accent3"/>
+          </a:fillRef>
+          <a:effectRef idx="1">
+            <a:schemeClr val="accent3"/>
+          </a:effectRef>
+          <a:fontRef idx="minor">
+            <a:schemeClr val="dk1"/>
+          </a:fontRef>
+        </p:style>
         <p:txBody>
           <a:bodyPr rtlCol="0" anchor="ctr"/>
           <a:lstStyle/>
@@ -3463,7 +3983,101 @@
             <a:pPr algn="ctr"/>
             <a:r>
               <a:rPr lang="en-US" dirty="0"/>
-              <a:t>3. Saving Initial State</a:t>
+              <a:t>Saving Snapshots</a:t>
+            </a:r>
+          </a:p>
+        </p:txBody>
+      </p:sp>
+      <p:sp>
+        <p:nvSpPr>
+          <p:cNvPr id="5" name="Rectangle 4">
+            <a:extLst>
+              <a:ext uri="{FF2B5EF4-FFF2-40B4-BE49-F238E27FC236}">
+                <a16:creationId xmlns:a16="http://schemas.microsoft.com/office/drawing/2014/main" id="{A479FDD0-FB16-C0D7-AAFD-4620B28DD006}"/>
+              </a:ext>
+            </a:extLst>
+          </p:cNvPr>
+          <p:cNvSpPr/>
+          <p:nvPr/>
+        </p:nvSpPr>
+        <p:spPr>
+          <a:xfrm>
+            <a:off x="5447664" y="865974"/>
+            <a:ext cx="2238778" cy="708338"/>
+          </a:xfrm>
+          <a:prstGeom prst="rect">
+            <a:avLst/>
+          </a:prstGeom>
+        </p:spPr>
+        <p:style>
+          <a:lnRef idx="1">
+            <a:schemeClr val="accent3"/>
+          </a:lnRef>
+          <a:fillRef idx="2">
+            <a:schemeClr val="accent3"/>
+          </a:fillRef>
+          <a:effectRef idx="1">
+            <a:schemeClr val="accent3"/>
+          </a:effectRef>
+          <a:fontRef idx="minor">
+            <a:schemeClr val="dk1"/>
+          </a:fontRef>
+        </p:style>
+        <p:txBody>
+          <a:bodyPr rtlCol="0" anchor="ctr"/>
+          <a:lstStyle/>
+          <a:p>
+            <a:pPr algn="ctr"/>
+            <a:r>
+              <a:rPr lang="en-US" dirty="0"/>
+              <a:t>Delta Encoding</a:t>
+            </a:r>
+          </a:p>
+        </p:txBody>
+      </p:sp>
+      <p:sp>
+        <p:nvSpPr>
+          <p:cNvPr id="6" name="Rectangle 5">
+            <a:extLst>
+              <a:ext uri="{FF2B5EF4-FFF2-40B4-BE49-F238E27FC236}">
+                <a16:creationId xmlns:a16="http://schemas.microsoft.com/office/drawing/2014/main" id="{6B1FCF57-BA6D-A86F-F7B6-B2DCC9245DBB}"/>
+              </a:ext>
+            </a:extLst>
+          </p:cNvPr>
+          <p:cNvSpPr/>
+          <p:nvPr/>
+        </p:nvSpPr>
+        <p:spPr>
+          <a:xfrm>
+            <a:off x="8289055" y="865974"/>
+            <a:ext cx="2236105" cy="708338"/>
+          </a:xfrm>
+          <a:prstGeom prst="rect">
+            <a:avLst/>
+          </a:prstGeom>
+        </p:spPr>
+        <p:style>
+          <a:lnRef idx="1">
+            <a:schemeClr val="accent3"/>
+          </a:lnRef>
+          <a:fillRef idx="2">
+            <a:schemeClr val="accent3"/>
+          </a:fillRef>
+          <a:effectRef idx="1">
+            <a:schemeClr val="accent3"/>
+          </a:effectRef>
+          <a:fontRef idx="minor">
+            <a:schemeClr val="dk1"/>
+          </a:fontRef>
+        </p:style>
+        <p:txBody>
+          <a:bodyPr rtlCol="0" anchor="ctr"/>
+          <a:lstStyle/>
+          <a:p>
+            <a:pPr algn="ctr"/>
+            <a:r>
+              <a:rPr lang="en-US" dirty="0"/>
+              <a:t>Rerunning</a:t>
             </a:r>
           </a:p>
         </p:txBody>
@@ -3482,7 +4096,7 @@
         </p:nvSpPr>
         <p:spPr>
           <a:xfrm>
-            <a:off x="721217" y="2498501"/>
+            <a:off x="1227963" y="4503418"/>
             <a:ext cx="895502" cy="369332"/>
           </a:xfrm>
           <a:prstGeom prst="rect">
@@ -3496,6 +4110,7 @@
           </a:bodyPr>
           <a:lstStyle/>
           <a:p>
+            <a:pPr algn="ctr"/>
             <a:r>
               <a:rPr lang="en-US" dirty="0"/>
               <a:t>Storage</a:t>
@@ -3517,12 +4132,12 @@
         </p:nvSpPr>
         <p:spPr>
           <a:xfrm>
-            <a:off x="2137893" y="2382592"/>
-            <a:ext cx="7916214" cy="601151"/>
+            <a:off x="2606272" y="4291535"/>
+            <a:ext cx="7918888" cy="601151"/>
           </a:xfrm>
           <a:prstGeom prst="triangle">
             <a:avLst>
-              <a:gd name="adj" fmla="val 100000"/>
+              <a:gd name="adj" fmla="val 0"/>
             </a:avLst>
           </a:prstGeom>
           <a:gradFill>
@@ -3582,8 +4197,8 @@
         </p:nvSpPr>
         <p:spPr>
           <a:xfrm>
-            <a:off x="642078" y="1560421"/>
-            <a:ext cx="1089850" cy="369332"/>
+            <a:off x="1065103" y="896977"/>
+            <a:ext cx="1184427" cy="646331"/>
           </a:xfrm>
           <a:prstGeom prst="rect">
             <a:avLst/>
@@ -3596,6 +4211,14 @@
           </a:bodyPr>
           <a:lstStyle/>
           <a:p>
+            <a:pPr algn="ctr"/>
+            <a:r>
+              <a:rPr lang="en-US" dirty="0"/>
+              <a:t>Simulation</a:t>
+            </a:r>
+          </a:p>
+          <a:p>
+            <a:pPr algn="ctr"/>
             <a:r>
               <a:rPr lang="en-US" dirty="0"/>
               <a:t>Approach</a:t>
@@ -3617,8 +4240,8 @@
         </p:nvSpPr>
         <p:spPr>
           <a:xfrm>
-            <a:off x="804526" y="3436581"/>
-            <a:ext cx="764953" cy="369332"/>
+            <a:off x="1311272" y="5441498"/>
+            <a:ext cx="649537" cy="369332"/>
           </a:xfrm>
           <a:prstGeom prst="rect">
             <a:avLst/>
@@ -3631,9 +4254,10 @@
           </a:bodyPr>
           <a:lstStyle/>
           <a:p>
+            <a:pPr algn="ctr"/>
             <a:r>
               <a:rPr lang="en-US" dirty="0"/>
-              <a:t>Speed</a:t>
+              <a:t>Time</a:t>
             </a:r>
           </a:p>
         </p:txBody>
@@ -3652,12 +4276,12 @@
         </p:nvSpPr>
         <p:spPr>
           <a:xfrm>
-            <a:off x="2137893" y="3320671"/>
-            <a:ext cx="7916214" cy="601151"/>
+            <a:off x="2606272" y="5228634"/>
+            <a:ext cx="7918888" cy="601151"/>
           </a:xfrm>
           <a:prstGeom prst="triangle">
             <a:avLst>
-              <a:gd name="adj" fmla="val 0"/>
+              <a:gd name="adj" fmla="val 100000"/>
             </a:avLst>
           </a:prstGeom>
           <a:gradFill flip="none" rotWithShape="1">
@@ -3704,10 +4328,1989 @@
           </a:p>
         </p:txBody>
       </p:sp>
+      <p:sp>
+        <p:nvSpPr>
+          <p:cNvPr id="2" name="Rectangle 1">
+            <a:extLst>
+              <a:ext uri="{FF2B5EF4-FFF2-40B4-BE49-F238E27FC236}">
+                <a16:creationId xmlns:a16="http://schemas.microsoft.com/office/drawing/2014/main" id="{89D7481D-B3E3-9718-2959-2D5C42E7E99A}"/>
+              </a:ext>
+            </a:extLst>
+          </p:cNvPr>
+          <p:cNvSpPr/>
+          <p:nvPr/>
+        </p:nvSpPr>
+        <p:spPr>
+          <a:xfrm>
+            <a:off x="2608947" y="2094217"/>
+            <a:ext cx="377952" cy="377952"/>
+          </a:xfrm>
+          <a:prstGeom prst="rect">
+            <a:avLst/>
+          </a:prstGeom>
+        </p:spPr>
+        <p:style>
+          <a:lnRef idx="2">
+            <a:schemeClr val="accent1">
+              <a:shade val="50000"/>
+            </a:schemeClr>
+          </a:lnRef>
+          <a:fillRef idx="1">
+            <a:schemeClr val="accent1"/>
+          </a:fillRef>
+          <a:effectRef idx="0">
+            <a:schemeClr val="accent1"/>
+          </a:effectRef>
+          <a:fontRef idx="minor">
+            <a:schemeClr val="lt1"/>
+          </a:fontRef>
+        </p:style>
+        <p:txBody>
+          <a:bodyPr rtlCol="0" anchor="ctr"/>
+          <a:lstStyle/>
+          <a:p>
+            <a:pPr algn="ctr"/>
+            <a:r>
+              <a:rPr lang="en-US" dirty="0"/>
+              <a:t>0</a:t>
+            </a:r>
+          </a:p>
+        </p:txBody>
+      </p:sp>
+      <p:sp>
+        <p:nvSpPr>
+          <p:cNvPr id="3" name="Rectangle 2">
+            <a:extLst>
+              <a:ext uri="{FF2B5EF4-FFF2-40B4-BE49-F238E27FC236}">
+                <a16:creationId xmlns:a16="http://schemas.microsoft.com/office/drawing/2014/main" id="{223547DC-F298-B642-08D0-921EBA2224E8}"/>
+              </a:ext>
+            </a:extLst>
+          </p:cNvPr>
+          <p:cNvSpPr/>
+          <p:nvPr/>
+        </p:nvSpPr>
+        <p:spPr>
+          <a:xfrm>
+            <a:off x="3265040" y="2094217"/>
+            <a:ext cx="377952" cy="377952"/>
+          </a:xfrm>
+          <a:prstGeom prst="rect">
+            <a:avLst/>
+          </a:prstGeom>
+        </p:spPr>
+        <p:style>
+          <a:lnRef idx="2">
+            <a:schemeClr val="accent1">
+              <a:shade val="50000"/>
+            </a:schemeClr>
+          </a:lnRef>
+          <a:fillRef idx="1">
+            <a:schemeClr val="accent1"/>
+          </a:fillRef>
+          <a:effectRef idx="0">
+            <a:schemeClr val="accent1"/>
+          </a:effectRef>
+          <a:fontRef idx="minor">
+            <a:schemeClr val="lt1"/>
+          </a:fontRef>
+        </p:style>
+        <p:txBody>
+          <a:bodyPr rtlCol="0" anchor="ctr"/>
+          <a:lstStyle/>
+          <a:p>
+            <a:pPr algn="ctr"/>
+            <a:r>
+              <a:rPr lang="en-US" dirty="0"/>
+              <a:t>1</a:t>
+            </a:r>
+          </a:p>
+        </p:txBody>
+      </p:sp>
+      <p:sp>
+        <p:nvSpPr>
+          <p:cNvPr id="12" name="Rectangle 11">
+            <a:extLst>
+              <a:ext uri="{FF2B5EF4-FFF2-40B4-BE49-F238E27FC236}">
+                <a16:creationId xmlns:a16="http://schemas.microsoft.com/office/drawing/2014/main" id="{522ABC38-F38F-2520-1522-D83D95F0F2B3}"/>
+              </a:ext>
+            </a:extLst>
+          </p:cNvPr>
+          <p:cNvSpPr/>
+          <p:nvPr/>
+        </p:nvSpPr>
+        <p:spPr>
+          <a:xfrm>
+            <a:off x="4469773" y="2094217"/>
+            <a:ext cx="377952" cy="377952"/>
+          </a:xfrm>
+          <a:prstGeom prst="rect">
+            <a:avLst/>
+          </a:prstGeom>
+        </p:spPr>
+        <p:style>
+          <a:lnRef idx="2">
+            <a:schemeClr val="accent1">
+              <a:shade val="50000"/>
+            </a:schemeClr>
+          </a:lnRef>
+          <a:fillRef idx="1">
+            <a:schemeClr val="accent1"/>
+          </a:fillRef>
+          <a:effectRef idx="0">
+            <a:schemeClr val="accent1"/>
+          </a:effectRef>
+          <a:fontRef idx="minor">
+            <a:schemeClr val="lt1"/>
+          </a:fontRef>
+        </p:style>
+        <p:txBody>
+          <a:bodyPr rtlCol="0" anchor="ctr"/>
+          <a:lstStyle/>
+          <a:p>
+            <a:pPr algn="ctr"/>
+            <a:r>
+              <a:rPr lang="en-US" dirty="0"/>
+              <a:t>n</a:t>
+            </a:r>
+          </a:p>
+        </p:txBody>
+      </p:sp>
+      <p:sp>
+        <p:nvSpPr>
+          <p:cNvPr id="18" name="TextBox 17">
+            <a:extLst>
+              <a:ext uri="{FF2B5EF4-FFF2-40B4-BE49-F238E27FC236}">
+                <a16:creationId xmlns:a16="http://schemas.microsoft.com/office/drawing/2014/main" id="{E2177DAA-E58D-F034-73E7-219960DA638C}"/>
+              </a:ext>
+            </a:extLst>
+          </p:cNvPr>
+          <p:cNvSpPr txBox="1"/>
+          <p:nvPr/>
+        </p:nvSpPr>
+        <p:spPr>
+          <a:xfrm>
+            <a:off x="3895871" y="2035532"/>
+            <a:ext cx="343364" cy="369332"/>
+          </a:xfrm>
+          <a:prstGeom prst="rect">
+            <a:avLst/>
+          </a:prstGeom>
+          <a:noFill/>
+        </p:spPr>
+        <p:txBody>
+          <a:bodyPr wrap="none" rtlCol="0">
+            <a:spAutoFit/>
+          </a:bodyPr>
+          <a:lstStyle/>
+          <a:p>
+            <a:r>
+              <a:rPr lang="en-US" dirty="0"/>
+              <a:t>…</a:t>
+            </a:r>
+          </a:p>
+        </p:txBody>
+      </p:sp>
+      <p:sp>
+        <p:nvSpPr>
+          <p:cNvPr id="19" name="Rectangle 18">
+            <a:extLst>
+              <a:ext uri="{FF2B5EF4-FFF2-40B4-BE49-F238E27FC236}">
+                <a16:creationId xmlns:a16="http://schemas.microsoft.com/office/drawing/2014/main" id="{23DCACCF-18AF-C37E-6844-10E34E9215D4}"/>
+              </a:ext>
+            </a:extLst>
+          </p:cNvPr>
+          <p:cNvSpPr/>
+          <p:nvPr/>
+        </p:nvSpPr>
+        <p:spPr>
+          <a:xfrm>
+            <a:off x="2608947" y="2698846"/>
+            <a:ext cx="2238778" cy="377952"/>
+          </a:xfrm>
+          <a:prstGeom prst="rect">
+            <a:avLst/>
+          </a:prstGeom>
+        </p:spPr>
+        <p:style>
+          <a:lnRef idx="1">
+            <a:schemeClr val="accent6"/>
+          </a:lnRef>
+          <a:fillRef idx="3">
+            <a:schemeClr val="accent6"/>
+          </a:fillRef>
+          <a:effectRef idx="2">
+            <a:schemeClr val="accent6"/>
+          </a:effectRef>
+          <a:fontRef idx="minor">
+            <a:schemeClr val="lt1"/>
+          </a:fontRef>
+        </p:style>
+        <p:txBody>
+          <a:bodyPr rtlCol="0" anchor="ctr"/>
+          <a:lstStyle/>
+          <a:p>
+            <a:pPr algn="ctr"/>
+            <a:r>
+              <a:rPr lang="en-US" dirty="0"/>
+              <a:t>Storage</a:t>
+            </a:r>
+          </a:p>
+        </p:txBody>
+      </p:sp>
+      <p:cxnSp>
+        <p:nvCxnSpPr>
+          <p:cNvPr id="20" name="Straight Arrow Connector 19">
+            <a:extLst>
+              <a:ext uri="{FF2B5EF4-FFF2-40B4-BE49-F238E27FC236}">
+                <a16:creationId xmlns:a16="http://schemas.microsoft.com/office/drawing/2014/main" id="{A330D8CF-B97B-69B9-0E7B-E76BEEE5F863}"/>
+              </a:ext>
+            </a:extLst>
+          </p:cNvPr>
+          <p:cNvCxnSpPr>
+            <a:cxnSpLocks/>
+          </p:cNvCxnSpPr>
+          <p:nvPr/>
+        </p:nvCxnSpPr>
+        <p:spPr>
+          <a:xfrm>
+            <a:off x="2797923" y="2476363"/>
+            <a:ext cx="0" cy="222483"/>
+          </a:xfrm>
+          <a:prstGeom prst="straightConnector1">
+            <a:avLst/>
+          </a:prstGeom>
+          <a:ln w="28575">
+            <a:tailEnd type="triangle"/>
+          </a:ln>
+        </p:spPr>
+        <p:style>
+          <a:lnRef idx="1">
+            <a:schemeClr val="accent6"/>
+          </a:lnRef>
+          <a:fillRef idx="3">
+            <a:schemeClr val="accent6"/>
+          </a:fillRef>
+          <a:effectRef idx="2">
+            <a:schemeClr val="accent6"/>
+          </a:effectRef>
+          <a:fontRef idx="minor">
+            <a:schemeClr val="lt1"/>
+          </a:fontRef>
+        </p:style>
+      </p:cxnSp>
+      <p:cxnSp>
+        <p:nvCxnSpPr>
+          <p:cNvPr id="23" name="Straight Arrow Connector 22">
+            <a:extLst>
+              <a:ext uri="{FF2B5EF4-FFF2-40B4-BE49-F238E27FC236}">
+                <a16:creationId xmlns:a16="http://schemas.microsoft.com/office/drawing/2014/main" id="{FF3EDD6F-BCA8-FA7F-C1A0-84B2CD5F6991}"/>
+              </a:ext>
+            </a:extLst>
+          </p:cNvPr>
+          <p:cNvCxnSpPr>
+            <a:cxnSpLocks/>
+          </p:cNvCxnSpPr>
+          <p:nvPr/>
+        </p:nvCxnSpPr>
+        <p:spPr>
+          <a:xfrm>
+            <a:off x="3454016" y="2476363"/>
+            <a:ext cx="0" cy="222483"/>
+          </a:xfrm>
+          <a:prstGeom prst="straightConnector1">
+            <a:avLst/>
+          </a:prstGeom>
+          <a:ln w="28575">
+            <a:tailEnd type="triangle"/>
+          </a:ln>
+        </p:spPr>
+        <p:style>
+          <a:lnRef idx="1">
+            <a:schemeClr val="accent6"/>
+          </a:lnRef>
+          <a:fillRef idx="3">
+            <a:schemeClr val="accent6"/>
+          </a:fillRef>
+          <a:effectRef idx="2">
+            <a:schemeClr val="accent6"/>
+          </a:effectRef>
+          <a:fontRef idx="minor">
+            <a:schemeClr val="lt1"/>
+          </a:fontRef>
+        </p:style>
+      </p:cxnSp>
+      <p:cxnSp>
+        <p:nvCxnSpPr>
+          <p:cNvPr id="26" name="Straight Arrow Connector 25">
+            <a:extLst>
+              <a:ext uri="{FF2B5EF4-FFF2-40B4-BE49-F238E27FC236}">
+                <a16:creationId xmlns:a16="http://schemas.microsoft.com/office/drawing/2014/main" id="{27CB45D6-B4CA-C37E-4E5D-9748A6AB510D}"/>
+              </a:ext>
+            </a:extLst>
+          </p:cNvPr>
+          <p:cNvCxnSpPr>
+            <a:cxnSpLocks/>
+          </p:cNvCxnSpPr>
+          <p:nvPr/>
+        </p:nvCxnSpPr>
+        <p:spPr>
+          <a:xfrm>
+            <a:off x="4664251" y="2476363"/>
+            <a:ext cx="0" cy="222483"/>
+          </a:xfrm>
+          <a:prstGeom prst="straightConnector1">
+            <a:avLst/>
+          </a:prstGeom>
+          <a:ln w="28575">
+            <a:tailEnd type="triangle"/>
+          </a:ln>
+        </p:spPr>
+        <p:style>
+          <a:lnRef idx="1">
+            <a:schemeClr val="accent6"/>
+          </a:lnRef>
+          <a:fillRef idx="3">
+            <a:schemeClr val="accent6"/>
+          </a:fillRef>
+          <a:effectRef idx="2">
+            <a:schemeClr val="accent6"/>
+          </a:effectRef>
+          <a:fontRef idx="minor">
+            <a:schemeClr val="lt1"/>
+          </a:fontRef>
+        </p:style>
+      </p:cxnSp>
+      <p:sp>
+        <p:nvSpPr>
+          <p:cNvPr id="27" name="Rectangle 26">
+            <a:extLst>
+              <a:ext uri="{FF2B5EF4-FFF2-40B4-BE49-F238E27FC236}">
+                <a16:creationId xmlns:a16="http://schemas.microsoft.com/office/drawing/2014/main" id="{5EBB1C67-FC22-0A4D-F5DD-6C564B30FBF2}"/>
+              </a:ext>
+            </a:extLst>
+          </p:cNvPr>
+          <p:cNvSpPr/>
+          <p:nvPr/>
+        </p:nvSpPr>
+        <p:spPr>
+          <a:xfrm>
+            <a:off x="5447665" y="2094217"/>
+            <a:ext cx="377952" cy="377952"/>
+          </a:xfrm>
+          <a:prstGeom prst="rect">
+            <a:avLst/>
+          </a:prstGeom>
+        </p:spPr>
+        <p:style>
+          <a:lnRef idx="2">
+            <a:schemeClr val="accent1">
+              <a:shade val="50000"/>
+            </a:schemeClr>
+          </a:lnRef>
+          <a:fillRef idx="1">
+            <a:schemeClr val="accent1"/>
+          </a:fillRef>
+          <a:effectRef idx="0">
+            <a:schemeClr val="accent1"/>
+          </a:effectRef>
+          <a:fontRef idx="minor">
+            <a:schemeClr val="lt1"/>
+          </a:fontRef>
+        </p:style>
+        <p:txBody>
+          <a:bodyPr rtlCol="0" anchor="ctr"/>
+          <a:lstStyle/>
+          <a:p>
+            <a:pPr algn="ctr"/>
+            <a:r>
+              <a:rPr lang="en-US" dirty="0"/>
+              <a:t>0</a:t>
+            </a:r>
+          </a:p>
+        </p:txBody>
+      </p:sp>
+      <p:sp>
+        <p:nvSpPr>
+          <p:cNvPr id="28" name="Rectangle 27">
+            <a:extLst>
+              <a:ext uri="{FF2B5EF4-FFF2-40B4-BE49-F238E27FC236}">
+                <a16:creationId xmlns:a16="http://schemas.microsoft.com/office/drawing/2014/main" id="{C5892092-095C-AEC7-2100-ECEEB802B710}"/>
+              </a:ext>
+            </a:extLst>
+          </p:cNvPr>
+          <p:cNvSpPr/>
+          <p:nvPr/>
+        </p:nvSpPr>
+        <p:spPr>
+          <a:xfrm>
+            <a:off x="6103758" y="2094217"/>
+            <a:ext cx="377952" cy="377952"/>
+          </a:xfrm>
+          <a:prstGeom prst="rect">
+            <a:avLst/>
+          </a:prstGeom>
+        </p:spPr>
+        <p:style>
+          <a:lnRef idx="2">
+            <a:schemeClr val="accent1">
+              <a:shade val="50000"/>
+            </a:schemeClr>
+          </a:lnRef>
+          <a:fillRef idx="1">
+            <a:schemeClr val="accent1"/>
+          </a:fillRef>
+          <a:effectRef idx="0">
+            <a:schemeClr val="accent1"/>
+          </a:effectRef>
+          <a:fontRef idx="minor">
+            <a:schemeClr val="lt1"/>
+          </a:fontRef>
+        </p:style>
+        <p:txBody>
+          <a:bodyPr rtlCol="0" anchor="ctr"/>
+          <a:lstStyle/>
+          <a:p>
+            <a:pPr algn="ctr"/>
+            <a:r>
+              <a:rPr lang="en-US" dirty="0"/>
+              <a:t>1</a:t>
+            </a:r>
+          </a:p>
+        </p:txBody>
+      </p:sp>
+      <p:sp>
+        <p:nvSpPr>
+          <p:cNvPr id="29" name="Rectangle 28">
+            <a:extLst>
+              <a:ext uri="{FF2B5EF4-FFF2-40B4-BE49-F238E27FC236}">
+                <a16:creationId xmlns:a16="http://schemas.microsoft.com/office/drawing/2014/main" id="{93C1E4BD-3D6E-6A0A-9F6F-4C1022DB5070}"/>
+              </a:ext>
+            </a:extLst>
+          </p:cNvPr>
+          <p:cNvSpPr/>
+          <p:nvPr/>
+        </p:nvSpPr>
+        <p:spPr>
+          <a:xfrm>
+            <a:off x="7308491" y="2094217"/>
+            <a:ext cx="377952" cy="377952"/>
+          </a:xfrm>
+          <a:prstGeom prst="rect">
+            <a:avLst/>
+          </a:prstGeom>
+        </p:spPr>
+        <p:style>
+          <a:lnRef idx="2">
+            <a:schemeClr val="accent1">
+              <a:shade val="50000"/>
+            </a:schemeClr>
+          </a:lnRef>
+          <a:fillRef idx="1">
+            <a:schemeClr val="accent1"/>
+          </a:fillRef>
+          <a:effectRef idx="0">
+            <a:schemeClr val="accent1"/>
+          </a:effectRef>
+          <a:fontRef idx="minor">
+            <a:schemeClr val="lt1"/>
+          </a:fontRef>
+        </p:style>
+        <p:txBody>
+          <a:bodyPr rtlCol="0" anchor="ctr"/>
+          <a:lstStyle/>
+          <a:p>
+            <a:pPr algn="ctr"/>
+            <a:r>
+              <a:rPr lang="en-US" dirty="0"/>
+              <a:t>n</a:t>
+            </a:r>
+          </a:p>
+        </p:txBody>
+      </p:sp>
+      <p:sp>
+        <p:nvSpPr>
+          <p:cNvPr id="33" name="TextBox 32">
+            <a:extLst>
+              <a:ext uri="{FF2B5EF4-FFF2-40B4-BE49-F238E27FC236}">
+                <a16:creationId xmlns:a16="http://schemas.microsoft.com/office/drawing/2014/main" id="{90DCD4C4-4745-3A5D-5D92-0091F704A0F8}"/>
+              </a:ext>
+            </a:extLst>
+          </p:cNvPr>
+          <p:cNvSpPr txBox="1"/>
+          <p:nvPr/>
+        </p:nvSpPr>
+        <p:spPr>
+          <a:xfrm>
+            <a:off x="6734589" y="2035532"/>
+            <a:ext cx="343364" cy="369332"/>
+          </a:xfrm>
+          <a:prstGeom prst="rect">
+            <a:avLst/>
+          </a:prstGeom>
+          <a:noFill/>
+        </p:spPr>
+        <p:txBody>
+          <a:bodyPr wrap="none" rtlCol="0">
+            <a:spAutoFit/>
+          </a:bodyPr>
+          <a:lstStyle/>
+          <a:p>
+            <a:r>
+              <a:rPr lang="en-US" dirty="0"/>
+              <a:t>…</a:t>
+            </a:r>
+          </a:p>
+        </p:txBody>
+      </p:sp>
+      <p:sp>
+        <p:nvSpPr>
+          <p:cNvPr id="34" name="Rectangle 33">
+            <a:extLst>
+              <a:ext uri="{FF2B5EF4-FFF2-40B4-BE49-F238E27FC236}">
+                <a16:creationId xmlns:a16="http://schemas.microsoft.com/office/drawing/2014/main" id="{79CC0938-D6EC-A699-AF73-1BD3C8517201}"/>
+              </a:ext>
+            </a:extLst>
+          </p:cNvPr>
+          <p:cNvSpPr/>
+          <p:nvPr/>
+        </p:nvSpPr>
+        <p:spPr>
+          <a:xfrm>
+            <a:off x="5447665" y="2698846"/>
+            <a:ext cx="2238778" cy="377952"/>
+          </a:xfrm>
+          <a:prstGeom prst="rect">
+            <a:avLst/>
+          </a:prstGeom>
+        </p:spPr>
+        <p:style>
+          <a:lnRef idx="1">
+            <a:schemeClr val="accent6"/>
+          </a:lnRef>
+          <a:fillRef idx="3">
+            <a:schemeClr val="accent6"/>
+          </a:fillRef>
+          <a:effectRef idx="2">
+            <a:schemeClr val="accent6"/>
+          </a:effectRef>
+          <a:fontRef idx="minor">
+            <a:schemeClr val="lt1"/>
+          </a:fontRef>
+        </p:style>
+        <p:txBody>
+          <a:bodyPr rtlCol="0" anchor="ctr"/>
+          <a:lstStyle/>
+          <a:p>
+            <a:pPr algn="ctr"/>
+            <a:r>
+              <a:rPr lang="en-US" dirty="0"/>
+              <a:t>Storage</a:t>
+            </a:r>
+          </a:p>
+        </p:txBody>
+      </p:sp>
+      <p:cxnSp>
+        <p:nvCxnSpPr>
+          <p:cNvPr id="35" name="Straight Arrow Connector 34">
+            <a:extLst>
+              <a:ext uri="{FF2B5EF4-FFF2-40B4-BE49-F238E27FC236}">
+                <a16:creationId xmlns:a16="http://schemas.microsoft.com/office/drawing/2014/main" id="{335D0B3A-2E63-221E-EFB0-0456BC527B7B}"/>
+              </a:ext>
+            </a:extLst>
+          </p:cNvPr>
+          <p:cNvCxnSpPr>
+            <a:cxnSpLocks/>
+          </p:cNvCxnSpPr>
+          <p:nvPr/>
+        </p:nvCxnSpPr>
+        <p:spPr>
+          <a:xfrm>
+            <a:off x="5636641" y="2476363"/>
+            <a:ext cx="0" cy="222483"/>
+          </a:xfrm>
+          <a:prstGeom prst="straightConnector1">
+            <a:avLst/>
+          </a:prstGeom>
+          <a:ln w="28575">
+            <a:tailEnd type="triangle"/>
+          </a:ln>
+        </p:spPr>
+        <p:style>
+          <a:lnRef idx="1">
+            <a:schemeClr val="accent6"/>
+          </a:lnRef>
+          <a:fillRef idx="3">
+            <a:schemeClr val="accent6"/>
+          </a:fillRef>
+          <a:effectRef idx="2">
+            <a:schemeClr val="accent6"/>
+          </a:effectRef>
+          <a:fontRef idx="minor">
+            <a:schemeClr val="lt1"/>
+          </a:fontRef>
+        </p:style>
+      </p:cxnSp>
+      <p:cxnSp>
+        <p:nvCxnSpPr>
+          <p:cNvPr id="46" name="Straight Arrow Connector 45">
+            <a:extLst>
+              <a:ext uri="{FF2B5EF4-FFF2-40B4-BE49-F238E27FC236}">
+                <a16:creationId xmlns:a16="http://schemas.microsoft.com/office/drawing/2014/main" id="{5EF76C3F-3E8A-832A-1136-E5C83F905616}"/>
+              </a:ext>
+            </a:extLst>
+          </p:cNvPr>
+          <p:cNvCxnSpPr>
+            <a:cxnSpLocks/>
+          </p:cNvCxnSpPr>
+          <p:nvPr/>
+        </p:nvCxnSpPr>
+        <p:spPr>
+          <a:xfrm>
+            <a:off x="8671491" y="2278999"/>
+            <a:ext cx="278141" cy="0"/>
+          </a:xfrm>
+          <a:prstGeom prst="straightConnector1">
+            <a:avLst/>
+          </a:prstGeom>
+          <a:ln w="28575">
+            <a:tailEnd type="triangle"/>
+          </a:ln>
+        </p:spPr>
+        <p:style>
+          <a:lnRef idx="1">
+            <a:schemeClr val="accent1"/>
+          </a:lnRef>
+          <a:fillRef idx="0">
+            <a:schemeClr val="accent1"/>
+          </a:fillRef>
+          <a:effectRef idx="0">
+            <a:schemeClr val="accent1"/>
+          </a:effectRef>
+          <a:fontRef idx="minor">
+            <a:schemeClr val="tx1"/>
+          </a:fontRef>
+        </p:style>
+      </p:cxnSp>
+      <p:cxnSp>
+        <p:nvCxnSpPr>
+          <p:cNvPr id="47" name="Straight Arrow Connector 46">
+            <a:extLst>
+              <a:ext uri="{FF2B5EF4-FFF2-40B4-BE49-F238E27FC236}">
+                <a16:creationId xmlns:a16="http://schemas.microsoft.com/office/drawing/2014/main" id="{A2D1EF4D-430B-3BCA-4E5A-0F1EABF25318}"/>
+              </a:ext>
+            </a:extLst>
+          </p:cNvPr>
+          <p:cNvCxnSpPr>
+            <a:cxnSpLocks/>
+          </p:cNvCxnSpPr>
+          <p:nvPr/>
+        </p:nvCxnSpPr>
+        <p:spPr>
+          <a:xfrm>
+            <a:off x="9326020" y="2278999"/>
+            <a:ext cx="278141" cy="0"/>
+          </a:xfrm>
+          <a:prstGeom prst="straightConnector1">
+            <a:avLst/>
+          </a:prstGeom>
+          <a:ln w="28575">
+            <a:tailEnd type="triangle"/>
+          </a:ln>
+        </p:spPr>
+        <p:style>
+          <a:lnRef idx="1">
+            <a:schemeClr val="accent1"/>
+          </a:lnRef>
+          <a:fillRef idx="0">
+            <a:schemeClr val="accent1"/>
+          </a:fillRef>
+          <a:effectRef idx="0">
+            <a:schemeClr val="accent1"/>
+          </a:effectRef>
+          <a:fontRef idx="minor">
+            <a:schemeClr val="tx1"/>
+          </a:fontRef>
+        </p:style>
+      </p:cxnSp>
+      <p:cxnSp>
+        <p:nvCxnSpPr>
+          <p:cNvPr id="48" name="Straight Arrow Connector 47">
+            <a:extLst>
+              <a:ext uri="{FF2B5EF4-FFF2-40B4-BE49-F238E27FC236}">
+                <a16:creationId xmlns:a16="http://schemas.microsoft.com/office/drawing/2014/main" id="{43DF6BFA-673A-5261-E8FB-141FD8266CDB}"/>
+              </a:ext>
+            </a:extLst>
+          </p:cNvPr>
+          <p:cNvCxnSpPr>
+            <a:cxnSpLocks/>
+          </p:cNvCxnSpPr>
+          <p:nvPr/>
+        </p:nvCxnSpPr>
+        <p:spPr>
+          <a:xfrm>
+            <a:off x="9872030" y="2278999"/>
+            <a:ext cx="278141" cy="0"/>
+          </a:xfrm>
+          <a:prstGeom prst="straightConnector1">
+            <a:avLst/>
+          </a:prstGeom>
+          <a:ln w="28575">
+            <a:tailEnd type="triangle"/>
+          </a:ln>
+        </p:spPr>
+        <p:style>
+          <a:lnRef idx="1">
+            <a:schemeClr val="accent1"/>
+          </a:lnRef>
+          <a:fillRef idx="0">
+            <a:schemeClr val="accent1"/>
+          </a:fillRef>
+          <a:effectRef idx="0">
+            <a:schemeClr val="accent1"/>
+          </a:effectRef>
+          <a:fontRef idx="minor">
+            <a:schemeClr val="tx1"/>
+          </a:fontRef>
+        </p:style>
+      </p:cxnSp>
+      <p:sp>
+        <p:nvSpPr>
+          <p:cNvPr id="49" name="Rectangle 48">
+            <a:extLst>
+              <a:ext uri="{FF2B5EF4-FFF2-40B4-BE49-F238E27FC236}">
+                <a16:creationId xmlns:a16="http://schemas.microsoft.com/office/drawing/2014/main" id="{DDE229EA-059F-0DBB-FBA2-6BB3127244D3}"/>
+              </a:ext>
+            </a:extLst>
+          </p:cNvPr>
+          <p:cNvSpPr/>
+          <p:nvPr/>
+        </p:nvSpPr>
+        <p:spPr>
+          <a:xfrm>
+            <a:off x="8289345" y="2090023"/>
+            <a:ext cx="377952" cy="377952"/>
+          </a:xfrm>
+          <a:prstGeom prst="rect">
+            <a:avLst/>
+          </a:prstGeom>
+        </p:spPr>
+        <p:style>
+          <a:lnRef idx="2">
+            <a:schemeClr val="accent1">
+              <a:shade val="50000"/>
+            </a:schemeClr>
+          </a:lnRef>
+          <a:fillRef idx="1">
+            <a:schemeClr val="accent1"/>
+          </a:fillRef>
+          <a:effectRef idx="0">
+            <a:schemeClr val="accent1"/>
+          </a:effectRef>
+          <a:fontRef idx="minor">
+            <a:schemeClr val="lt1"/>
+          </a:fontRef>
+        </p:style>
+        <p:txBody>
+          <a:bodyPr rtlCol="0" anchor="ctr"/>
+          <a:lstStyle/>
+          <a:p>
+            <a:pPr algn="ctr"/>
+            <a:r>
+              <a:rPr lang="en-US" dirty="0"/>
+              <a:t>0</a:t>
+            </a:r>
+          </a:p>
+        </p:txBody>
+      </p:sp>
+      <p:sp>
+        <p:nvSpPr>
+          <p:cNvPr id="50" name="Rectangle 49">
+            <a:extLst>
+              <a:ext uri="{FF2B5EF4-FFF2-40B4-BE49-F238E27FC236}">
+                <a16:creationId xmlns:a16="http://schemas.microsoft.com/office/drawing/2014/main" id="{6051D66A-089B-28F7-9EAF-87467CB43785}"/>
+              </a:ext>
+            </a:extLst>
+          </p:cNvPr>
+          <p:cNvSpPr/>
+          <p:nvPr/>
+        </p:nvSpPr>
+        <p:spPr>
+          <a:xfrm>
+            <a:off x="8945438" y="2090023"/>
+            <a:ext cx="377952" cy="377952"/>
+          </a:xfrm>
+          <a:prstGeom prst="rect">
+            <a:avLst/>
+          </a:prstGeom>
+        </p:spPr>
+        <p:style>
+          <a:lnRef idx="2">
+            <a:schemeClr val="accent1">
+              <a:shade val="50000"/>
+            </a:schemeClr>
+          </a:lnRef>
+          <a:fillRef idx="1">
+            <a:schemeClr val="accent1"/>
+          </a:fillRef>
+          <a:effectRef idx="0">
+            <a:schemeClr val="accent1"/>
+          </a:effectRef>
+          <a:fontRef idx="minor">
+            <a:schemeClr val="lt1"/>
+          </a:fontRef>
+        </p:style>
+        <p:txBody>
+          <a:bodyPr rtlCol="0" anchor="ctr"/>
+          <a:lstStyle/>
+          <a:p>
+            <a:pPr algn="ctr"/>
+            <a:r>
+              <a:rPr lang="en-US" dirty="0"/>
+              <a:t>1</a:t>
+            </a:r>
+          </a:p>
+        </p:txBody>
+      </p:sp>
+      <p:sp>
+        <p:nvSpPr>
+          <p:cNvPr id="51" name="Rectangle 50">
+            <a:extLst>
+              <a:ext uri="{FF2B5EF4-FFF2-40B4-BE49-F238E27FC236}">
+                <a16:creationId xmlns:a16="http://schemas.microsoft.com/office/drawing/2014/main" id="{9112FADA-E2BA-F14D-7259-5D8380C595E0}"/>
+              </a:ext>
+            </a:extLst>
+          </p:cNvPr>
+          <p:cNvSpPr/>
+          <p:nvPr/>
+        </p:nvSpPr>
+        <p:spPr>
+          <a:xfrm>
+            <a:off x="10150171" y="2090023"/>
+            <a:ext cx="377952" cy="377952"/>
+          </a:xfrm>
+          <a:prstGeom prst="rect">
+            <a:avLst/>
+          </a:prstGeom>
+        </p:spPr>
+        <p:style>
+          <a:lnRef idx="2">
+            <a:schemeClr val="accent1">
+              <a:shade val="50000"/>
+            </a:schemeClr>
+          </a:lnRef>
+          <a:fillRef idx="1">
+            <a:schemeClr val="accent1"/>
+          </a:fillRef>
+          <a:effectRef idx="0">
+            <a:schemeClr val="accent1"/>
+          </a:effectRef>
+          <a:fontRef idx="minor">
+            <a:schemeClr val="lt1"/>
+          </a:fontRef>
+        </p:style>
+        <p:txBody>
+          <a:bodyPr rtlCol="0" anchor="ctr"/>
+          <a:lstStyle/>
+          <a:p>
+            <a:pPr algn="ctr"/>
+            <a:r>
+              <a:rPr lang="en-US" dirty="0"/>
+              <a:t>n</a:t>
+            </a:r>
+          </a:p>
+        </p:txBody>
+      </p:sp>
+      <p:sp>
+        <p:nvSpPr>
+          <p:cNvPr id="52" name="TextBox 51">
+            <a:extLst>
+              <a:ext uri="{FF2B5EF4-FFF2-40B4-BE49-F238E27FC236}">
+                <a16:creationId xmlns:a16="http://schemas.microsoft.com/office/drawing/2014/main" id="{146B8083-456E-2EA2-7B43-13B0312F8E58}"/>
+              </a:ext>
+            </a:extLst>
+          </p:cNvPr>
+          <p:cNvSpPr txBox="1"/>
+          <p:nvPr/>
+        </p:nvSpPr>
+        <p:spPr>
+          <a:xfrm>
+            <a:off x="9576269" y="2031338"/>
+            <a:ext cx="343364" cy="369332"/>
+          </a:xfrm>
+          <a:prstGeom prst="rect">
+            <a:avLst/>
+          </a:prstGeom>
+          <a:noFill/>
+        </p:spPr>
+        <p:txBody>
+          <a:bodyPr wrap="none" rtlCol="0">
+            <a:spAutoFit/>
+          </a:bodyPr>
+          <a:lstStyle/>
+          <a:p>
+            <a:r>
+              <a:rPr lang="en-US" dirty="0"/>
+              <a:t>…</a:t>
+            </a:r>
+          </a:p>
+        </p:txBody>
+      </p:sp>
+      <p:sp>
+        <p:nvSpPr>
+          <p:cNvPr id="53" name="Rectangle 52">
+            <a:extLst>
+              <a:ext uri="{FF2B5EF4-FFF2-40B4-BE49-F238E27FC236}">
+                <a16:creationId xmlns:a16="http://schemas.microsoft.com/office/drawing/2014/main" id="{CE9F0C2A-E602-D6D6-B3C7-22C8CA846AEC}"/>
+              </a:ext>
+            </a:extLst>
+          </p:cNvPr>
+          <p:cNvSpPr/>
+          <p:nvPr/>
+        </p:nvSpPr>
+        <p:spPr>
+          <a:xfrm>
+            <a:off x="8289345" y="2694652"/>
+            <a:ext cx="2238778" cy="377952"/>
+          </a:xfrm>
+          <a:prstGeom prst="rect">
+            <a:avLst/>
+          </a:prstGeom>
+        </p:spPr>
+        <p:style>
+          <a:lnRef idx="1">
+            <a:schemeClr val="accent6"/>
+          </a:lnRef>
+          <a:fillRef idx="3">
+            <a:schemeClr val="accent6"/>
+          </a:fillRef>
+          <a:effectRef idx="2">
+            <a:schemeClr val="accent6"/>
+          </a:effectRef>
+          <a:fontRef idx="minor">
+            <a:schemeClr val="lt1"/>
+          </a:fontRef>
+        </p:style>
+        <p:txBody>
+          <a:bodyPr rtlCol="0" anchor="ctr"/>
+          <a:lstStyle/>
+          <a:p>
+            <a:pPr algn="ctr"/>
+            <a:r>
+              <a:rPr lang="en-US" dirty="0"/>
+              <a:t>Storage</a:t>
+            </a:r>
+          </a:p>
+        </p:txBody>
+      </p:sp>
+      <p:cxnSp>
+        <p:nvCxnSpPr>
+          <p:cNvPr id="54" name="Straight Arrow Connector 53">
+            <a:extLst>
+              <a:ext uri="{FF2B5EF4-FFF2-40B4-BE49-F238E27FC236}">
+                <a16:creationId xmlns:a16="http://schemas.microsoft.com/office/drawing/2014/main" id="{86A1DD67-1A86-B2FF-1209-288298B5DB70}"/>
+              </a:ext>
+            </a:extLst>
+          </p:cNvPr>
+          <p:cNvCxnSpPr>
+            <a:cxnSpLocks/>
+          </p:cNvCxnSpPr>
+          <p:nvPr/>
+        </p:nvCxnSpPr>
+        <p:spPr>
+          <a:xfrm>
+            <a:off x="8478321" y="2472169"/>
+            <a:ext cx="0" cy="222483"/>
+          </a:xfrm>
+          <a:prstGeom prst="straightConnector1">
+            <a:avLst/>
+          </a:prstGeom>
+          <a:ln w="28575">
+            <a:tailEnd type="triangle"/>
+          </a:ln>
+        </p:spPr>
+        <p:style>
+          <a:lnRef idx="1">
+            <a:schemeClr val="accent6"/>
+          </a:lnRef>
+          <a:fillRef idx="3">
+            <a:schemeClr val="accent6"/>
+          </a:fillRef>
+          <a:effectRef idx="2">
+            <a:schemeClr val="accent6"/>
+          </a:effectRef>
+          <a:fontRef idx="minor">
+            <a:schemeClr val="lt1"/>
+          </a:fontRef>
+        </p:style>
+      </p:cxnSp>
+      <p:sp>
+        <p:nvSpPr>
+          <p:cNvPr id="56" name="TextBox 55">
+            <a:extLst>
+              <a:ext uri="{FF2B5EF4-FFF2-40B4-BE49-F238E27FC236}">
+                <a16:creationId xmlns:a16="http://schemas.microsoft.com/office/drawing/2014/main" id="{E8826C44-C89E-9FA4-7D32-57BCFC62F9AE}"/>
+              </a:ext>
+            </a:extLst>
+          </p:cNvPr>
+          <p:cNvSpPr txBox="1"/>
+          <p:nvPr/>
+        </p:nvSpPr>
+        <p:spPr>
+          <a:xfrm>
+            <a:off x="1177860" y="2098643"/>
+            <a:ext cx="958917" cy="369332"/>
+          </a:xfrm>
+          <a:prstGeom prst="rect">
+            <a:avLst/>
+          </a:prstGeom>
+          <a:noFill/>
+        </p:spPr>
+        <p:txBody>
+          <a:bodyPr wrap="none" rtlCol="0">
+            <a:spAutoFit/>
+          </a:bodyPr>
+          <a:lstStyle/>
+          <a:p>
+            <a:pPr algn="ctr"/>
+            <a:r>
+              <a:rPr lang="en-US" dirty="0"/>
+              <a:t>Running</a:t>
+            </a:r>
+          </a:p>
+        </p:txBody>
+      </p:sp>
+      <p:sp>
+        <p:nvSpPr>
+          <p:cNvPr id="63" name="Rectangle 62">
+            <a:extLst>
+              <a:ext uri="{FF2B5EF4-FFF2-40B4-BE49-F238E27FC236}">
+                <a16:creationId xmlns:a16="http://schemas.microsoft.com/office/drawing/2014/main" id="{AF74B1D8-41CC-9F64-BCCF-5FBD2D03E65B}"/>
+              </a:ext>
+            </a:extLst>
+          </p:cNvPr>
+          <p:cNvSpPr/>
+          <p:nvPr/>
+        </p:nvSpPr>
+        <p:spPr>
+          <a:xfrm>
+            <a:off x="2606273" y="3294766"/>
+            <a:ext cx="377952" cy="377952"/>
+          </a:xfrm>
+          <a:prstGeom prst="rect">
+            <a:avLst/>
+          </a:prstGeom>
+        </p:spPr>
+        <p:style>
+          <a:lnRef idx="1">
+            <a:schemeClr val="accent2"/>
+          </a:lnRef>
+          <a:fillRef idx="3">
+            <a:schemeClr val="accent2"/>
+          </a:fillRef>
+          <a:effectRef idx="2">
+            <a:schemeClr val="accent2"/>
+          </a:effectRef>
+          <a:fontRef idx="minor">
+            <a:schemeClr val="lt1"/>
+          </a:fontRef>
+        </p:style>
+        <p:txBody>
+          <a:bodyPr rtlCol="0" anchor="ctr"/>
+          <a:lstStyle/>
+          <a:p>
+            <a:pPr algn="ctr"/>
+            <a:r>
+              <a:rPr lang="en-US" dirty="0"/>
+              <a:t>0</a:t>
+            </a:r>
+          </a:p>
+        </p:txBody>
+      </p:sp>
+      <p:sp>
+        <p:nvSpPr>
+          <p:cNvPr id="64" name="Rectangle 63">
+            <a:extLst>
+              <a:ext uri="{FF2B5EF4-FFF2-40B4-BE49-F238E27FC236}">
+                <a16:creationId xmlns:a16="http://schemas.microsoft.com/office/drawing/2014/main" id="{9AF3CB21-AEE2-3866-F7D9-970318933BAF}"/>
+              </a:ext>
+            </a:extLst>
+          </p:cNvPr>
+          <p:cNvSpPr/>
+          <p:nvPr/>
+        </p:nvSpPr>
+        <p:spPr>
+          <a:xfrm>
+            <a:off x="3262366" y="3294766"/>
+            <a:ext cx="377952" cy="377952"/>
+          </a:xfrm>
+          <a:prstGeom prst="rect">
+            <a:avLst/>
+          </a:prstGeom>
+        </p:spPr>
+        <p:style>
+          <a:lnRef idx="1">
+            <a:schemeClr val="accent2"/>
+          </a:lnRef>
+          <a:fillRef idx="3">
+            <a:schemeClr val="accent2"/>
+          </a:fillRef>
+          <a:effectRef idx="2">
+            <a:schemeClr val="accent2"/>
+          </a:effectRef>
+          <a:fontRef idx="minor">
+            <a:schemeClr val="lt1"/>
+          </a:fontRef>
+        </p:style>
+        <p:txBody>
+          <a:bodyPr rtlCol="0" anchor="ctr"/>
+          <a:lstStyle/>
+          <a:p>
+            <a:pPr algn="ctr"/>
+            <a:r>
+              <a:rPr lang="en-US" dirty="0"/>
+              <a:t>1</a:t>
+            </a:r>
+          </a:p>
+        </p:txBody>
+      </p:sp>
+      <p:sp>
+        <p:nvSpPr>
+          <p:cNvPr id="65" name="Rectangle 64">
+            <a:extLst>
+              <a:ext uri="{FF2B5EF4-FFF2-40B4-BE49-F238E27FC236}">
+                <a16:creationId xmlns:a16="http://schemas.microsoft.com/office/drawing/2014/main" id="{5B327787-E56C-802A-527D-866C09DAF4C3}"/>
+              </a:ext>
+            </a:extLst>
+          </p:cNvPr>
+          <p:cNvSpPr/>
+          <p:nvPr/>
+        </p:nvSpPr>
+        <p:spPr>
+          <a:xfrm>
+            <a:off x="4467099" y="3294766"/>
+            <a:ext cx="377952" cy="377952"/>
+          </a:xfrm>
+          <a:prstGeom prst="rect">
+            <a:avLst/>
+          </a:prstGeom>
+        </p:spPr>
+        <p:style>
+          <a:lnRef idx="1">
+            <a:schemeClr val="accent2"/>
+          </a:lnRef>
+          <a:fillRef idx="3">
+            <a:schemeClr val="accent2"/>
+          </a:fillRef>
+          <a:effectRef idx="2">
+            <a:schemeClr val="accent2"/>
+          </a:effectRef>
+          <a:fontRef idx="minor">
+            <a:schemeClr val="lt1"/>
+          </a:fontRef>
+        </p:style>
+        <p:txBody>
+          <a:bodyPr rtlCol="0" anchor="ctr"/>
+          <a:lstStyle/>
+          <a:p>
+            <a:pPr algn="ctr"/>
+            <a:r>
+              <a:rPr lang="en-US" dirty="0"/>
+              <a:t>n</a:t>
+            </a:r>
+          </a:p>
+        </p:txBody>
+      </p:sp>
+      <p:sp>
+        <p:nvSpPr>
+          <p:cNvPr id="66" name="TextBox 65">
+            <a:extLst>
+              <a:ext uri="{FF2B5EF4-FFF2-40B4-BE49-F238E27FC236}">
+                <a16:creationId xmlns:a16="http://schemas.microsoft.com/office/drawing/2014/main" id="{5FE5E400-7523-DB33-F49D-9BF78C1486C2}"/>
+              </a:ext>
+            </a:extLst>
+          </p:cNvPr>
+          <p:cNvSpPr txBox="1"/>
+          <p:nvPr/>
+        </p:nvSpPr>
+        <p:spPr>
+          <a:xfrm>
+            <a:off x="3893197" y="3244790"/>
+            <a:ext cx="343364" cy="369332"/>
+          </a:xfrm>
+          <a:prstGeom prst="rect">
+            <a:avLst/>
+          </a:prstGeom>
+          <a:noFill/>
+        </p:spPr>
+        <p:txBody>
+          <a:bodyPr wrap="none" rtlCol="0">
+            <a:spAutoFit/>
+          </a:bodyPr>
+          <a:lstStyle/>
+          <a:p>
+            <a:r>
+              <a:rPr lang="en-US" dirty="0"/>
+              <a:t>…</a:t>
+            </a:r>
+          </a:p>
+        </p:txBody>
+      </p:sp>
+      <p:sp>
+        <p:nvSpPr>
+          <p:cNvPr id="67" name="TextBox 66">
+            <a:extLst>
+              <a:ext uri="{FF2B5EF4-FFF2-40B4-BE49-F238E27FC236}">
+                <a16:creationId xmlns:a16="http://schemas.microsoft.com/office/drawing/2014/main" id="{97A3410A-6FF9-B707-27FD-CD33D4491FA6}"/>
+              </a:ext>
+            </a:extLst>
+          </p:cNvPr>
+          <p:cNvSpPr txBox="1"/>
+          <p:nvPr/>
+        </p:nvSpPr>
+        <p:spPr>
+          <a:xfrm>
+            <a:off x="1264742" y="2707366"/>
+            <a:ext cx="785151" cy="369332"/>
+          </a:xfrm>
+          <a:prstGeom prst="rect">
+            <a:avLst/>
+          </a:prstGeom>
+          <a:noFill/>
+        </p:spPr>
+        <p:txBody>
+          <a:bodyPr wrap="none" rtlCol="0">
+            <a:spAutoFit/>
+          </a:bodyPr>
+          <a:lstStyle/>
+          <a:p>
+            <a:pPr algn="ctr"/>
+            <a:r>
+              <a:rPr lang="en-US" dirty="0"/>
+              <a:t>Saving</a:t>
+            </a:r>
+          </a:p>
+        </p:txBody>
+      </p:sp>
+      <p:sp>
+        <p:nvSpPr>
+          <p:cNvPr id="68" name="TextBox 67">
+            <a:extLst>
+              <a:ext uri="{FF2B5EF4-FFF2-40B4-BE49-F238E27FC236}">
+                <a16:creationId xmlns:a16="http://schemas.microsoft.com/office/drawing/2014/main" id="{C33D25FF-3440-8EF2-9974-785B576292B1}"/>
+              </a:ext>
+            </a:extLst>
+          </p:cNvPr>
+          <p:cNvSpPr txBox="1"/>
+          <p:nvPr/>
+        </p:nvSpPr>
+        <p:spPr>
+          <a:xfrm>
+            <a:off x="1203020" y="3307785"/>
+            <a:ext cx="920445" cy="369332"/>
+          </a:xfrm>
+          <a:prstGeom prst="rect">
+            <a:avLst/>
+          </a:prstGeom>
+          <a:noFill/>
+        </p:spPr>
+        <p:txBody>
+          <a:bodyPr wrap="none" rtlCol="0">
+            <a:spAutoFit/>
+          </a:bodyPr>
+          <a:lstStyle/>
+          <a:p>
+            <a:pPr algn="ctr"/>
+            <a:r>
+              <a:rPr lang="en-US" dirty="0"/>
+              <a:t>Loading</a:t>
+            </a:r>
+          </a:p>
+        </p:txBody>
+      </p:sp>
+      <p:cxnSp>
+        <p:nvCxnSpPr>
+          <p:cNvPr id="69" name="Straight Arrow Connector 68">
+            <a:extLst>
+              <a:ext uri="{FF2B5EF4-FFF2-40B4-BE49-F238E27FC236}">
+                <a16:creationId xmlns:a16="http://schemas.microsoft.com/office/drawing/2014/main" id="{EDE66784-79C6-9411-2533-D4EBE599EED2}"/>
+              </a:ext>
+            </a:extLst>
+          </p:cNvPr>
+          <p:cNvCxnSpPr>
+            <a:cxnSpLocks/>
+          </p:cNvCxnSpPr>
+          <p:nvPr/>
+        </p:nvCxnSpPr>
+        <p:spPr>
+          <a:xfrm>
+            <a:off x="6484340" y="3479432"/>
+            <a:ext cx="278141" cy="0"/>
+          </a:xfrm>
+          <a:prstGeom prst="straightConnector1">
+            <a:avLst/>
+          </a:prstGeom>
+          <a:ln w="28575">
+            <a:tailEnd type="triangle"/>
+          </a:ln>
+        </p:spPr>
+        <p:style>
+          <a:lnRef idx="1">
+            <a:schemeClr val="accent2"/>
+          </a:lnRef>
+          <a:fillRef idx="3">
+            <a:schemeClr val="accent2"/>
+          </a:fillRef>
+          <a:effectRef idx="2">
+            <a:schemeClr val="accent2"/>
+          </a:effectRef>
+          <a:fontRef idx="minor">
+            <a:schemeClr val="lt1"/>
+          </a:fontRef>
+        </p:style>
+      </p:cxnSp>
+      <p:cxnSp>
+        <p:nvCxnSpPr>
+          <p:cNvPr id="70" name="Straight Arrow Connector 69">
+            <a:extLst>
+              <a:ext uri="{FF2B5EF4-FFF2-40B4-BE49-F238E27FC236}">
+                <a16:creationId xmlns:a16="http://schemas.microsoft.com/office/drawing/2014/main" id="{4AC997C7-748D-3888-FFA9-C6F470B85820}"/>
+              </a:ext>
+            </a:extLst>
+          </p:cNvPr>
+          <p:cNvCxnSpPr>
+            <a:cxnSpLocks/>
+          </p:cNvCxnSpPr>
+          <p:nvPr/>
+        </p:nvCxnSpPr>
+        <p:spPr>
+          <a:xfrm>
+            <a:off x="5829811" y="3479432"/>
+            <a:ext cx="278141" cy="0"/>
+          </a:xfrm>
+          <a:prstGeom prst="straightConnector1">
+            <a:avLst/>
+          </a:prstGeom>
+          <a:ln w="28575">
+            <a:tailEnd type="triangle"/>
+          </a:ln>
+        </p:spPr>
+        <p:style>
+          <a:lnRef idx="1">
+            <a:schemeClr val="accent2"/>
+          </a:lnRef>
+          <a:fillRef idx="3">
+            <a:schemeClr val="accent2"/>
+          </a:fillRef>
+          <a:effectRef idx="2">
+            <a:schemeClr val="accent2"/>
+          </a:effectRef>
+          <a:fontRef idx="minor">
+            <a:schemeClr val="lt1"/>
+          </a:fontRef>
+        </p:style>
+      </p:cxnSp>
+      <p:cxnSp>
+        <p:nvCxnSpPr>
+          <p:cNvPr id="71" name="Straight Arrow Connector 70">
+            <a:extLst>
+              <a:ext uri="{FF2B5EF4-FFF2-40B4-BE49-F238E27FC236}">
+                <a16:creationId xmlns:a16="http://schemas.microsoft.com/office/drawing/2014/main" id="{D8CAF170-3F56-B5CA-61D5-99CBA000DA63}"/>
+              </a:ext>
+            </a:extLst>
+          </p:cNvPr>
+          <p:cNvCxnSpPr>
+            <a:cxnSpLocks/>
+          </p:cNvCxnSpPr>
+          <p:nvPr/>
+        </p:nvCxnSpPr>
+        <p:spPr>
+          <a:xfrm>
+            <a:off x="7030350" y="3479432"/>
+            <a:ext cx="278141" cy="0"/>
+          </a:xfrm>
+          <a:prstGeom prst="straightConnector1">
+            <a:avLst/>
+          </a:prstGeom>
+          <a:ln w="28575">
+            <a:tailEnd type="triangle"/>
+          </a:ln>
+        </p:spPr>
+        <p:style>
+          <a:lnRef idx="1">
+            <a:schemeClr val="accent2"/>
+          </a:lnRef>
+          <a:fillRef idx="3">
+            <a:schemeClr val="accent2"/>
+          </a:fillRef>
+          <a:effectRef idx="2">
+            <a:schemeClr val="accent2"/>
+          </a:effectRef>
+          <a:fontRef idx="minor">
+            <a:schemeClr val="lt1"/>
+          </a:fontRef>
+        </p:style>
+      </p:cxnSp>
+      <p:sp>
+        <p:nvSpPr>
+          <p:cNvPr id="72" name="Rectangle 71">
+            <a:extLst>
+              <a:ext uri="{FF2B5EF4-FFF2-40B4-BE49-F238E27FC236}">
+                <a16:creationId xmlns:a16="http://schemas.microsoft.com/office/drawing/2014/main" id="{4BA886BD-E069-2285-EABF-56A0CFEE0BD7}"/>
+              </a:ext>
+            </a:extLst>
+          </p:cNvPr>
+          <p:cNvSpPr/>
+          <p:nvPr/>
+        </p:nvSpPr>
+        <p:spPr>
+          <a:xfrm>
+            <a:off x="5447665" y="3290456"/>
+            <a:ext cx="377952" cy="377952"/>
+          </a:xfrm>
+          <a:prstGeom prst="rect">
+            <a:avLst/>
+          </a:prstGeom>
+        </p:spPr>
+        <p:style>
+          <a:lnRef idx="1">
+            <a:schemeClr val="accent2"/>
+          </a:lnRef>
+          <a:fillRef idx="3">
+            <a:schemeClr val="accent2"/>
+          </a:fillRef>
+          <a:effectRef idx="2">
+            <a:schemeClr val="accent2"/>
+          </a:effectRef>
+          <a:fontRef idx="minor">
+            <a:schemeClr val="lt1"/>
+          </a:fontRef>
+        </p:style>
+        <p:txBody>
+          <a:bodyPr rtlCol="0" anchor="ctr"/>
+          <a:lstStyle/>
+          <a:p>
+            <a:pPr algn="ctr"/>
+            <a:r>
+              <a:rPr lang="en-US" dirty="0"/>
+              <a:t>0</a:t>
+            </a:r>
+          </a:p>
+        </p:txBody>
+      </p:sp>
+      <p:sp>
+        <p:nvSpPr>
+          <p:cNvPr id="73" name="Rectangle 72">
+            <a:extLst>
+              <a:ext uri="{FF2B5EF4-FFF2-40B4-BE49-F238E27FC236}">
+                <a16:creationId xmlns:a16="http://schemas.microsoft.com/office/drawing/2014/main" id="{168EAA33-EA47-C492-DBF2-19E2BE821AF6}"/>
+              </a:ext>
+            </a:extLst>
+          </p:cNvPr>
+          <p:cNvSpPr/>
+          <p:nvPr/>
+        </p:nvSpPr>
+        <p:spPr>
+          <a:xfrm>
+            <a:off x="6103758" y="3290456"/>
+            <a:ext cx="377952" cy="377952"/>
+          </a:xfrm>
+          <a:prstGeom prst="rect">
+            <a:avLst/>
+          </a:prstGeom>
+        </p:spPr>
+        <p:style>
+          <a:lnRef idx="1">
+            <a:schemeClr val="accent2"/>
+          </a:lnRef>
+          <a:fillRef idx="3">
+            <a:schemeClr val="accent2"/>
+          </a:fillRef>
+          <a:effectRef idx="2">
+            <a:schemeClr val="accent2"/>
+          </a:effectRef>
+          <a:fontRef idx="minor">
+            <a:schemeClr val="lt1"/>
+          </a:fontRef>
+        </p:style>
+        <p:txBody>
+          <a:bodyPr rtlCol="0" anchor="ctr"/>
+          <a:lstStyle/>
+          <a:p>
+            <a:pPr algn="ctr"/>
+            <a:r>
+              <a:rPr lang="en-US" dirty="0"/>
+              <a:t>1</a:t>
+            </a:r>
+          </a:p>
+        </p:txBody>
+      </p:sp>
+      <p:sp>
+        <p:nvSpPr>
+          <p:cNvPr id="74" name="Rectangle 73">
+            <a:extLst>
+              <a:ext uri="{FF2B5EF4-FFF2-40B4-BE49-F238E27FC236}">
+                <a16:creationId xmlns:a16="http://schemas.microsoft.com/office/drawing/2014/main" id="{AC5CB6F6-EFFD-76BD-106F-53510B9F51A3}"/>
+              </a:ext>
+            </a:extLst>
+          </p:cNvPr>
+          <p:cNvSpPr/>
+          <p:nvPr/>
+        </p:nvSpPr>
+        <p:spPr>
+          <a:xfrm>
+            <a:off x="7308491" y="3290456"/>
+            <a:ext cx="377952" cy="377952"/>
+          </a:xfrm>
+          <a:prstGeom prst="rect">
+            <a:avLst/>
+          </a:prstGeom>
+        </p:spPr>
+        <p:style>
+          <a:lnRef idx="1">
+            <a:schemeClr val="accent2"/>
+          </a:lnRef>
+          <a:fillRef idx="3">
+            <a:schemeClr val="accent2"/>
+          </a:fillRef>
+          <a:effectRef idx="2">
+            <a:schemeClr val="accent2"/>
+          </a:effectRef>
+          <a:fontRef idx="minor">
+            <a:schemeClr val="lt1"/>
+          </a:fontRef>
+        </p:style>
+        <p:txBody>
+          <a:bodyPr rtlCol="0" anchor="ctr"/>
+          <a:lstStyle/>
+          <a:p>
+            <a:pPr algn="ctr"/>
+            <a:r>
+              <a:rPr lang="en-US" dirty="0"/>
+              <a:t>n</a:t>
+            </a:r>
+          </a:p>
+        </p:txBody>
+      </p:sp>
+      <p:sp>
+        <p:nvSpPr>
+          <p:cNvPr id="75" name="TextBox 74">
+            <a:extLst>
+              <a:ext uri="{FF2B5EF4-FFF2-40B4-BE49-F238E27FC236}">
+                <a16:creationId xmlns:a16="http://schemas.microsoft.com/office/drawing/2014/main" id="{D9D327ED-FACD-0780-2953-6567D678E4E6}"/>
+              </a:ext>
+            </a:extLst>
+          </p:cNvPr>
+          <p:cNvSpPr txBox="1"/>
+          <p:nvPr/>
+        </p:nvSpPr>
+        <p:spPr>
+          <a:xfrm>
+            <a:off x="6734589" y="3240480"/>
+            <a:ext cx="343364" cy="369332"/>
+          </a:xfrm>
+          <a:prstGeom prst="rect">
+            <a:avLst/>
+          </a:prstGeom>
+          <a:noFill/>
+        </p:spPr>
+        <p:txBody>
+          <a:bodyPr wrap="none" rtlCol="0">
+            <a:spAutoFit/>
+          </a:bodyPr>
+          <a:lstStyle/>
+          <a:p>
+            <a:r>
+              <a:rPr lang="en-US" dirty="0"/>
+              <a:t>…</a:t>
+            </a:r>
+          </a:p>
+        </p:txBody>
+      </p:sp>
+      <p:cxnSp>
+        <p:nvCxnSpPr>
+          <p:cNvPr id="79" name="Straight Arrow Connector 78">
+            <a:extLst>
+              <a:ext uri="{FF2B5EF4-FFF2-40B4-BE49-F238E27FC236}">
+                <a16:creationId xmlns:a16="http://schemas.microsoft.com/office/drawing/2014/main" id="{BCDCD822-1702-98BB-A128-6629DF42137E}"/>
+              </a:ext>
+            </a:extLst>
+          </p:cNvPr>
+          <p:cNvCxnSpPr>
+            <a:cxnSpLocks/>
+          </p:cNvCxnSpPr>
+          <p:nvPr/>
+        </p:nvCxnSpPr>
+        <p:spPr>
+          <a:xfrm>
+            <a:off x="5636641" y="3076477"/>
+            <a:ext cx="0" cy="222483"/>
+          </a:xfrm>
+          <a:prstGeom prst="straightConnector1">
+            <a:avLst/>
+          </a:prstGeom>
+          <a:ln w="28575">
+            <a:tailEnd type="triangle"/>
+          </a:ln>
+        </p:spPr>
+        <p:style>
+          <a:lnRef idx="1">
+            <a:schemeClr val="accent6"/>
+          </a:lnRef>
+          <a:fillRef idx="3">
+            <a:schemeClr val="accent6"/>
+          </a:fillRef>
+          <a:effectRef idx="2">
+            <a:schemeClr val="accent6"/>
+          </a:effectRef>
+          <a:fontRef idx="minor">
+            <a:schemeClr val="lt1"/>
+          </a:fontRef>
+        </p:style>
+      </p:cxnSp>
+      <p:cxnSp>
+        <p:nvCxnSpPr>
+          <p:cNvPr id="81" name="Straight Arrow Connector 80">
+            <a:extLst>
+              <a:ext uri="{FF2B5EF4-FFF2-40B4-BE49-F238E27FC236}">
+                <a16:creationId xmlns:a16="http://schemas.microsoft.com/office/drawing/2014/main" id="{3D4B2984-B34C-7B43-CA63-432170AF5BD1}"/>
+              </a:ext>
+            </a:extLst>
+          </p:cNvPr>
+          <p:cNvCxnSpPr>
+            <a:cxnSpLocks/>
+          </p:cNvCxnSpPr>
+          <p:nvPr/>
+        </p:nvCxnSpPr>
+        <p:spPr>
+          <a:xfrm>
+            <a:off x="9326020" y="3479432"/>
+            <a:ext cx="278141" cy="0"/>
+          </a:xfrm>
+          <a:prstGeom prst="straightConnector1">
+            <a:avLst/>
+          </a:prstGeom>
+          <a:ln w="28575">
+            <a:tailEnd type="triangle"/>
+          </a:ln>
+        </p:spPr>
+        <p:style>
+          <a:lnRef idx="1">
+            <a:schemeClr val="accent2"/>
+          </a:lnRef>
+          <a:fillRef idx="3">
+            <a:schemeClr val="accent2"/>
+          </a:fillRef>
+          <a:effectRef idx="2">
+            <a:schemeClr val="accent2"/>
+          </a:effectRef>
+          <a:fontRef idx="minor">
+            <a:schemeClr val="lt1"/>
+          </a:fontRef>
+        </p:style>
+      </p:cxnSp>
+      <p:cxnSp>
+        <p:nvCxnSpPr>
+          <p:cNvPr id="82" name="Straight Arrow Connector 81">
+            <a:extLst>
+              <a:ext uri="{FF2B5EF4-FFF2-40B4-BE49-F238E27FC236}">
+                <a16:creationId xmlns:a16="http://schemas.microsoft.com/office/drawing/2014/main" id="{2523FA6A-4BF0-0A6E-2477-7D5A468B4415}"/>
+              </a:ext>
+            </a:extLst>
+          </p:cNvPr>
+          <p:cNvCxnSpPr>
+            <a:cxnSpLocks/>
+          </p:cNvCxnSpPr>
+          <p:nvPr/>
+        </p:nvCxnSpPr>
+        <p:spPr>
+          <a:xfrm>
+            <a:off x="8671491" y="3479432"/>
+            <a:ext cx="278141" cy="0"/>
+          </a:xfrm>
+          <a:prstGeom prst="straightConnector1">
+            <a:avLst/>
+          </a:prstGeom>
+          <a:ln w="28575">
+            <a:tailEnd type="triangle"/>
+          </a:ln>
+        </p:spPr>
+        <p:style>
+          <a:lnRef idx="1">
+            <a:schemeClr val="accent2"/>
+          </a:lnRef>
+          <a:fillRef idx="3">
+            <a:schemeClr val="accent2"/>
+          </a:fillRef>
+          <a:effectRef idx="2">
+            <a:schemeClr val="accent2"/>
+          </a:effectRef>
+          <a:fontRef idx="minor">
+            <a:schemeClr val="lt1"/>
+          </a:fontRef>
+        </p:style>
+      </p:cxnSp>
+      <p:cxnSp>
+        <p:nvCxnSpPr>
+          <p:cNvPr id="83" name="Straight Arrow Connector 82">
+            <a:extLst>
+              <a:ext uri="{FF2B5EF4-FFF2-40B4-BE49-F238E27FC236}">
+                <a16:creationId xmlns:a16="http://schemas.microsoft.com/office/drawing/2014/main" id="{D4CFF042-9F11-654A-9E9C-747A66D51700}"/>
+              </a:ext>
+            </a:extLst>
+          </p:cNvPr>
+          <p:cNvCxnSpPr>
+            <a:cxnSpLocks/>
+          </p:cNvCxnSpPr>
+          <p:nvPr/>
+        </p:nvCxnSpPr>
+        <p:spPr>
+          <a:xfrm>
+            <a:off x="9872030" y="3479432"/>
+            <a:ext cx="278141" cy="0"/>
+          </a:xfrm>
+          <a:prstGeom prst="straightConnector1">
+            <a:avLst/>
+          </a:prstGeom>
+          <a:ln w="28575">
+            <a:tailEnd type="triangle"/>
+          </a:ln>
+        </p:spPr>
+        <p:style>
+          <a:lnRef idx="1">
+            <a:schemeClr val="accent2"/>
+          </a:lnRef>
+          <a:fillRef idx="3">
+            <a:schemeClr val="accent2"/>
+          </a:fillRef>
+          <a:effectRef idx="2">
+            <a:schemeClr val="accent2"/>
+          </a:effectRef>
+          <a:fontRef idx="minor">
+            <a:schemeClr val="lt1"/>
+          </a:fontRef>
+        </p:style>
+      </p:cxnSp>
+      <p:sp>
+        <p:nvSpPr>
+          <p:cNvPr id="84" name="Rectangle 83">
+            <a:extLst>
+              <a:ext uri="{FF2B5EF4-FFF2-40B4-BE49-F238E27FC236}">
+                <a16:creationId xmlns:a16="http://schemas.microsoft.com/office/drawing/2014/main" id="{E3A79AC9-5835-DB56-3B46-B69C95D78F15}"/>
+              </a:ext>
+            </a:extLst>
+          </p:cNvPr>
+          <p:cNvSpPr/>
+          <p:nvPr/>
+        </p:nvSpPr>
+        <p:spPr>
+          <a:xfrm>
+            <a:off x="8289345" y="3290456"/>
+            <a:ext cx="377952" cy="377952"/>
+          </a:xfrm>
+          <a:prstGeom prst="rect">
+            <a:avLst/>
+          </a:prstGeom>
+        </p:spPr>
+        <p:style>
+          <a:lnRef idx="1">
+            <a:schemeClr val="accent2"/>
+          </a:lnRef>
+          <a:fillRef idx="3">
+            <a:schemeClr val="accent2"/>
+          </a:fillRef>
+          <a:effectRef idx="2">
+            <a:schemeClr val="accent2"/>
+          </a:effectRef>
+          <a:fontRef idx="minor">
+            <a:schemeClr val="lt1"/>
+          </a:fontRef>
+        </p:style>
+        <p:txBody>
+          <a:bodyPr rtlCol="0" anchor="ctr"/>
+          <a:lstStyle/>
+          <a:p>
+            <a:pPr algn="ctr"/>
+            <a:r>
+              <a:rPr lang="en-US" dirty="0"/>
+              <a:t>0</a:t>
+            </a:r>
+          </a:p>
+        </p:txBody>
+      </p:sp>
+      <p:sp>
+        <p:nvSpPr>
+          <p:cNvPr id="85" name="Rectangle 84">
+            <a:extLst>
+              <a:ext uri="{FF2B5EF4-FFF2-40B4-BE49-F238E27FC236}">
+                <a16:creationId xmlns:a16="http://schemas.microsoft.com/office/drawing/2014/main" id="{D6AB6BAF-20E7-632C-B5FF-946C692A5BE7}"/>
+              </a:ext>
+            </a:extLst>
+          </p:cNvPr>
+          <p:cNvSpPr/>
+          <p:nvPr/>
+        </p:nvSpPr>
+        <p:spPr>
+          <a:xfrm>
+            <a:off x="8945438" y="3290456"/>
+            <a:ext cx="377952" cy="377952"/>
+          </a:xfrm>
+          <a:prstGeom prst="rect">
+            <a:avLst/>
+          </a:prstGeom>
+        </p:spPr>
+        <p:style>
+          <a:lnRef idx="1">
+            <a:schemeClr val="accent2"/>
+          </a:lnRef>
+          <a:fillRef idx="3">
+            <a:schemeClr val="accent2"/>
+          </a:fillRef>
+          <a:effectRef idx="2">
+            <a:schemeClr val="accent2"/>
+          </a:effectRef>
+          <a:fontRef idx="minor">
+            <a:schemeClr val="lt1"/>
+          </a:fontRef>
+        </p:style>
+        <p:txBody>
+          <a:bodyPr rtlCol="0" anchor="ctr"/>
+          <a:lstStyle/>
+          <a:p>
+            <a:pPr algn="ctr"/>
+            <a:r>
+              <a:rPr lang="en-US" dirty="0"/>
+              <a:t>1</a:t>
+            </a:r>
+          </a:p>
+        </p:txBody>
+      </p:sp>
+      <p:sp>
+        <p:nvSpPr>
+          <p:cNvPr id="86" name="Rectangle 85">
+            <a:extLst>
+              <a:ext uri="{FF2B5EF4-FFF2-40B4-BE49-F238E27FC236}">
+                <a16:creationId xmlns:a16="http://schemas.microsoft.com/office/drawing/2014/main" id="{42A752C8-0CFC-B74B-64CC-363492582859}"/>
+              </a:ext>
+            </a:extLst>
+          </p:cNvPr>
+          <p:cNvSpPr/>
+          <p:nvPr/>
+        </p:nvSpPr>
+        <p:spPr>
+          <a:xfrm>
+            <a:off x="10150171" y="3290456"/>
+            <a:ext cx="377952" cy="377952"/>
+          </a:xfrm>
+          <a:prstGeom prst="rect">
+            <a:avLst/>
+          </a:prstGeom>
+        </p:spPr>
+        <p:style>
+          <a:lnRef idx="1">
+            <a:schemeClr val="accent2"/>
+          </a:lnRef>
+          <a:fillRef idx="3">
+            <a:schemeClr val="accent2"/>
+          </a:fillRef>
+          <a:effectRef idx="2">
+            <a:schemeClr val="accent2"/>
+          </a:effectRef>
+          <a:fontRef idx="minor">
+            <a:schemeClr val="lt1"/>
+          </a:fontRef>
+        </p:style>
+        <p:txBody>
+          <a:bodyPr rtlCol="0" anchor="ctr"/>
+          <a:lstStyle/>
+          <a:p>
+            <a:pPr algn="ctr"/>
+            <a:r>
+              <a:rPr lang="en-US" dirty="0"/>
+              <a:t>n</a:t>
+            </a:r>
+          </a:p>
+        </p:txBody>
+      </p:sp>
+      <p:sp>
+        <p:nvSpPr>
+          <p:cNvPr id="87" name="TextBox 86">
+            <a:extLst>
+              <a:ext uri="{FF2B5EF4-FFF2-40B4-BE49-F238E27FC236}">
+                <a16:creationId xmlns:a16="http://schemas.microsoft.com/office/drawing/2014/main" id="{0FF38AEE-FE69-8510-F2A3-BC574373EE6F}"/>
+              </a:ext>
+            </a:extLst>
+          </p:cNvPr>
+          <p:cNvSpPr txBox="1"/>
+          <p:nvPr/>
+        </p:nvSpPr>
+        <p:spPr>
+          <a:xfrm>
+            <a:off x="9576269" y="3240480"/>
+            <a:ext cx="343364" cy="369332"/>
+          </a:xfrm>
+          <a:prstGeom prst="rect">
+            <a:avLst/>
+          </a:prstGeom>
+          <a:noFill/>
+        </p:spPr>
+        <p:txBody>
+          <a:bodyPr wrap="none" rtlCol="0">
+            <a:spAutoFit/>
+          </a:bodyPr>
+          <a:lstStyle/>
+          <a:p>
+            <a:r>
+              <a:rPr lang="en-US" dirty="0"/>
+              <a:t>…</a:t>
+            </a:r>
+          </a:p>
+        </p:txBody>
+      </p:sp>
+      <p:cxnSp>
+        <p:nvCxnSpPr>
+          <p:cNvPr id="91" name="Straight Arrow Connector 90">
+            <a:extLst>
+              <a:ext uri="{FF2B5EF4-FFF2-40B4-BE49-F238E27FC236}">
+                <a16:creationId xmlns:a16="http://schemas.microsoft.com/office/drawing/2014/main" id="{8C12BC13-B114-F647-7490-BF0B3F01363D}"/>
+              </a:ext>
+            </a:extLst>
+          </p:cNvPr>
+          <p:cNvCxnSpPr>
+            <a:cxnSpLocks/>
+          </p:cNvCxnSpPr>
+          <p:nvPr/>
+        </p:nvCxnSpPr>
+        <p:spPr>
+          <a:xfrm>
+            <a:off x="8478321" y="3076477"/>
+            <a:ext cx="0" cy="222483"/>
+          </a:xfrm>
+          <a:prstGeom prst="straightConnector1">
+            <a:avLst/>
+          </a:prstGeom>
+          <a:ln w="28575">
+            <a:tailEnd type="triangle"/>
+          </a:ln>
+        </p:spPr>
+        <p:style>
+          <a:lnRef idx="1">
+            <a:schemeClr val="accent6"/>
+          </a:lnRef>
+          <a:fillRef idx="3">
+            <a:schemeClr val="accent6"/>
+          </a:fillRef>
+          <a:effectRef idx="2">
+            <a:schemeClr val="accent6"/>
+          </a:effectRef>
+          <a:fontRef idx="minor">
+            <a:schemeClr val="lt1"/>
+          </a:fontRef>
+        </p:style>
+      </p:cxnSp>
     </p:spTree>
     <p:extLst>
       <p:ext uri="{BB962C8B-B14F-4D97-AF65-F5344CB8AC3E}">
-        <p14:creationId xmlns:p14="http://schemas.microsoft.com/office/powerpoint/2010/main" val="634324887"/>
+        <p14:creationId xmlns:p14="http://schemas.microsoft.com/office/powerpoint/2010/main" val="3707843020"/>
       </p:ext>
     </p:extLst>
   </p:cSld>

</xml_diff>

<commit_message>
readme and setup is enhanced.
</commit_message>
<xml_diff>
--- a/paper/images/graphics.pptx
+++ b/paper/images/graphics.pptx
@@ -6,6 +6,8 @@
   </p:sldMasterIdLst>
   <p:sldIdLst>
     <p:sldId id="257" r:id="rId2"/>
+    <p:sldId id="258" r:id="rId3"/>
+    <p:sldId id="259" r:id="rId4"/>
   </p:sldIdLst>
   <p:sldSz cx="12192000" cy="6858000"/>
   <p:notesSz cx="6858000" cy="9144000"/>
@@ -259,7 +261,7 @@
           <a:p>
             <a:fld id="{9F92018D-9D2C-0947-ADF2-96E7FE53AC27}" type="datetimeFigureOut">
               <a:rPr lang="en-US" smtClean="0"/>
-              <a:t>1/25/25</a:t>
+              <a:t>2/5/25</a:t>
             </a:fld>
             <a:endParaRPr lang="en-US"/>
           </a:p>
@@ -457,7 +459,7 @@
           <a:p>
             <a:fld id="{9F92018D-9D2C-0947-ADF2-96E7FE53AC27}" type="datetimeFigureOut">
               <a:rPr lang="en-US" smtClean="0"/>
-              <a:t>1/25/25</a:t>
+              <a:t>2/5/25</a:t>
             </a:fld>
             <a:endParaRPr lang="en-US"/>
           </a:p>
@@ -665,7 +667,7 @@
           <a:p>
             <a:fld id="{9F92018D-9D2C-0947-ADF2-96E7FE53AC27}" type="datetimeFigureOut">
               <a:rPr lang="en-US" smtClean="0"/>
-              <a:t>1/25/25</a:t>
+              <a:t>2/5/25</a:t>
             </a:fld>
             <a:endParaRPr lang="en-US"/>
           </a:p>
@@ -863,7 +865,7 @@
           <a:p>
             <a:fld id="{9F92018D-9D2C-0947-ADF2-96E7FE53AC27}" type="datetimeFigureOut">
               <a:rPr lang="en-US" smtClean="0"/>
-              <a:t>1/25/25</a:t>
+              <a:t>2/5/25</a:t>
             </a:fld>
             <a:endParaRPr lang="en-US"/>
           </a:p>
@@ -1138,7 +1140,7 @@
           <a:p>
             <a:fld id="{9F92018D-9D2C-0947-ADF2-96E7FE53AC27}" type="datetimeFigureOut">
               <a:rPr lang="en-US" smtClean="0"/>
-              <a:t>1/25/25</a:t>
+              <a:t>2/5/25</a:t>
             </a:fld>
             <a:endParaRPr lang="en-US"/>
           </a:p>
@@ -1403,7 +1405,7 @@
           <a:p>
             <a:fld id="{9F92018D-9D2C-0947-ADF2-96E7FE53AC27}" type="datetimeFigureOut">
               <a:rPr lang="en-US" smtClean="0"/>
-              <a:t>1/25/25</a:t>
+              <a:t>2/5/25</a:t>
             </a:fld>
             <a:endParaRPr lang="en-US"/>
           </a:p>
@@ -1815,7 +1817,7 @@
           <a:p>
             <a:fld id="{9F92018D-9D2C-0947-ADF2-96E7FE53AC27}" type="datetimeFigureOut">
               <a:rPr lang="en-US" smtClean="0"/>
-              <a:t>1/25/25</a:t>
+              <a:t>2/5/25</a:t>
             </a:fld>
             <a:endParaRPr lang="en-US"/>
           </a:p>
@@ -1956,7 +1958,7 @@
           <a:p>
             <a:fld id="{9F92018D-9D2C-0947-ADF2-96E7FE53AC27}" type="datetimeFigureOut">
               <a:rPr lang="en-US" smtClean="0"/>
-              <a:t>1/25/25</a:t>
+              <a:t>2/5/25</a:t>
             </a:fld>
             <a:endParaRPr lang="en-US"/>
           </a:p>
@@ -2069,7 +2071,7 @@
           <a:p>
             <a:fld id="{9F92018D-9D2C-0947-ADF2-96E7FE53AC27}" type="datetimeFigureOut">
               <a:rPr lang="en-US" smtClean="0"/>
-              <a:t>1/25/25</a:t>
+              <a:t>2/5/25</a:t>
             </a:fld>
             <a:endParaRPr lang="en-US"/>
           </a:p>
@@ -2380,7 +2382,7 @@
           <a:p>
             <a:fld id="{9F92018D-9D2C-0947-ADF2-96E7FE53AC27}" type="datetimeFigureOut">
               <a:rPr lang="en-US" smtClean="0"/>
-              <a:t>1/25/25</a:t>
+              <a:t>2/5/25</a:t>
             </a:fld>
             <a:endParaRPr lang="en-US"/>
           </a:p>
@@ -2668,7 +2670,7 @@
           <a:p>
             <a:fld id="{9F92018D-9D2C-0947-ADF2-96E7FE53AC27}" type="datetimeFigureOut">
               <a:rPr lang="en-US" smtClean="0"/>
-              <a:t>1/25/25</a:t>
+              <a:t>2/5/25</a:t>
             </a:fld>
             <a:endParaRPr lang="en-US"/>
           </a:p>
@@ -2909,7 +2911,7 @@
           <a:p>
             <a:fld id="{9F92018D-9D2C-0947-ADF2-96E7FE53AC27}" type="datetimeFigureOut">
               <a:rPr lang="en-US" smtClean="0"/>
-              <a:t>1/25/25</a:t>
+              <a:t>2/5/25</a:t>
             </a:fld>
             <a:endParaRPr lang="en-US"/>
           </a:p>
@@ -6320,6 +6322,2444 @@
 </p:sld>
 </file>
 
+<file path=ppt/slides/slide2.xml><?xml version="1.0" encoding="utf-8"?>
+<p:sld xmlns:a="http://schemas.openxmlformats.org/drawingml/2006/main" xmlns:r="http://schemas.openxmlformats.org/officeDocument/2006/relationships" xmlns:p="http://schemas.openxmlformats.org/presentationml/2006/main">
+  <p:cSld>
+    <p:spTree>
+      <p:nvGrpSpPr>
+        <p:cNvPr id="1" name=""/>
+        <p:cNvGrpSpPr/>
+        <p:nvPr/>
+      </p:nvGrpSpPr>
+      <p:grpSpPr>
+        <a:xfrm>
+          <a:off x="0" y="0"/>
+          <a:ext cx="0" cy="0"/>
+          <a:chOff x="0" y="0"/>
+          <a:chExt cx="0" cy="0"/>
+        </a:xfrm>
+      </p:grpSpPr>
+      <p:cxnSp>
+        <p:nvCxnSpPr>
+          <p:cNvPr id="13" name="Straight Arrow Connector 12">
+            <a:extLst>
+              <a:ext uri="{FF2B5EF4-FFF2-40B4-BE49-F238E27FC236}">
+                <a16:creationId xmlns:a16="http://schemas.microsoft.com/office/drawing/2014/main" id="{4CF771E9-B049-9A0D-DFBC-E15B23DF4845}"/>
+              </a:ext>
+            </a:extLst>
+          </p:cNvPr>
+          <p:cNvCxnSpPr>
+            <a:cxnSpLocks/>
+          </p:cNvCxnSpPr>
+          <p:nvPr/>
+        </p:nvCxnSpPr>
+        <p:spPr>
+          <a:xfrm>
+            <a:off x="5974551" y="2176923"/>
+            <a:ext cx="278141" cy="0"/>
+          </a:xfrm>
+          <a:prstGeom prst="straightConnector1">
+            <a:avLst/>
+          </a:prstGeom>
+          <a:ln w="38100">
+            <a:solidFill>
+              <a:schemeClr val="accent2"/>
+            </a:solidFill>
+            <a:tailEnd type="triangle"/>
+          </a:ln>
+        </p:spPr>
+        <p:style>
+          <a:lnRef idx="1">
+            <a:schemeClr val="accent1"/>
+          </a:lnRef>
+          <a:fillRef idx="0">
+            <a:schemeClr val="accent1"/>
+          </a:fillRef>
+          <a:effectRef idx="0">
+            <a:schemeClr val="accent1"/>
+          </a:effectRef>
+          <a:fontRef idx="minor">
+            <a:schemeClr val="tx1"/>
+          </a:fontRef>
+        </p:style>
+      </p:cxnSp>
+      <p:cxnSp>
+        <p:nvCxnSpPr>
+          <p:cNvPr id="16" name="Straight Arrow Connector 15">
+            <a:extLst>
+              <a:ext uri="{FF2B5EF4-FFF2-40B4-BE49-F238E27FC236}">
+                <a16:creationId xmlns:a16="http://schemas.microsoft.com/office/drawing/2014/main" id="{5DFF5295-C556-A3F4-6F1D-06E33EFB4C33}"/>
+              </a:ext>
+            </a:extLst>
+          </p:cNvPr>
+          <p:cNvCxnSpPr>
+            <a:cxnSpLocks/>
+          </p:cNvCxnSpPr>
+          <p:nvPr/>
+        </p:nvCxnSpPr>
+        <p:spPr>
+          <a:xfrm>
+            <a:off x="5320022" y="2176923"/>
+            <a:ext cx="278141" cy="0"/>
+          </a:xfrm>
+          <a:prstGeom prst="straightConnector1">
+            <a:avLst/>
+          </a:prstGeom>
+          <a:ln w="38100">
+            <a:solidFill>
+              <a:schemeClr val="accent2"/>
+            </a:solidFill>
+            <a:tailEnd type="triangle"/>
+          </a:ln>
+        </p:spPr>
+        <p:style>
+          <a:lnRef idx="1">
+            <a:schemeClr val="accent1"/>
+          </a:lnRef>
+          <a:fillRef idx="0">
+            <a:schemeClr val="accent1"/>
+          </a:fillRef>
+          <a:effectRef idx="0">
+            <a:schemeClr val="accent1"/>
+          </a:effectRef>
+          <a:fontRef idx="minor">
+            <a:schemeClr val="tx1"/>
+          </a:fontRef>
+        </p:style>
+      </p:cxnSp>
+      <p:cxnSp>
+        <p:nvCxnSpPr>
+          <p:cNvPr id="21" name="Straight Arrow Connector 20">
+            <a:extLst>
+              <a:ext uri="{FF2B5EF4-FFF2-40B4-BE49-F238E27FC236}">
+                <a16:creationId xmlns:a16="http://schemas.microsoft.com/office/drawing/2014/main" id="{B1F3DBC2-8B9E-A067-4EAB-98DF69B84311}"/>
+              </a:ext>
+            </a:extLst>
+          </p:cNvPr>
+          <p:cNvCxnSpPr>
+            <a:cxnSpLocks/>
+          </p:cNvCxnSpPr>
+          <p:nvPr/>
+        </p:nvCxnSpPr>
+        <p:spPr>
+          <a:xfrm>
+            <a:off x="6526824" y="2176923"/>
+            <a:ext cx="278141" cy="0"/>
+          </a:xfrm>
+          <a:prstGeom prst="straightConnector1">
+            <a:avLst/>
+          </a:prstGeom>
+          <a:ln w="38100">
+            <a:solidFill>
+              <a:schemeClr val="accent2"/>
+            </a:solidFill>
+            <a:tailEnd type="triangle"/>
+          </a:ln>
+        </p:spPr>
+        <p:style>
+          <a:lnRef idx="1">
+            <a:schemeClr val="accent1"/>
+          </a:lnRef>
+          <a:fillRef idx="0">
+            <a:schemeClr val="accent1"/>
+          </a:fillRef>
+          <a:effectRef idx="0">
+            <a:schemeClr val="accent1"/>
+          </a:effectRef>
+          <a:fontRef idx="minor">
+            <a:schemeClr val="tx1"/>
+          </a:fontRef>
+        </p:style>
+      </p:cxnSp>
+      <p:sp>
+        <p:nvSpPr>
+          <p:cNvPr id="22" name="Rectangle 21">
+            <a:extLst>
+              <a:ext uri="{FF2B5EF4-FFF2-40B4-BE49-F238E27FC236}">
+                <a16:creationId xmlns:a16="http://schemas.microsoft.com/office/drawing/2014/main" id="{40C29E39-97EA-FC9C-7448-C86FA55CE5D6}"/>
+              </a:ext>
+            </a:extLst>
+          </p:cNvPr>
+          <p:cNvSpPr/>
+          <p:nvPr/>
+        </p:nvSpPr>
+        <p:spPr>
+          <a:xfrm>
+            <a:off x="4937876" y="1987947"/>
+            <a:ext cx="377952" cy="377952"/>
+          </a:xfrm>
+          <a:prstGeom prst="rect">
+            <a:avLst/>
+          </a:prstGeom>
+        </p:spPr>
+        <p:style>
+          <a:lnRef idx="2">
+            <a:schemeClr val="accent1">
+              <a:shade val="50000"/>
+            </a:schemeClr>
+          </a:lnRef>
+          <a:fillRef idx="1">
+            <a:schemeClr val="accent1"/>
+          </a:fillRef>
+          <a:effectRef idx="0">
+            <a:schemeClr val="accent1"/>
+          </a:effectRef>
+          <a:fontRef idx="minor">
+            <a:schemeClr val="lt1"/>
+          </a:fontRef>
+        </p:style>
+        <p:txBody>
+          <a:bodyPr rtlCol="0" anchor="ctr"/>
+          <a:lstStyle/>
+          <a:p>
+            <a:pPr algn="ctr"/>
+            <a:r>
+              <a:rPr lang="en-US" dirty="0"/>
+              <a:t>0</a:t>
+            </a:r>
+          </a:p>
+        </p:txBody>
+      </p:sp>
+      <p:sp>
+        <p:nvSpPr>
+          <p:cNvPr id="24" name="Rectangle 23">
+            <a:extLst>
+              <a:ext uri="{FF2B5EF4-FFF2-40B4-BE49-F238E27FC236}">
+                <a16:creationId xmlns:a16="http://schemas.microsoft.com/office/drawing/2014/main" id="{4730DF4F-5E8B-D7FD-D6BE-D479E5FB4005}"/>
+              </a:ext>
+            </a:extLst>
+          </p:cNvPr>
+          <p:cNvSpPr/>
+          <p:nvPr/>
+        </p:nvSpPr>
+        <p:spPr>
+          <a:xfrm>
+            <a:off x="5593969" y="1987947"/>
+            <a:ext cx="377952" cy="377952"/>
+          </a:xfrm>
+          <a:prstGeom prst="rect">
+            <a:avLst/>
+          </a:prstGeom>
+        </p:spPr>
+        <p:style>
+          <a:lnRef idx="2">
+            <a:schemeClr val="accent1">
+              <a:shade val="50000"/>
+            </a:schemeClr>
+          </a:lnRef>
+          <a:fillRef idx="1">
+            <a:schemeClr val="accent1"/>
+          </a:fillRef>
+          <a:effectRef idx="0">
+            <a:schemeClr val="accent1"/>
+          </a:effectRef>
+          <a:fontRef idx="minor">
+            <a:schemeClr val="lt1"/>
+          </a:fontRef>
+        </p:style>
+        <p:txBody>
+          <a:bodyPr rtlCol="0" anchor="ctr"/>
+          <a:lstStyle/>
+          <a:p>
+            <a:pPr algn="ctr"/>
+            <a:r>
+              <a:rPr lang="en-US" dirty="0"/>
+              <a:t>1</a:t>
+            </a:r>
+          </a:p>
+        </p:txBody>
+      </p:sp>
+      <p:sp>
+        <p:nvSpPr>
+          <p:cNvPr id="25" name="Rectangle 24">
+            <a:extLst>
+              <a:ext uri="{FF2B5EF4-FFF2-40B4-BE49-F238E27FC236}">
+                <a16:creationId xmlns:a16="http://schemas.microsoft.com/office/drawing/2014/main" id="{CB3E88F3-6A45-5B4C-B9E5-3A44F8907FBD}"/>
+              </a:ext>
+            </a:extLst>
+          </p:cNvPr>
+          <p:cNvSpPr/>
+          <p:nvPr/>
+        </p:nvSpPr>
+        <p:spPr>
+          <a:xfrm>
+            <a:off x="6804965" y="1987947"/>
+            <a:ext cx="377952" cy="377952"/>
+          </a:xfrm>
+          <a:prstGeom prst="rect">
+            <a:avLst/>
+          </a:prstGeom>
+        </p:spPr>
+        <p:style>
+          <a:lnRef idx="2">
+            <a:schemeClr val="accent1">
+              <a:shade val="50000"/>
+            </a:schemeClr>
+          </a:lnRef>
+          <a:fillRef idx="1">
+            <a:schemeClr val="accent1"/>
+          </a:fillRef>
+          <a:effectRef idx="0">
+            <a:schemeClr val="accent1"/>
+          </a:effectRef>
+          <a:fontRef idx="minor">
+            <a:schemeClr val="lt1"/>
+          </a:fontRef>
+        </p:style>
+        <p:txBody>
+          <a:bodyPr rtlCol="0" anchor="ctr"/>
+          <a:lstStyle/>
+          <a:p>
+            <a:pPr algn="ctr"/>
+            <a:r>
+              <a:rPr lang="en-US" dirty="0"/>
+              <a:t>n</a:t>
+            </a:r>
+          </a:p>
+        </p:txBody>
+      </p:sp>
+      <p:sp>
+        <p:nvSpPr>
+          <p:cNvPr id="37" name="TextBox 36">
+            <a:extLst>
+              <a:ext uri="{FF2B5EF4-FFF2-40B4-BE49-F238E27FC236}">
+                <a16:creationId xmlns:a16="http://schemas.microsoft.com/office/drawing/2014/main" id="{6936B7C9-34E6-519D-1AD6-178554331B49}"/>
+              </a:ext>
+            </a:extLst>
+          </p:cNvPr>
+          <p:cNvSpPr txBox="1"/>
+          <p:nvPr/>
+        </p:nvSpPr>
+        <p:spPr>
+          <a:xfrm>
+            <a:off x="6224800" y="1929262"/>
+            <a:ext cx="343364" cy="369332"/>
+          </a:xfrm>
+          <a:prstGeom prst="rect">
+            <a:avLst/>
+          </a:prstGeom>
+          <a:noFill/>
+        </p:spPr>
+        <p:txBody>
+          <a:bodyPr wrap="none" rtlCol="0">
+            <a:spAutoFit/>
+          </a:bodyPr>
+          <a:lstStyle/>
+          <a:p>
+            <a:r>
+              <a:rPr lang="en-US" dirty="0"/>
+              <a:t>…</a:t>
+            </a:r>
+          </a:p>
+        </p:txBody>
+      </p:sp>
+      <p:sp>
+        <p:nvSpPr>
+          <p:cNvPr id="39" name="TextBox 38">
+            <a:extLst>
+              <a:ext uri="{FF2B5EF4-FFF2-40B4-BE49-F238E27FC236}">
+                <a16:creationId xmlns:a16="http://schemas.microsoft.com/office/drawing/2014/main" id="{FF8B4FB4-6636-E821-611E-A6634937010D}"/>
+              </a:ext>
+            </a:extLst>
+          </p:cNvPr>
+          <p:cNvSpPr txBox="1"/>
+          <p:nvPr/>
+        </p:nvSpPr>
+        <p:spPr>
+          <a:xfrm>
+            <a:off x="4452986" y="1445800"/>
+            <a:ext cx="3286028" cy="369332"/>
+          </a:xfrm>
+          <a:prstGeom prst="rect">
+            <a:avLst/>
+          </a:prstGeom>
+          <a:noFill/>
+        </p:spPr>
+        <p:txBody>
+          <a:bodyPr wrap="none" rtlCol="0">
+            <a:spAutoFit/>
+          </a:bodyPr>
+          <a:lstStyle/>
+          <a:p>
+            <a:pPr algn="ctr"/>
+            <a:r>
+              <a:rPr lang="en-US" dirty="0"/>
+              <a:t>Evolving data structure over time</a:t>
+            </a:r>
+          </a:p>
+        </p:txBody>
+      </p:sp>
+      <p:sp>
+        <p:nvSpPr>
+          <p:cNvPr id="40" name="TextBox 39">
+            <a:extLst>
+              <a:ext uri="{FF2B5EF4-FFF2-40B4-BE49-F238E27FC236}">
+                <a16:creationId xmlns:a16="http://schemas.microsoft.com/office/drawing/2014/main" id="{BB806D3B-EAFB-AC9F-7FF6-1BBDA4445FFA}"/>
+              </a:ext>
+            </a:extLst>
+          </p:cNvPr>
+          <p:cNvSpPr txBox="1"/>
+          <p:nvPr/>
+        </p:nvSpPr>
+        <p:spPr>
+          <a:xfrm>
+            <a:off x="6896738" y="3648708"/>
+            <a:ext cx="770147" cy="369332"/>
+          </a:xfrm>
+          <a:prstGeom prst="rect">
+            <a:avLst/>
+          </a:prstGeom>
+          <a:noFill/>
+        </p:spPr>
+        <p:txBody>
+          <a:bodyPr wrap="none" rtlCol="0">
+            <a:spAutoFit/>
+          </a:bodyPr>
+          <a:lstStyle/>
+          <a:p>
+            <a:pPr algn="ctr"/>
+            <a:r>
+              <a:rPr lang="en-US" dirty="0"/>
+              <a:t>Deltas</a:t>
+            </a:r>
+          </a:p>
+        </p:txBody>
+      </p:sp>
+      <p:sp>
+        <p:nvSpPr>
+          <p:cNvPr id="43" name="TextBox 42">
+            <a:extLst>
+              <a:ext uri="{FF2B5EF4-FFF2-40B4-BE49-F238E27FC236}">
+                <a16:creationId xmlns:a16="http://schemas.microsoft.com/office/drawing/2014/main" id="{292286DE-73BF-2F67-6A9A-536053C832E1}"/>
+              </a:ext>
+            </a:extLst>
+          </p:cNvPr>
+          <p:cNvSpPr txBox="1"/>
+          <p:nvPr/>
+        </p:nvSpPr>
+        <p:spPr>
+          <a:xfrm>
+            <a:off x="4372198" y="3623307"/>
+            <a:ext cx="1143711" cy="369332"/>
+          </a:xfrm>
+          <a:prstGeom prst="rect">
+            <a:avLst/>
+          </a:prstGeom>
+          <a:noFill/>
+        </p:spPr>
+        <p:txBody>
+          <a:bodyPr wrap="none" rtlCol="0">
+            <a:spAutoFit/>
+          </a:bodyPr>
+          <a:lstStyle/>
+          <a:p>
+            <a:pPr algn="ctr"/>
+            <a:r>
+              <a:rPr lang="en-US" dirty="0"/>
+              <a:t>Snapshots</a:t>
+            </a:r>
+          </a:p>
+        </p:txBody>
+      </p:sp>
+      <p:sp>
+        <p:nvSpPr>
+          <p:cNvPr id="60" name="Rectangle 59">
+            <a:extLst>
+              <a:ext uri="{FF2B5EF4-FFF2-40B4-BE49-F238E27FC236}">
+                <a16:creationId xmlns:a16="http://schemas.microsoft.com/office/drawing/2014/main" id="{0D99ED2D-C8E1-18C9-681C-C866CA3392A1}"/>
+              </a:ext>
+            </a:extLst>
+          </p:cNvPr>
+          <p:cNvSpPr/>
+          <p:nvPr/>
+        </p:nvSpPr>
+        <p:spPr>
+          <a:xfrm>
+            <a:off x="4188830" y="4038853"/>
+            <a:ext cx="377952" cy="377952"/>
+          </a:xfrm>
+          <a:prstGeom prst="rect">
+            <a:avLst/>
+          </a:prstGeom>
+        </p:spPr>
+        <p:style>
+          <a:lnRef idx="2">
+            <a:schemeClr val="accent1">
+              <a:shade val="50000"/>
+            </a:schemeClr>
+          </a:lnRef>
+          <a:fillRef idx="1">
+            <a:schemeClr val="accent1"/>
+          </a:fillRef>
+          <a:effectRef idx="0">
+            <a:schemeClr val="accent1"/>
+          </a:effectRef>
+          <a:fontRef idx="minor">
+            <a:schemeClr val="lt1"/>
+          </a:fontRef>
+        </p:style>
+        <p:txBody>
+          <a:bodyPr rtlCol="0" anchor="ctr"/>
+          <a:lstStyle/>
+          <a:p>
+            <a:pPr algn="ctr"/>
+            <a:r>
+              <a:rPr lang="en-US" dirty="0"/>
+              <a:t>0</a:t>
+            </a:r>
+          </a:p>
+        </p:txBody>
+      </p:sp>
+      <p:sp>
+        <p:nvSpPr>
+          <p:cNvPr id="61" name="Rectangle 60">
+            <a:extLst>
+              <a:ext uri="{FF2B5EF4-FFF2-40B4-BE49-F238E27FC236}">
+                <a16:creationId xmlns:a16="http://schemas.microsoft.com/office/drawing/2014/main" id="{B31FF595-A9B8-AEC1-2F98-93AD93208AF6}"/>
+              </a:ext>
+            </a:extLst>
+          </p:cNvPr>
+          <p:cNvSpPr/>
+          <p:nvPr/>
+        </p:nvSpPr>
+        <p:spPr>
+          <a:xfrm>
+            <a:off x="4667404" y="4038853"/>
+            <a:ext cx="377952" cy="377952"/>
+          </a:xfrm>
+          <a:prstGeom prst="rect">
+            <a:avLst/>
+          </a:prstGeom>
+        </p:spPr>
+        <p:style>
+          <a:lnRef idx="2">
+            <a:schemeClr val="accent1">
+              <a:shade val="50000"/>
+            </a:schemeClr>
+          </a:lnRef>
+          <a:fillRef idx="1">
+            <a:schemeClr val="accent1"/>
+          </a:fillRef>
+          <a:effectRef idx="0">
+            <a:schemeClr val="accent1"/>
+          </a:effectRef>
+          <a:fontRef idx="minor">
+            <a:schemeClr val="lt1"/>
+          </a:fontRef>
+        </p:style>
+        <p:txBody>
+          <a:bodyPr rtlCol="0" anchor="ctr"/>
+          <a:lstStyle/>
+          <a:p>
+            <a:pPr algn="ctr"/>
+            <a:r>
+              <a:rPr lang="en-US" dirty="0"/>
+              <a:t>1</a:t>
+            </a:r>
+          </a:p>
+        </p:txBody>
+      </p:sp>
+      <p:sp>
+        <p:nvSpPr>
+          <p:cNvPr id="62" name="Rectangle 61">
+            <a:extLst>
+              <a:ext uri="{FF2B5EF4-FFF2-40B4-BE49-F238E27FC236}">
+                <a16:creationId xmlns:a16="http://schemas.microsoft.com/office/drawing/2014/main" id="{644E40C5-4BA1-89E3-3351-B0EFD74DD3A7}"/>
+              </a:ext>
+            </a:extLst>
+          </p:cNvPr>
+          <p:cNvSpPr/>
+          <p:nvPr/>
+        </p:nvSpPr>
+        <p:spPr>
+          <a:xfrm>
+            <a:off x="5329409" y="4038853"/>
+            <a:ext cx="377952" cy="377952"/>
+          </a:xfrm>
+          <a:prstGeom prst="rect">
+            <a:avLst/>
+          </a:prstGeom>
+        </p:spPr>
+        <p:style>
+          <a:lnRef idx="2">
+            <a:schemeClr val="accent1">
+              <a:shade val="50000"/>
+            </a:schemeClr>
+          </a:lnRef>
+          <a:fillRef idx="1">
+            <a:schemeClr val="accent1"/>
+          </a:fillRef>
+          <a:effectRef idx="0">
+            <a:schemeClr val="accent1"/>
+          </a:effectRef>
+          <a:fontRef idx="minor">
+            <a:schemeClr val="lt1"/>
+          </a:fontRef>
+        </p:style>
+        <p:txBody>
+          <a:bodyPr rtlCol="0" anchor="ctr"/>
+          <a:lstStyle/>
+          <a:p>
+            <a:pPr algn="ctr"/>
+            <a:r>
+              <a:rPr lang="en-US" dirty="0"/>
+              <a:t>n</a:t>
+            </a:r>
+          </a:p>
+        </p:txBody>
+      </p:sp>
+      <p:sp>
+        <p:nvSpPr>
+          <p:cNvPr id="80" name="TextBox 79">
+            <a:extLst>
+              <a:ext uri="{FF2B5EF4-FFF2-40B4-BE49-F238E27FC236}">
+                <a16:creationId xmlns:a16="http://schemas.microsoft.com/office/drawing/2014/main" id="{7E81FBDC-DA29-22AC-9B4C-26A9BFED9EF9}"/>
+              </a:ext>
+            </a:extLst>
+          </p:cNvPr>
+          <p:cNvSpPr txBox="1"/>
+          <p:nvPr/>
+        </p:nvSpPr>
+        <p:spPr>
+          <a:xfrm>
+            <a:off x="5023223" y="3986463"/>
+            <a:ext cx="343364" cy="369332"/>
+          </a:xfrm>
+          <a:prstGeom prst="rect">
+            <a:avLst/>
+          </a:prstGeom>
+          <a:noFill/>
+        </p:spPr>
+        <p:txBody>
+          <a:bodyPr wrap="none" rtlCol="0">
+            <a:spAutoFit/>
+          </a:bodyPr>
+          <a:lstStyle/>
+          <a:p>
+            <a:r>
+              <a:rPr lang="en-US" dirty="0"/>
+              <a:t>…</a:t>
+            </a:r>
+          </a:p>
+        </p:txBody>
+      </p:sp>
+      <p:cxnSp>
+        <p:nvCxnSpPr>
+          <p:cNvPr id="88" name="Straight Arrow Connector 87">
+            <a:extLst>
+              <a:ext uri="{FF2B5EF4-FFF2-40B4-BE49-F238E27FC236}">
+                <a16:creationId xmlns:a16="http://schemas.microsoft.com/office/drawing/2014/main" id="{F39110D0-F2B2-A8E3-BF1C-A394ACA15BB0}"/>
+              </a:ext>
+            </a:extLst>
+          </p:cNvPr>
+          <p:cNvCxnSpPr>
+            <a:cxnSpLocks/>
+          </p:cNvCxnSpPr>
+          <p:nvPr/>
+        </p:nvCxnSpPr>
+        <p:spPr>
+          <a:xfrm>
+            <a:off x="7102281" y="4233039"/>
+            <a:ext cx="278141" cy="0"/>
+          </a:xfrm>
+          <a:prstGeom prst="straightConnector1">
+            <a:avLst/>
+          </a:prstGeom>
+          <a:ln w="38100">
+            <a:solidFill>
+              <a:schemeClr val="accent2"/>
+            </a:solidFill>
+            <a:tailEnd type="triangle"/>
+          </a:ln>
+        </p:spPr>
+        <p:style>
+          <a:lnRef idx="1">
+            <a:schemeClr val="accent1"/>
+          </a:lnRef>
+          <a:fillRef idx="0">
+            <a:schemeClr val="accent1"/>
+          </a:fillRef>
+          <a:effectRef idx="0">
+            <a:schemeClr val="accent1"/>
+          </a:effectRef>
+          <a:fontRef idx="minor">
+            <a:schemeClr val="tx1"/>
+          </a:fontRef>
+        </p:style>
+      </p:cxnSp>
+      <p:cxnSp>
+        <p:nvCxnSpPr>
+          <p:cNvPr id="89" name="Straight Arrow Connector 88">
+            <a:extLst>
+              <a:ext uri="{FF2B5EF4-FFF2-40B4-BE49-F238E27FC236}">
+                <a16:creationId xmlns:a16="http://schemas.microsoft.com/office/drawing/2014/main" id="{9690A738-6019-2717-FA72-AFD0BF140E0D}"/>
+              </a:ext>
+            </a:extLst>
+          </p:cNvPr>
+          <p:cNvCxnSpPr>
+            <a:cxnSpLocks/>
+          </p:cNvCxnSpPr>
+          <p:nvPr/>
+        </p:nvCxnSpPr>
+        <p:spPr>
+          <a:xfrm>
+            <a:off x="6717207" y="4233039"/>
+            <a:ext cx="278141" cy="0"/>
+          </a:xfrm>
+          <a:prstGeom prst="straightConnector1">
+            <a:avLst/>
+          </a:prstGeom>
+          <a:ln w="38100">
+            <a:solidFill>
+              <a:schemeClr val="accent2"/>
+            </a:solidFill>
+            <a:tailEnd type="triangle"/>
+          </a:ln>
+        </p:spPr>
+        <p:style>
+          <a:lnRef idx="1">
+            <a:schemeClr val="accent1"/>
+          </a:lnRef>
+          <a:fillRef idx="0">
+            <a:schemeClr val="accent1"/>
+          </a:fillRef>
+          <a:effectRef idx="0">
+            <a:schemeClr val="accent1"/>
+          </a:effectRef>
+          <a:fontRef idx="minor">
+            <a:schemeClr val="tx1"/>
+          </a:fontRef>
+        </p:style>
+      </p:cxnSp>
+      <p:cxnSp>
+        <p:nvCxnSpPr>
+          <p:cNvPr id="90" name="Straight Arrow Connector 89">
+            <a:extLst>
+              <a:ext uri="{FF2B5EF4-FFF2-40B4-BE49-F238E27FC236}">
+                <a16:creationId xmlns:a16="http://schemas.microsoft.com/office/drawing/2014/main" id="{0D36CAC2-B06C-42D9-781F-16F30893F0D6}"/>
+              </a:ext>
+            </a:extLst>
+          </p:cNvPr>
+          <p:cNvCxnSpPr>
+            <a:cxnSpLocks/>
+          </p:cNvCxnSpPr>
+          <p:nvPr/>
+        </p:nvCxnSpPr>
+        <p:spPr>
+          <a:xfrm>
+            <a:off x="7660817" y="4233039"/>
+            <a:ext cx="278141" cy="0"/>
+          </a:xfrm>
+          <a:prstGeom prst="straightConnector1">
+            <a:avLst/>
+          </a:prstGeom>
+          <a:ln w="38100">
+            <a:solidFill>
+              <a:schemeClr val="accent2"/>
+            </a:solidFill>
+            <a:tailEnd type="triangle"/>
+          </a:ln>
+        </p:spPr>
+        <p:style>
+          <a:lnRef idx="1">
+            <a:schemeClr val="accent1"/>
+          </a:lnRef>
+          <a:fillRef idx="0">
+            <a:schemeClr val="accent1"/>
+          </a:fillRef>
+          <a:effectRef idx="0">
+            <a:schemeClr val="accent1"/>
+          </a:effectRef>
+          <a:fontRef idx="minor">
+            <a:schemeClr val="tx1"/>
+          </a:fontRef>
+        </p:style>
+      </p:cxnSp>
+      <p:sp>
+        <p:nvSpPr>
+          <p:cNvPr id="92" name="TextBox 91">
+            <a:extLst>
+              <a:ext uri="{FF2B5EF4-FFF2-40B4-BE49-F238E27FC236}">
+                <a16:creationId xmlns:a16="http://schemas.microsoft.com/office/drawing/2014/main" id="{9CA6C4F8-B304-A9ED-A868-85EFCFE301F2}"/>
+              </a:ext>
+            </a:extLst>
+          </p:cNvPr>
+          <p:cNvSpPr txBox="1"/>
+          <p:nvPr/>
+        </p:nvSpPr>
+        <p:spPr>
+          <a:xfrm>
+            <a:off x="7352530" y="3985378"/>
+            <a:ext cx="343364" cy="369332"/>
+          </a:xfrm>
+          <a:prstGeom prst="rect">
+            <a:avLst/>
+          </a:prstGeom>
+          <a:noFill/>
+        </p:spPr>
+        <p:txBody>
+          <a:bodyPr wrap="none" rtlCol="0">
+            <a:spAutoFit/>
+          </a:bodyPr>
+          <a:lstStyle/>
+          <a:p>
+            <a:r>
+              <a:rPr lang="en-US" dirty="0"/>
+              <a:t>…</a:t>
+            </a:r>
+          </a:p>
+        </p:txBody>
+      </p:sp>
+      <p:sp>
+        <p:nvSpPr>
+          <p:cNvPr id="93" name="Rectangle 92">
+            <a:extLst>
+              <a:ext uri="{FF2B5EF4-FFF2-40B4-BE49-F238E27FC236}">
+                <a16:creationId xmlns:a16="http://schemas.microsoft.com/office/drawing/2014/main" id="{A1924DF7-BB86-F631-E200-B27AD2358BB0}"/>
+              </a:ext>
+            </a:extLst>
+          </p:cNvPr>
+          <p:cNvSpPr/>
+          <p:nvPr/>
+        </p:nvSpPr>
+        <p:spPr>
+          <a:xfrm>
+            <a:off x="4270189" y="1306379"/>
+            <a:ext cx="3637678" cy="1329268"/>
+          </a:xfrm>
+          <a:prstGeom prst="rect">
+            <a:avLst/>
+          </a:prstGeom>
+          <a:noFill/>
+          <a:ln>
+            <a:solidFill>
+              <a:schemeClr val="bg2">
+                <a:lumMod val="50000"/>
+              </a:schemeClr>
+            </a:solidFill>
+          </a:ln>
+        </p:spPr>
+        <p:style>
+          <a:lnRef idx="2">
+            <a:schemeClr val="accent1">
+              <a:shade val="50000"/>
+            </a:schemeClr>
+          </a:lnRef>
+          <a:fillRef idx="1">
+            <a:schemeClr val="accent1"/>
+          </a:fillRef>
+          <a:effectRef idx="0">
+            <a:schemeClr val="accent1"/>
+          </a:effectRef>
+          <a:fontRef idx="minor">
+            <a:schemeClr val="lt1"/>
+          </a:fontRef>
+        </p:style>
+        <p:txBody>
+          <a:bodyPr rtlCol="0" anchor="ctr"/>
+          <a:lstStyle/>
+          <a:p>
+            <a:pPr algn="ctr"/>
+            <a:endParaRPr lang="en-US"/>
+          </a:p>
+        </p:txBody>
+      </p:sp>
+      <p:sp>
+        <p:nvSpPr>
+          <p:cNvPr id="94" name="Rectangle 93">
+            <a:extLst>
+              <a:ext uri="{FF2B5EF4-FFF2-40B4-BE49-F238E27FC236}">
+                <a16:creationId xmlns:a16="http://schemas.microsoft.com/office/drawing/2014/main" id="{C3D50CD4-1F0A-AA6B-1249-C21B124ECAB5}"/>
+              </a:ext>
+            </a:extLst>
+          </p:cNvPr>
+          <p:cNvSpPr/>
+          <p:nvPr/>
+        </p:nvSpPr>
+        <p:spPr>
+          <a:xfrm>
+            <a:off x="6398564" y="3497749"/>
+            <a:ext cx="1839501" cy="1112958"/>
+          </a:xfrm>
+          <a:prstGeom prst="rect">
+            <a:avLst/>
+          </a:prstGeom>
+          <a:noFill/>
+          <a:ln>
+            <a:solidFill>
+              <a:schemeClr val="bg2">
+                <a:lumMod val="50000"/>
+              </a:schemeClr>
+            </a:solidFill>
+          </a:ln>
+        </p:spPr>
+        <p:style>
+          <a:lnRef idx="2">
+            <a:schemeClr val="accent1">
+              <a:shade val="50000"/>
+            </a:schemeClr>
+          </a:lnRef>
+          <a:fillRef idx="1">
+            <a:schemeClr val="accent1"/>
+          </a:fillRef>
+          <a:effectRef idx="0">
+            <a:schemeClr val="accent1"/>
+          </a:effectRef>
+          <a:fontRef idx="minor">
+            <a:schemeClr val="lt1"/>
+          </a:fontRef>
+        </p:style>
+        <p:txBody>
+          <a:bodyPr rtlCol="0" anchor="ctr"/>
+          <a:lstStyle/>
+          <a:p>
+            <a:pPr algn="ctr"/>
+            <a:endParaRPr lang="en-US"/>
+          </a:p>
+        </p:txBody>
+      </p:sp>
+      <p:sp>
+        <p:nvSpPr>
+          <p:cNvPr id="95" name="Rectangle 94">
+            <a:extLst>
+              <a:ext uri="{FF2B5EF4-FFF2-40B4-BE49-F238E27FC236}">
+                <a16:creationId xmlns:a16="http://schemas.microsoft.com/office/drawing/2014/main" id="{5A5D7FB6-1D2E-A929-D75B-927CBBD8145D}"/>
+              </a:ext>
+            </a:extLst>
+          </p:cNvPr>
+          <p:cNvSpPr/>
+          <p:nvPr/>
+        </p:nvSpPr>
+        <p:spPr>
+          <a:xfrm>
+            <a:off x="3936629" y="3497749"/>
+            <a:ext cx="1998506" cy="1112958"/>
+          </a:xfrm>
+          <a:prstGeom prst="rect">
+            <a:avLst/>
+          </a:prstGeom>
+          <a:noFill/>
+          <a:ln>
+            <a:solidFill>
+              <a:schemeClr val="bg2">
+                <a:lumMod val="50000"/>
+              </a:schemeClr>
+            </a:solidFill>
+          </a:ln>
+        </p:spPr>
+        <p:style>
+          <a:lnRef idx="2">
+            <a:schemeClr val="accent1">
+              <a:shade val="50000"/>
+            </a:schemeClr>
+          </a:lnRef>
+          <a:fillRef idx="1">
+            <a:schemeClr val="accent1"/>
+          </a:fillRef>
+          <a:effectRef idx="0">
+            <a:schemeClr val="accent1"/>
+          </a:effectRef>
+          <a:fontRef idx="minor">
+            <a:schemeClr val="lt1"/>
+          </a:fontRef>
+        </p:style>
+        <p:txBody>
+          <a:bodyPr rtlCol="0" anchor="ctr"/>
+          <a:lstStyle/>
+          <a:p>
+            <a:pPr algn="ctr"/>
+            <a:endParaRPr lang="en-US"/>
+          </a:p>
+        </p:txBody>
+      </p:sp>
+      <p:cxnSp>
+        <p:nvCxnSpPr>
+          <p:cNvPr id="97" name="Straight Arrow Connector 96">
+            <a:extLst>
+              <a:ext uri="{FF2B5EF4-FFF2-40B4-BE49-F238E27FC236}">
+                <a16:creationId xmlns:a16="http://schemas.microsoft.com/office/drawing/2014/main" id="{2F9DB96F-9312-A947-E753-BEE36A1F00E0}"/>
+              </a:ext>
+            </a:extLst>
+          </p:cNvPr>
+          <p:cNvCxnSpPr>
+            <a:cxnSpLocks/>
+            <a:stCxn id="93" idx="2"/>
+            <a:endCxn id="95" idx="0"/>
+          </p:cNvCxnSpPr>
+          <p:nvPr/>
+        </p:nvCxnSpPr>
+        <p:spPr>
+          <a:xfrm flipH="1">
+            <a:off x="4935882" y="2635647"/>
+            <a:ext cx="1153146" cy="862102"/>
+          </a:xfrm>
+          <a:prstGeom prst="straightConnector1">
+            <a:avLst/>
+          </a:prstGeom>
+          <a:ln w="38100">
+            <a:solidFill>
+              <a:schemeClr val="bg2">
+                <a:lumMod val="75000"/>
+              </a:schemeClr>
+            </a:solidFill>
+            <a:tailEnd type="triangle"/>
+          </a:ln>
+        </p:spPr>
+        <p:style>
+          <a:lnRef idx="1">
+            <a:schemeClr val="accent1"/>
+          </a:lnRef>
+          <a:fillRef idx="0">
+            <a:schemeClr val="accent1"/>
+          </a:fillRef>
+          <a:effectRef idx="0">
+            <a:schemeClr val="accent1"/>
+          </a:effectRef>
+          <a:fontRef idx="minor">
+            <a:schemeClr val="tx1"/>
+          </a:fontRef>
+        </p:style>
+      </p:cxnSp>
+      <p:cxnSp>
+        <p:nvCxnSpPr>
+          <p:cNvPr id="99" name="Straight Arrow Connector 98">
+            <a:extLst>
+              <a:ext uri="{FF2B5EF4-FFF2-40B4-BE49-F238E27FC236}">
+                <a16:creationId xmlns:a16="http://schemas.microsoft.com/office/drawing/2014/main" id="{B092D76A-C4E0-B05C-3698-D1F8C75A3962}"/>
+              </a:ext>
+            </a:extLst>
+          </p:cNvPr>
+          <p:cNvCxnSpPr>
+            <a:cxnSpLocks/>
+            <a:stCxn id="93" idx="2"/>
+            <a:endCxn id="94" idx="0"/>
+          </p:cNvCxnSpPr>
+          <p:nvPr/>
+        </p:nvCxnSpPr>
+        <p:spPr>
+          <a:xfrm>
+            <a:off x="6089028" y="2635647"/>
+            <a:ext cx="1229287" cy="862102"/>
+          </a:xfrm>
+          <a:prstGeom prst="straightConnector1">
+            <a:avLst/>
+          </a:prstGeom>
+          <a:ln w="38100">
+            <a:solidFill>
+              <a:schemeClr val="bg2">
+                <a:lumMod val="75000"/>
+              </a:schemeClr>
+            </a:solidFill>
+            <a:tailEnd type="triangle"/>
+          </a:ln>
+        </p:spPr>
+        <p:style>
+          <a:lnRef idx="1">
+            <a:schemeClr val="accent1"/>
+          </a:lnRef>
+          <a:fillRef idx="0">
+            <a:schemeClr val="accent1"/>
+          </a:fillRef>
+          <a:effectRef idx="0">
+            <a:schemeClr val="accent1"/>
+          </a:effectRef>
+          <a:fontRef idx="minor">
+            <a:schemeClr val="tx1"/>
+          </a:fontRef>
+        </p:style>
+      </p:cxnSp>
+    </p:spTree>
+    <p:extLst>
+      <p:ext uri="{BB962C8B-B14F-4D97-AF65-F5344CB8AC3E}">
+        <p14:creationId xmlns:p14="http://schemas.microsoft.com/office/powerpoint/2010/main" val="3690777086"/>
+      </p:ext>
+    </p:extLst>
+  </p:cSld>
+  <p:clrMapOvr>
+    <a:masterClrMapping/>
+  </p:clrMapOvr>
+</p:sld>
+</file>
+
+<file path=ppt/slides/slide3.xml><?xml version="1.0" encoding="utf-8"?>
+<p:sld xmlns:a="http://schemas.openxmlformats.org/drawingml/2006/main" xmlns:r="http://schemas.openxmlformats.org/officeDocument/2006/relationships" xmlns:p="http://schemas.openxmlformats.org/presentationml/2006/main">
+  <p:cSld>
+    <p:spTree>
+      <p:nvGrpSpPr>
+        <p:cNvPr id="1" name=""/>
+        <p:cNvGrpSpPr/>
+        <p:nvPr/>
+      </p:nvGrpSpPr>
+      <p:grpSpPr>
+        <a:xfrm>
+          <a:off x="0" y="0"/>
+          <a:ext cx="0" cy="0"/>
+          <a:chOff x="0" y="0"/>
+          <a:chExt cx="0" cy="0"/>
+        </a:xfrm>
+      </p:grpSpPr>
+      <p:cxnSp>
+        <p:nvCxnSpPr>
+          <p:cNvPr id="13" name="Straight Arrow Connector 12">
+            <a:extLst>
+              <a:ext uri="{FF2B5EF4-FFF2-40B4-BE49-F238E27FC236}">
+                <a16:creationId xmlns:a16="http://schemas.microsoft.com/office/drawing/2014/main" id="{4CF771E9-B049-9A0D-DFBC-E15B23DF4845}"/>
+              </a:ext>
+            </a:extLst>
+          </p:cNvPr>
+          <p:cNvCxnSpPr>
+            <a:cxnSpLocks/>
+          </p:cNvCxnSpPr>
+          <p:nvPr/>
+        </p:nvCxnSpPr>
+        <p:spPr>
+          <a:xfrm>
+            <a:off x="5974551" y="2176923"/>
+            <a:ext cx="278141" cy="0"/>
+          </a:xfrm>
+          <a:prstGeom prst="straightConnector1">
+            <a:avLst/>
+          </a:prstGeom>
+          <a:ln w="38100">
+            <a:solidFill>
+              <a:schemeClr val="accent1"/>
+            </a:solidFill>
+            <a:tailEnd type="triangle"/>
+          </a:ln>
+        </p:spPr>
+        <p:style>
+          <a:lnRef idx="1">
+            <a:schemeClr val="accent1"/>
+          </a:lnRef>
+          <a:fillRef idx="0">
+            <a:schemeClr val="accent1"/>
+          </a:fillRef>
+          <a:effectRef idx="0">
+            <a:schemeClr val="accent1"/>
+          </a:effectRef>
+          <a:fontRef idx="minor">
+            <a:schemeClr val="tx1"/>
+          </a:fontRef>
+        </p:style>
+      </p:cxnSp>
+      <p:cxnSp>
+        <p:nvCxnSpPr>
+          <p:cNvPr id="16" name="Straight Arrow Connector 15">
+            <a:extLst>
+              <a:ext uri="{FF2B5EF4-FFF2-40B4-BE49-F238E27FC236}">
+                <a16:creationId xmlns:a16="http://schemas.microsoft.com/office/drawing/2014/main" id="{5DFF5295-C556-A3F4-6F1D-06E33EFB4C33}"/>
+              </a:ext>
+            </a:extLst>
+          </p:cNvPr>
+          <p:cNvCxnSpPr>
+            <a:cxnSpLocks/>
+          </p:cNvCxnSpPr>
+          <p:nvPr/>
+        </p:nvCxnSpPr>
+        <p:spPr>
+          <a:xfrm>
+            <a:off x="5320022" y="2176923"/>
+            <a:ext cx="278141" cy="0"/>
+          </a:xfrm>
+          <a:prstGeom prst="straightConnector1">
+            <a:avLst/>
+          </a:prstGeom>
+          <a:ln w="38100">
+            <a:solidFill>
+              <a:schemeClr val="accent1"/>
+            </a:solidFill>
+            <a:tailEnd type="triangle"/>
+          </a:ln>
+        </p:spPr>
+        <p:style>
+          <a:lnRef idx="1">
+            <a:schemeClr val="accent1"/>
+          </a:lnRef>
+          <a:fillRef idx="0">
+            <a:schemeClr val="accent1"/>
+          </a:fillRef>
+          <a:effectRef idx="0">
+            <a:schemeClr val="accent1"/>
+          </a:effectRef>
+          <a:fontRef idx="minor">
+            <a:schemeClr val="tx1"/>
+          </a:fontRef>
+        </p:style>
+      </p:cxnSp>
+      <p:cxnSp>
+        <p:nvCxnSpPr>
+          <p:cNvPr id="21" name="Straight Arrow Connector 20">
+            <a:extLst>
+              <a:ext uri="{FF2B5EF4-FFF2-40B4-BE49-F238E27FC236}">
+                <a16:creationId xmlns:a16="http://schemas.microsoft.com/office/drawing/2014/main" id="{B1F3DBC2-8B9E-A067-4EAB-98DF69B84311}"/>
+              </a:ext>
+            </a:extLst>
+          </p:cNvPr>
+          <p:cNvCxnSpPr>
+            <a:cxnSpLocks/>
+          </p:cNvCxnSpPr>
+          <p:nvPr/>
+        </p:nvCxnSpPr>
+        <p:spPr>
+          <a:xfrm>
+            <a:off x="6526824" y="2176923"/>
+            <a:ext cx="278141" cy="0"/>
+          </a:xfrm>
+          <a:prstGeom prst="straightConnector1">
+            <a:avLst/>
+          </a:prstGeom>
+          <a:ln w="38100">
+            <a:solidFill>
+              <a:schemeClr val="accent1"/>
+            </a:solidFill>
+            <a:tailEnd type="triangle"/>
+          </a:ln>
+        </p:spPr>
+        <p:style>
+          <a:lnRef idx="1">
+            <a:schemeClr val="accent1"/>
+          </a:lnRef>
+          <a:fillRef idx="0">
+            <a:schemeClr val="accent1"/>
+          </a:fillRef>
+          <a:effectRef idx="0">
+            <a:schemeClr val="accent1"/>
+          </a:effectRef>
+          <a:fontRef idx="minor">
+            <a:schemeClr val="tx1"/>
+          </a:fontRef>
+        </p:style>
+      </p:cxnSp>
+      <p:sp>
+        <p:nvSpPr>
+          <p:cNvPr id="22" name="Rectangle 21">
+            <a:extLst>
+              <a:ext uri="{FF2B5EF4-FFF2-40B4-BE49-F238E27FC236}">
+                <a16:creationId xmlns:a16="http://schemas.microsoft.com/office/drawing/2014/main" id="{40C29E39-97EA-FC9C-7448-C86FA55CE5D6}"/>
+              </a:ext>
+            </a:extLst>
+          </p:cNvPr>
+          <p:cNvSpPr/>
+          <p:nvPr/>
+        </p:nvSpPr>
+        <p:spPr>
+          <a:xfrm>
+            <a:off x="4937876" y="1987947"/>
+            <a:ext cx="377952" cy="377952"/>
+          </a:xfrm>
+          <a:prstGeom prst="rect">
+            <a:avLst/>
+          </a:prstGeom>
+        </p:spPr>
+        <p:style>
+          <a:lnRef idx="2">
+            <a:schemeClr val="accent1">
+              <a:shade val="50000"/>
+            </a:schemeClr>
+          </a:lnRef>
+          <a:fillRef idx="1">
+            <a:schemeClr val="accent1"/>
+          </a:fillRef>
+          <a:effectRef idx="0">
+            <a:schemeClr val="accent1"/>
+          </a:effectRef>
+          <a:fontRef idx="minor">
+            <a:schemeClr val="lt1"/>
+          </a:fontRef>
+        </p:style>
+        <p:txBody>
+          <a:bodyPr rtlCol="0" anchor="ctr"/>
+          <a:lstStyle/>
+          <a:p>
+            <a:pPr algn="ctr"/>
+            <a:r>
+              <a:rPr lang="en-US" dirty="0"/>
+              <a:t>0</a:t>
+            </a:r>
+          </a:p>
+        </p:txBody>
+      </p:sp>
+      <p:sp>
+        <p:nvSpPr>
+          <p:cNvPr id="24" name="Rectangle 23">
+            <a:extLst>
+              <a:ext uri="{FF2B5EF4-FFF2-40B4-BE49-F238E27FC236}">
+                <a16:creationId xmlns:a16="http://schemas.microsoft.com/office/drawing/2014/main" id="{4730DF4F-5E8B-D7FD-D6BE-D479E5FB4005}"/>
+              </a:ext>
+            </a:extLst>
+          </p:cNvPr>
+          <p:cNvSpPr/>
+          <p:nvPr/>
+        </p:nvSpPr>
+        <p:spPr>
+          <a:xfrm>
+            <a:off x="5593969" y="1987947"/>
+            <a:ext cx="377952" cy="377952"/>
+          </a:xfrm>
+          <a:prstGeom prst="rect">
+            <a:avLst/>
+          </a:prstGeom>
+        </p:spPr>
+        <p:style>
+          <a:lnRef idx="2">
+            <a:schemeClr val="accent1">
+              <a:shade val="50000"/>
+            </a:schemeClr>
+          </a:lnRef>
+          <a:fillRef idx="1">
+            <a:schemeClr val="accent1"/>
+          </a:fillRef>
+          <a:effectRef idx="0">
+            <a:schemeClr val="accent1"/>
+          </a:effectRef>
+          <a:fontRef idx="minor">
+            <a:schemeClr val="lt1"/>
+          </a:fontRef>
+        </p:style>
+        <p:txBody>
+          <a:bodyPr rtlCol="0" anchor="ctr"/>
+          <a:lstStyle/>
+          <a:p>
+            <a:pPr algn="ctr"/>
+            <a:r>
+              <a:rPr lang="en-US" dirty="0"/>
+              <a:t>1</a:t>
+            </a:r>
+          </a:p>
+        </p:txBody>
+      </p:sp>
+      <p:sp>
+        <p:nvSpPr>
+          <p:cNvPr id="25" name="Rectangle 24">
+            <a:extLst>
+              <a:ext uri="{FF2B5EF4-FFF2-40B4-BE49-F238E27FC236}">
+                <a16:creationId xmlns:a16="http://schemas.microsoft.com/office/drawing/2014/main" id="{CB3E88F3-6A45-5B4C-B9E5-3A44F8907FBD}"/>
+              </a:ext>
+            </a:extLst>
+          </p:cNvPr>
+          <p:cNvSpPr/>
+          <p:nvPr/>
+        </p:nvSpPr>
+        <p:spPr>
+          <a:xfrm>
+            <a:off x="6804965" y="1987947"/>
+            <a:ext cx="377952" cy="377952"/>
+          </a:xfrm>
+          <a:prstGeom prst="rect">
+            <a:avLst/>
+          </a:prstGeom>
+        </p:spPr>
+        <p:style>
+          <a:lnRef idx="2">
+            <a:schemeClr val="accent1">
+              <a:shade val="50000"/>
+            </a:schemeClr>
+          </a:lnRef>
+          <a:fillRef idx="1">
+            <a:schemeClr val="accent1"/>
+          </a:fillRef>
+          <a:effectRef idx="0">
+            <a:schemeClr val="accent1"/>
+          </a:effectRef>
+          <a:fontRef idx="minor">
+            <a:schemeClr val="lt1"/>
+          </a:fontRef>
+        </p:style>
+        <p:txBody>
+          <a:bodyPr rtlCol="0" anchor="ctr"/>
+          <a:lstStyle/>
+          <a:p>
+            <a:pPr algn="ctr"/>
+            <a:r>
+              <a:rPr lang="en-US" dirty="0"/>
+              <a:t>n</a:t>
+            </a:r>
+          </a:p>
+        </p:txBody>
+      </p:sp>
+      <p:sp>
+        <p:nvSpPr>
+          <p:cNvPr id="37" name="TextBox 36">
+            <a:extLst>
+              <a:ext uri="{FF2B5EF4-FFF2-40B4-BE49-F238E27FC236}">
+                <a16:creationId xmlns:a16="http://schemas.microsoft.com/office/drawing/2014/main" id="{6936B7C9-34E6-519D-1AD6-178554331B49}"/>
+              </a:ext>
+            </a:extLst>
+          </p:cNvPr>
+          <p:cNvSpPr txBox="1"/>
+          <p:nvPr/>
+        </p:nvSpPr>
+        <p:spPr>
+          <a:xfrm>
+            <a:off x="6224800" y="1929262"/>
+            <a:ext cx="343364" cy="369332"/>
+          </a:xfrm>
+          <a:prstGeom prst="rect">
+            <a:avLst/>
+          </a:prstGeom>
+          <a:noFill/>
+        </p:spPr>
+        <p:txBody>
+          <a:bodyPr wrap="none" rtlCol="0">
+            <a:spAutoFit/>
+          </a:bodyPr>
+          <a:lstStyle/>
+          <a:p>
+            <a:r>
+              <a:rPr lang="en-US" dirty="0"/>
+              <a:t>…</a:t>
+            </a:r>
+          </a:p>
+        </p:txBody>
+      </p:sp>
+      <p:sp>
+        <p:nvSpPr>
+          <p:cNvPr id="39" name="TextBox 38">
+            <a:extLst>
+              <a:ext uri="{FF2B5EF4-FFF2-40B4-BE49-F238E27FC236}">
+                <a16:creationId xmlns:a16="http://schemas.microsoft.com/office/drawing/2014/main" id="{FF8B4FB4-6636-E821-611E-A6634937010D}"/>
+              </a:ext>
+            </a:extLst>
+          </p:cNvPr>
+          <p:cNvSpPr txBox="1"/>
+          <p:nvPr/>
+        </p:nvSpPr>
+        <p:spPr>
+          <a:xfrm>
+            <a:off x="4452986" y="1445800"/>
+            <a:ext cx="3286028" cy="369332"/>
+          </a:xfrm>
+          <a:prstGeom prst="rect">
+            <a:avLst/>
+          </a:prstGeom>
+          <a:noFill/>
+        </p:spPr>
+        <p:txBody>
+          <a:bodyPr wrap="none" rtlCol="0">
+            <a:spAutoFit/>
+          </a:bodyPr>
+          <a:lstStyle/>
+          <a:p>
+            <a:pPr algn="ctr"/>
+            <a:r>
+              <a:rPr lang="en-US" dirty="0"/>
+              <a:t>Evolving data structure over time</a:t>
+            </a:r>
+          </a:p>
+        </p:txBody>
+      </p:sp>
+      <p:sp>
+        <p:nvSpPr>
+          <p:cNvPr id="40" name="TextBox 39">
+            <a:extLst>
+              <a:ext uri="{FF2B5EF4-FFF2-40B4-BE49-F238E27FC236}">
+                <a16:creationId xmlns:a16="http://schemas.microsoft.com/office/drawing/2014/main" id="{BB806D3B-EAFB-AC9F-7FF6-1BBDA4445FFA}"/>
+              </a:ext>
+            </a:extLst>
+          </p:cNvPr>
+          <p:cNvSpPr txBox="1"/>
+          <p:nvPr/>
+        </p:nvSpPr>
+        <p:spPr>
+          <a:xfrm>
+            <a:off x="7029073" y="3603383"/>
+            <a:ext cx="770147" cy="369332"/>
+          </a:xfrm>
+          <a:prstGeom prst="rect">
+            <a:avLst/>
+          </a:prstGeom>
+          <a:noFill/>
+        </p:spPr>
+        <p:txBody>
+          <a:bodyPr wrap="none" rtlCol="0">
+            <a:spAutoFit/>
+          </a:bodyPr>
+          <a:lstStyle/>
+          <a:p>
+            <a:pPr algn="ctr"/>
+            <a:r>
+              <a:rPr lang="en-US" dirty="0"/>
+              <a:t>Deltas</a:t>
+            </a:r>
+          </a:p>
+        </p:txBody>
+      </p:sp>
+      <p:sp>
+        <p:nvSpPr>
+          <p:cNvPr id="43" name="TextBox 42">
+            <a:extLst>
+              <a:ext uri="{FF2B5EF4-FFF2-40B4-BE49-F238E27FC236}">
+                <a16:creationId xmlns:a16="http://schemas.microsoft.com/office/drawing/2014/main" id="{292286DE-73BF-2F67-6A9A-536053C832E1}"/>
+              </a:ext>
+            </a:extLst>
+          </p:cNvPr>
+          <p:cNvSpPr txBox="1"/>
+          <p:nvPr/>
+        </p:nvSpPr>
+        <p:spPr>
+          <a:xfrm>
+            <a:off x="4264759" y="3603383"/>
+            <a:ext cx="1143711" cy="369332"/>
+          </a:xfrm>
+          <a:prstGeom prst="rect">
+            <a:avLst/>
+          </a:prstGeom>
+          <a:noFill/>
+        </p:spPr>
+        <p:txBody>
+          <a:bodyPr wrap="none" rtlCol="0">
+            <a:spAutoFit/>
+          </a:bodyPr>
+          <a:lstStyle/>
+          <a:p>
+            <a:pPr algn="ctr"/>
+            <a:r>
+              <a:rPr lang="en-US" dirty="0"/>
+              <a:t>Snapshots</a:t>
+            </a:r>
+          </a:p>
+        </p:txBody>
+      </p:sp>
+      <p:sp>
+        <p:nvSpPr>
+          <p:cNvPr id="93" name="Rectangle 92">
+            <a:extLst>
+              <a:ext uri="{FF2B5EF4-FFF2-40B4-BE49-F238E27FC236}">
+                <a16:creationId xmlns:a16="http://schemas.microsoft.com/office/drawing/2014/main" id="{A1924DF7-BB86-F631-E200-B27AD2358BB0}"/>
+              </a:ext>
+            </a:extLst>
+          </p:cNvPr>
+          <p:cNvSpPr/>
+          <p:nvPr/>
+        </p:nvSpPr>
+        <p:spPr>
+          <a:xfrm>
+            <a:off x="4270189" y="1306379"/>
+            <a:ext cx="3637678" cy="1329268"/>
+          </a:xfrm>
+          <a:prstGeom prst="rect">
+            <a:avLst/>
+          </a:prstGeom>
+          <a:noFill/>
+          <a:ln>
+            <a:solidFill>
+              <a:schemeClr val="bg2">
+                <a:lumMod val="50000"/>
+              </a:schemeClr>
+            </a:solidFill>
+          </a:ln>
+        </p:spPr>
+        <p:style>
+          <a:lnRef idx="2">
+            <a:schemeClr val="accent1">
+              <a:shade val="50000"/>
+            </a:schemeClr>
+          </a:lnRef>
+          <a:fillRef idx="1">
+            <a:schemeClr val="accent1"/>
+          </a:fillRef>
+          <a:effectRef idx="0">
+            <a:schemeClr val="accent1"/>
+          </a:effectRef>
+          <a:fontRef idx="minor">
+            <a:schemeClr val="lt1"/>
+          </a:fontRef>
+        </p:style>
+        <p:txBody>
+          <a:bodyPr rtlCol="0" anchor="ctr"/>
+          <a:lstStyle/>
+          <a:p>
+            <a:pPr algn="ctr"/>
+            <a:endParaRPr lang="en-US"/>
+          </a:p>
+        </p:txBody>
+      </p:sp>
+      <p:sp>
+        <p:nvSpPr>
+          <p:cNvPr id="94" name="Rectangle 93">
+            <a:extLst>
+              <a:ext uri="{FF2B5EF4-FFF2-40B4-BE49-F238E27FC236}">
+                <a16:creationId xmlns:a16="http://schemas.microsoft.com/office/drawing/2014/main" id="{C3D50CD4-1F0A-AA6B-1249-C21B124ECAB5}"/>
+              </a:ext>
+            </a:extLst>
+          </p:cNvPr>
+          <p:cNvSpPr/>
+          <p:nvPr/>
+        </p:nvSpPr>
+        <p:spPr>
+          <a:xfrm>
+            <a:off x="6135755" y="3497749"/>
+            <a:ext cx="2556785" cy="1112958"/>
+          </a:xfrm>
+          <a:prstGeom prst="rect">
+            <a:avLst/>
+          </a:prstGeom>
+          <a:noFill/>
+          <a:ln>
+            <a:solidFill>
+              <a:schemeClr val="bg2">
+                <a:lumMod val="50000"/>
+              </a:schemeClr>
+            </a:solidFill>
+          </a:ln>
+        </p:spPr>
+        <p:style>
+          <a:lnRef idx="2">
+            <a:schemeClr val="accent1">
+              <a:shade val="50000"/>
+            </a:schemeClr>
+          </a:lnRef>
+          <a:fillRef idx="1">
+            <a:schemeClr val="accent1"/>
+          </a:fillRef>
+          <a:effectRef idx="0">
+            <a:schemeClr val="accent1"/>
+          </a:effectRef>
+          <a:fontRef idx="minor">
+            <a:schemeClr val="lt1"/>
+          </a:fontRef>
+        </p:style>
+        <p:txBody>
+          <a:bodyPr rtlCol="0" anchor="ctr"/>
+          <a:lstStyle/>
+          <a:p>
+            <a:pPr algn="ctr"/>
+            <a:endParaRPr lang="en-US"/>
+          </a:p>
+        </p:txBody>
+      </p:sp>
+      <p:sp>
+        <p:nvSpPr>
+          <p:cNvPr id="95" name="Rectangle 94">
+            <a:extLst>
+              <a:ext uri="{FF2B5EF4-FFF2-40B4-BE49-F238E27FC236}">
+                <a16:creationId xmlns:a16="http://schemas.microsoft.com/office/drawing/2014/main" id="{5A5D7FB6-1D2E-A929-D75B-927CBBD8145D}"/>
+              </a:ext>
+            </a:extLst>
+          </p:cNvPr>
+          <p:cNvSpPr/>
+          <p:nvPr/>
+        </p:nvSpPr>
+        <p:spPr>
+          <a:xfrm>
+            <a:off x="3493528" y="3497749"/>
+            <a:ext cx="2556785" cy="1112958"/>
+          </a:xfrm>
+          <a:prstGeom prst="rect">
+            <a:avLst/>
+          </a:prstGeom>
+          <a:noFill/>
+          <a:ln>
+            <a:solidFill>
+              <a:schemeClr val="bg2">
+                <a:lumMod val="50000"/>
+              </a:schemeClr>
+            </a:solidFill>
+          </a:ln>
+        </p:spPr>
+        <p:style>
+          <a:lnRef idx="2">
+            <a:schemeClr val="accent1">
+              <a:shade val="50000"/>
+            </a:schemeClr>
+          </a:lnRef>
+          <a:fillRef idx="1">
+            <a:schemeClr val="accent1"/>
+          </a:fillRef>
+          <a:effectRef idx="0">
+            <a:schemeClr val="accent1"/>
+          </a:effectRef>
+          <a:fontRef idx="minor">
+            <a:schemeClr val="lt1"/>
+          </a:fontRef>
+        </p:style>
+        <p:txBody>
+          <a:bodyPr rtlCol="0" anchor="ctr"/>
+          <a:lstStyle/>
+          <a:p>
+            <a:pPr algn="ctr"/>
+            <a:endParaRPr lang="en-US"/>
+          </a:p>
+        </p:txBody>
+      </p:sp>
+      <p:cxnSp>
+        <p:nvCxnSpPr>
+          <p:cNvPr id="4" name="Straight Arrow Connector 3">
+            <a:extLst>
+              <a:ext uri="{FF2B5EF4-FFF2-40B4-BE49-F238E27FC236}">
+                <a16:creationId xmlns:a16="http://schemas.microsoft.com/office/drawing/2014/main" id="{D813B4C4-F1B5-7C26-33EF-DF7E692D160E}"/>
+              </a:ext>
+            </a:extLst>
+          </p:cNvPr>
+          <p:cNvCxnSpPr>
+            <a:cxnSpLocks/>
+          </p:cNvCxnSpPr>
+          <p:nvPr/>
+        </p:nvCxnSpPr>
+        <p:spPr>
+          <a:xfrm>
+            <a:off x="4697545" y="4272330"/>
+            <a:ext cx="278141" cy="0"/>
+          </a:xfrm>
+          <a:prstGeom prst="straightConnector1">
+            <a:avLst/>
+          </a:prstGeom>
+          <a:ln w="38100">
+            <a:solidFill>
+              <a:schemeClr val="bg2">
+                <a:lumMod val="90000"/>
+              </a:schemeClr>
+            </a:solidFill>
+            <a:tailEnd type="triangle"/>
+          </a:ln>
+        </p:spPr>
+        <p:style>
+          <a:lnRef idx="1">
+            <a:schemeClr val="accent1"/>
+          </a:lnRef>
+          <a:fillRef idx="0">
+            <a:schemeClr val="accent1"/>
+          </a:fillRef>
+          <a:effectRef idx="0">
+            <a:schemeClr val="accent1"/>
+          </a:effectRef>
+          <a:fontRef idx="minor">
+            <a:schemeClr val="tx1"/>
+          </a:fontRef>
+        </p:style>
+      </p:cxnSp>
+      <p:cxnSp>
+        <p:nvCxnSpPr>
+          <p:cNvPr id="5" name="Straight Arrow Connector 4">
+            <a:extLst>
+              <a:ext uri="{FF2B5EF4-FFF2-40B4-BE49-F238E27FC236}">
+                <a16:creationId xmlns:a16="http://schemas.microsoft.com/office/drawing/2014/main" id="{3DD295ED-3273-4F1E-ABBB-ECAB07ECFC88}"/>
+              </a:ext>
+            </a:extLst>
+          </p:cNvPr>
+          <p:cNvCxnSpPr>
+            <a:cxnSpLocks/>
+          </p:cNvCxnSpPr>
+          <p:nvPr/>
+        </p:nvCxnSpPr>
+        <p:spPr>
+          <a:xfrm>
+            <a:off x="4043016" y="4272330"/>
+            <a:ext cx="278141" cy="0"/>
+          </a:xfrm>
+          <a:prstGeom prst="straightConnector1">
+            <a:avLst/>
+          </a:prstGeom>
+          <a:ln w="38100">
+            <a:solidFill>
+              <a:schemeClr val="bg2">
+                <a:lumMod val="90000"/>
+              </a:schemeClr>
+            </a:solidFill>
+            <a:tailEnd type="triangle"/>
+          </a:ln>
+        </p:spPr>
+        <p:style>
+          <a:lnRef idx="1">
+            <a:schemeClr val="accent1"/>
+          </a:lnRef>
+          <a:fillRef idx="0">
+            <a:schemeClr val="accent1"/>
+          </a:fillRef>
+          <a:effectRef idx="0">
+            <a:schemeClr val="accent1"/>
+          </a:effectRef>
+          <a:fontRef idx="minor">
+            <a:schemeClr val="tx1"/>
+          </a:fontRef>
+        </p:style>
+      </p:cxnSp>
+      <p:cxnSp>
+        <p:nvCxnSpPr>
+          <p:cNvPr id="6" name="Straight Arrow Connector 5">
+            <a:extLst>
+              <a:ext uri="{FF2B5EF4-FFF2-40B4-BE49-F238E27FC236}">
+                <a16:creationId xmlns:a16="http://schemas.microsoft.com/office/drawing/2014/main" id="{C2BBC269-83EE-2F6A-711A-F3D9AE59F1E2}"/>
+              </a:ext>
+            </a:extLst>
+          </p:cNvPr>
+          <p:cNvCxnSpPr>
+            <a:cxnSpLocks/>
+          </p:cNvCxnSpPr>
+          <p:nvPr/>
+        </p:nvCxnSpPr>
+        <p:spPr>
+          <a:xfrm>
+            <a:off x="5249818" y="4272330"/>
+            <a:ext cx="278141" cy="0"/>
+          </a:xfrm>
+          <a:prstGeom prst="straightConnector1">
+            <a:avLst/>
+          </a:prstGeom>
+          <a:ln w="38100">
+            <a:solidFill>
+              <a:schemeClr val="bg2">
+                <a:lumMod val="90000"/>
+              </a:schemeClr>
+            </a:solidFill>
+            <a:tailEnd type="triangle"/>
+          </a:ln>
+        </p:spPr>
+        <p:style>
+          <a:lnRef idx="1">
+            <a:schemeClr val="accent1"/>
+          </a:lnRef>
+          <a:fillRef idx="0">
+            <a:schemeClr val="accent1"/>
+          </a:fillRef>
+          <a:effectRef idx="0">
+            <a:schemeClr val="accent1"/>
+          </a:effectRef>
+          <a:fontRef idx="minor">
+            <a:schemeClr val="tx1"/>
+          </a:fontRef>
+        </p:style>
+      </p:cxnSp>
+      <p:sp>
+        <p:nvSpPr>
+          <p:cNvPr id="7" name="Rectangle 6">
+            <a:extLst>
+              <a:ext uri="{FF2B5EF4-FFF2-40B4-BE49-F238E27FC236}">
+                <a16:creationId xmlns:a16="http://schemas.microsoft.com/office/drawing/2014/main" id="{21EAA329-7C9C-7126-BDDB-2394C60A59A7}"/>
+              </a:ext>
+            </a:extLst>
+          </p:cNvPr>
+          <p:cNvSpPr/>
+          <p:nvPr/>
+        </p:nvSpPr>
+        <p:spPr>
+          <a:xfrm>
+            <a:off x="3660870" y="4083354"/>
+            <a:ext cx="377952" cy="377952"/>
+          </a:xfrm>
+          <a:prstGeom prst="rect">
+            <a:avLst/>
+          </a:prstGeom>
+        </p:spPr>
+        <p:style>
+          <a:lnRef idx="2">
+            <a:schemeClr val="accent1">
+              <a:shade val="50000"/>
+            </a:schemeClr>
+          </a:lnRef>
+          <a:fillRef idx="1">
+            <a:schemeClr val="accent1"/>
+          </a:fillRef>
+          <a:effectRef idx="0">
+            <a:schemeClr val="accent1"/>
+          </a:effectRef>
+          <a:fontRef idx="minor">
+            <a:schemeClr val="lt1"/>
+          </a:fontRef>
+        </p:style>
+        <p:txBody>
+          <a:bodyPr rtlCol="0" anchor="ctr"/>
+          <a:lstStyle/>
+          <a:p>
+            <a:pPr algn="ctr"/>
+            <a:r>
+              <a:rPr lang="en-US" dirty="0"/>
+              <a:t>0</a:t>
+            </a:r>
+          </a:p>
+        </p:txBody>
+      </p:sp>
+      <p:sp>
+        <p:nvSpPr>
+          <p:cNvPr id="8" name="Rectangle 7">
+            <a:extLst>
+              <a:ext uri="{FF2B5EF4-FFF2-40B4-BE49-F238E27FC236}">
+                <a16:creationId xmlns:a16="http://schemas.microsoft.com/office/drawing/2014/main" id="{4EAC4F71-3052-F2E8-433B-C0C037D31A50}"/>
+              </a:ext>
+            </a:extLst>
+          </p:cNvPr>
+          <p:cNvSpPr/>
+          <p:nvPr/>
+        </p:nvSpPr>
+        <p:spPr>
+          <a:xfrm>
+            <a:off x="4316963" y="4083354"/>
+            <a:ext cx="377952" cy="377952"/>
+          </a:xfrm>
+          <a:prstGeom prst="rect">
+            <a:avLst/>
+          </a:prstGeom>
+        </p:spPr>
+        <p:style>
+          <a:lnRef idx="2">
+            <a:schemeClr val="accent1">
+              <a:shade val="50000"/>
+            </a:schemeClr>
+          </a:lnRef>
+          <a:fillRef idx="1">
+            <a:schemeClr val="accent1"/>
+          </a:fillRef>
+          <a:effectRef idx="0">
+            <a:schemeClr val="accent1"/>
+          </a:effectRef>
+          <a:fontRef idx="minor">
+            <a:schemeClr val="lt1"/>
+          </a:fontRef>
+        </p:style>
+        <p:txBody>
+          <a:bodyPr rtlCol="0" anchor="ctr"/>
+          <a:lstStyle/>
+          <a:p>
+            <a:pPr algn="ctr"/>
+            <a:r>
+              <a:rPr lang="en-US" dirty="0"/>
+              <a:t>1</a:t>
+            </a:r>
+          </a:p>
+        </p:txBody>
+      </p:sp>
+      <p:sp>
+        <p:nvSpPr>
+          <p:cNvPr id="9" name="Rectangle 8">
+            <a:extLst>
+              <a:ext uri="{FF2B5EF4-FFF2-40B4-BE49-F238E27FC236}">
+                <a16:creationId xmlns:a16="http://schemas.microsoft.com/office/drawing/2014/main" id="{EECD5507-333C-C6A6-5175-D0BA55ACD234}"/>
+              </a:ext>
+            </a:extLst>
+          </p:cNvPr>
+          <p:cNvSpPr/>
+          <p:nvPr/>
+        </p:nvSpPr>
+        <p:spPr>
+          <a:xfrm>
+            <a:off x="5527959" y="4083354"/>
+            <a:ext cx="377952" cy="377952"/>
+          </a:xfrm>
+          <a:prstGeom prst="rect">
+            <a:avLst/>
+          </a:prstGeom>
+        </p:spPr>
+        <p:style>
+          <a:lnRef idx="2">
+            <a:schemeClr val="accent1">
+              <a:shade val="50000"/>
+            </a:schemeClr>
+          </a:lnRef>
+          <a:fillRef idx="1">
+            <a:schemeClr val="accent1"/>
+          </a:fillRef>
+          <a:effectRef idx="0">
+            <a:schemeClr val="accent1"/>
+          </a:effectRef>
+          <a:fontRef idx="minor">
+            <a:schemeClr val="lt1"/>
+          </a:fontRef>
+        </p:style>
+        <p:txBody>
+          <a:bodyPr rtlCol="0" anchor="ctr"/>
+          <a:lstStyle/>
+          <a:p>
+            <a:pPr algn="ctr"/>
+            <a:r>
+              <a:rPr lang="en-US" dirty="0"/>
+              <a:t>n</a:t>
+            </a:r>
+          </a:p>
+        </p:txBody>
+      </p:sp>
+      <p:sp>
+        <p:nvSpPr>
+          <p:cNvPr id="10" name="TextBox 9">
+            <a:extLst>
+              <a:ext uri="{FF2B5EF4-FFF2-40B4-BE49-F238E27FC236}">
+                <a16:creationId xmlns:a16="http://schemas.microsoft.com/office/drawing/2014/main" id="{872A3E8B-9B91-20BF-EAD6-02EF137FA3CA}"/>
+              </a:ext>
+            </a:extLst>
+          </p:cNvPr>
+          <p:cNvSpPr txBox="1"/>
+          <p:nvPr/>
+        </p:nvSpPr>
+        <p:spPr>
+          <a:xfrm>
+            <a:off x="4947794" y="4024669"/>
+            <a:ext cx="343364" cy="369332"/>
+          </a:xfrm>
+          <a:prstGeom prst="rect">
+            <a:avLst/>
+          </a:prstGeom>
+          <a:noFill/>
+        </p:spPr>
+        <p:txBody>
+          <a:bodyPr wrap="none" rtlCol="0">
+            <a:spAutoFit/>
+          </a:bodyPr>
+          <a:lstStyle/>
+          <a:p>
+            <a:r>
+              <a:rPr lang="en-US" dirty="0"/>
+              <a:t>…</a:t>
+            </a:r>
+          </a:p>
+        </p:txBody>
+      </p:sp>
+      <p:cxnSp>
+        <p:nvCxnSpPr>
+          <p:cNvPr id="11" name="Straight Arrow Connector 10">
+            <a:extLst>
+              <a:ext uri="{FF2B5EF4-FFF2-40B4-BE49-F238E27FC236}">
+                <a16:creationId xmlns:a16="http://schemas.microsoft.com/office/drawing/2014/main" id="{87AE162F-56A2-1CAA-6D7E-BE387ECA7492}"/>
+              </a:ext>
+            </a:extLst>
+          </p:cNvPr>
+          <p:cNvCxnSpPr>
+            <a:cxnSpLocks/>
+          </p:cNvCxnSpPr>
+          <p:nvPr/>
+        </p:nvCxnSpPr>
+        <p:spPr>
+          <a:xfrm>
+            <a:off x="7324962" y="4267326"/>
+            <a:ext cx="278141" cy="0"/>
+          </a:xfrm>
+          <a:prstGeom prst="straightConnector1">
+            <a:avLst/>
+          </a:prstGeom>
+          <a:ln w="38100">
+            <a:solidFill>
+              <a:schemeClr val="accent1"/>
+            </a:solidFill>
+            <a:tailEnd type="triangle"/>
+          </a:ln>
+        </p:spPr>
+        <p:style>
+          <a:lnRef idx="1">
+            <a:schemeClr val="accent1"/>
+          </a:lnRef>
+          <a:fillRef idx="0">
+            <a:schemeClr val="accent1"/>
+          </a:fillRef>
+          <a:effectRef idx="0">
+            <a:schemeClr val="accent1"/>
+          </a:effectRef>
+          <a:fontRef idx="minor">
+            <a:schemeClr val="tx1"/>
+          </a:fontRef>
+        </p:style>
+      </p:cxnSp>
+      <p:cxnSp>
+        <p:nvCxnSpPr>
+          <p:cNvPr id="12" name="Straight Arrow Connector 11">
+            <a:extLst>
+              <a:ext uri="{FF2B5EF4-FFF2-40B4-BE49-F238E27FC236}">
+                <a16:creationId xmlns:a16="http://schemas.microsoft.com/office/drawing/2014/main" id="{D3A2C78E-20E6-6C66-0F38-A035EBC8362F}"/>
+              </a:ext>
+            </a:extLst>
+          </p:cNvPr>
+          <p:cNvCxnSpPr>
+            <a:cxnSpLocks/>
+          </p:cNvCxnSpPr>
+          <p:nvPr/>
+        </p:nvCxnSpPr>
+        <p:spPr>
+          <a:xfrm>
+            <a:off x="6670433" y="4267326"/>
+            <a:ext cx="278141" cy="0"/>
+          </a:xfrm>
+          <a:prstGeom prst="straightConnector1">
+            <a:avLst/>
+          </a:prstGeom>
+          <a:ln w="38100">
+            <a:solidFill>
+              <a:schemeClr val="accent1"/>
+            </a:solidFill>
+            <a:tailEnd type="triangle"/>
+          </a:ln>
+        </p:spPr>
+        <p:style>
+          <a:lnRef idx="1">
+            <a:schemeClr val="accent1"/>
+          </a:lnRef>
+          <a:fillRef idx="0">
+            <a:schemeClr val="accent1"/>
+          </a:fillRef>
+          <a:effectRef idx="0">
+            <a:schemeClr val="accent1"/>
+          </a:effectRef>
+          <a:fontRef idx="minor">
+            <a:schemeClr val="tx1"/>
+          </a:fontRef>
+        </p:style>
+      </p:cxnSp>
+      <p:cxnSp>
+        <p:nvCxnSpPr>
+          <p:cNvPr id="14" name="Straight Arrow Connector 13">
+            <a:extLst>
+              <a:ext uri="{FF2B5EF4-FFF2-40B4-BE49-F238E27FC236}">
+                <a16:creationId xmlns:a16="http://schemas.microsoft.com/office/drawing/2014/main" id="{2D5F2C43-2BFA-0A5C-2A51-71016A0F5D67}"/>
+              </a:ext>
+            </a:extLst>
+          </p:cNvPr>
+          <p:cNvCxnSpPr>
+            <a:cxnSpLocks/>
+          </p:cNvCxnSpPr>
+          <p:nvPr/>
+        </p:nvCxnSpPr>
+        <p:spPr>
+          <a:xfrm>
+            <a:off x="7877235" y="4267326"/>
+            <a:ext cx="278141" cy="0"/>
+          </a:xfrm>
+          <a:prstGeom prst="straightConnector1">
+            <a:avLst/>
+          </a:prstGeom>
+          <a:ln w="38100">
+            <a:solidFill>
+              <a:schemeClr val="accent1"/>
+            </a:solidFill>
+            <a:tailEnd type="triangle"/>
+          </a:ln>
+        </p:spPr>
+        <p:style>
+          <a:lnRef idx="1">
+            <a:schemeClr val="accent1"/>
+          </a:lnRef>
+          <a:fillRef idx="0">
+            <a:schemeClr val="accent1"/>
+          </a:fillRef>
+          <a:effectRef idx="0">
+            <a:schemeClr val="accent1"/>
+          </a:effectRef>
+          <a:fontRef idx="minor">
+            <a:schemeClr val="tx1"/>
+          </a:fontRef>
+        </p:style>
+      </p:cxnSp>
+      <p:sp>
+        <p:nvSpPr>
+          <p:cNvPr id="15" name="Rectangle 14">
+            <a:extLst>
+              <a:ext uri="{FF2B5EF4-FFF2-40B4-BE49-F238E27FC236}">
+                <a16:creationId xmlns:a16="http://schemas.microsoft.com/office/drawing/2014/main" id="{245C9B72-4575-6BE2-8C7F-1EC209F8272C}"/>
+              </a:ext>
+            </a:extLst>
+          </p:cNvPr>
+          <p:cNvSpPr/>
+          <p:nvPr/>
+        </p:nvSpPr>
+        <p:spPr>
+          <a:xfrm>
+            <a:off x="6288287" y="4078350"/>
+            <a:ext cx="377952" cy="377952"/>
+          </a:xfrm>
+          <a:prstGeom prst="rect">
+            <a:avLst/>
+          </a:prstGeom>
+          <a:solidFill>
+            <a:schemeClr val="bg2">
+              <a:lumMod val="90000"/>
+            </a:schemeClr>
+          </a:solidFill>
+          <a:ln>
+            <a:solidFill>
+              <a:schemeClr val="bg2">
+                <a:lumMod val="75000"/>
+              </a:schemeClr>
+            </a:solidFill>
+          </a:ln>
+        </p:spPr>
+        <p:style>
+          <a:lnRef idx="2">
+            <a:schemeClr val="accent1">
+              <a:shade val="50000"/>
+            </a:schemeClr>
+          </a:lnRef>
+          <a:fillRef idx="1">
+            <a:schemeClr val="accent1"/>
+          </a:fillRef>
+          <a:effectRef idx="0">
+            <a:schemeClr val="accent1"/>
+          </a:effectRef>
+          <a:fontRef idx="minor">
+            <a:schemeClr val="lt1"/>
+          </a:fontRef>
+        </p:style>
+        <p:txBody>
+          <a:bodyPr rtlCol="0" anchor="ctr"/>
+          <a:lstStyle/>
+          <a:p>
+            <a:pPr algn="ctr"/>
+            <a:r>
+              <a:rPr lang="en-US" dirty="0"/>
+              <a:t>0</a:t>
+            </a:r>
+          </a:p>
+        </p:txBody>
+      </p:sp>
+      <p:sp>
+        <p:nvSpPr>
+          <p:cNvPr id="17" name="Rectangle 16">
+            <a:extLst>
+              <a:ext uri="{FF2B5EF4-FFF2-40B4-BE49-F238E27FC236}">
+                <a16:creationId xmlns:a16="http://schemas.microsoft.com/office/drawing/2014/main" id="{C5C8A764-E469-D29A-D580-4402AE288B81}"/>
+              </a:ext>
+            </a:extLst>
+          </p:cNvPr>
+          <p:cNvSpPr/>
+          <p:nvPr/>
+        </p:nvSpPr>
+        <p:spPr>
+          <a:xfrm>
+            <a:off x="6944380" y="4078350"/>
+            <a:ext cx="377952" cy="377952"/>
+          </a:xfrm>
+          <a:prstGeom prst="rect">
+            <a:avLst/>
+          </a:prstGeom>
+          <a:solidFill>
+            <a:schemeClr val="bg2">
+              <a:lumMod val="90000"/>
+            </a:schemeClr>
+          </a:solidFill>
+          <a:ln>
+            <a:solidFill>
+              <a:schemeClr val="bg2">
+                <a:lumMod val="75000"/>
+              </a:schemeClr>
+            </a:solidFill>
+          </a:ln>
+        </p:spPr>
+        <p:style>
+          <a:lnRef idx="2">
+            <a:schemeClr val="accent1">
+              <a:shade val="50000"/>
+            </a:schemeClr>
+          </a:lnRef>
+          <a:fillRef idx="1">
+            <a:schemeClr val="accent1"/>
+          </a:fillRef>
+          <a:effectRef idx="0">
+            <a:schemeClr val="accent1"/>
+          </a:effectRef>
+          <a:fontRef idx="minor">
+            <a:schemeClr val="lt1"/>
+          </a:fontRef>
+        </p:style>
+        <p:txBody>
+          <a:bodyPr rtlCol="0" anchor="ctr"/>
+          <a:lstStyle/>
+          <a:p>
+            <a:pPr algn="ctr"/>
+            <a:r>
+              <a:rPr lang="en-US" dirty="0"/>
+              <a:t>1</a:t>
+            </a:r>
+          </a:p>
+        </p:txBody>
+      </p:sp>
+      <p:sp>
+        <p:nvSpPr>
+          <p:cNvPr id="18" name="Rectangle 17">
+            <a:extLst>
+              <a:ext uri="{FF2B5EF4-FFF2-40B4-BE49-F238E27FC236}">
+                <a16:creationId xmlns:a16="http://schemas.microsoft.com/office/drawing/2014/main" id="{65309EF9-0F92-47DB-7B58-908872A3F361}"/>
+              </a:ext>
+            </a:extLst>
+          </p:cNvPr>
+          <p:cNvSpPr/>
+          <p:nvPr/>
+        </p:nvSpPr>
+        <p:spPr>
+          <a:xfrm>
+            <a:off x="8155376" y="4078350"/>
+            <a:ext cx="377952" cy="377952"/>
+          </a:xfrm>
+          <a:prstGeom prst="rect">
+            <a:avLst/>
+          </a:prstGeom>
+          <a:solidFill>
+            <a:schemeClr val="bg2">
+              <a:lumMod val="90000"/>
+            </a:schemeClr>
+          </a:solidFill>
+          <a:ln>
+            <a:solidFill>
+              <a:schemeClr val="bg2">
+                <a:lumMod val="75000"/>
+              </a:schemeClr>
+            </a:solidFill>
+          </a:ln>
+        </p:spPr>
+        <p:style>
+          <a:lnRef idx="2">
+            <a:schemeClr val="accent1">
+              <a:shade val="50000"/>
+            </a:schemeClr>
+          </a:lnRef>
+          <a:fillRef idx="1">
+            <a:schemeClr val="accent1"/>
+          </a:fillRef>
+          <a:effectRef idx="0">
+            <a:schemeClr val="accent1"/>
+          </a:effectRef>
+          <a:fontRef idx="minor">
+            <a:schemeClr val="lt1"/>
+          </a:fontRef>
+        </p:style>
+        <p:txBody>
+          <a:bodyPr rtlCol="0" anchor="ctr"/>
+          <a:lstStyle/>
+          <a:p>
+            <a:pPr algn="ctr"/>
+            <a:r>
+              <a:rPr lang="en-US" dirty="0"/>
+              <a:t>n</a:t>
+            </a:r>
+          </a:p>
+        </p:txBody>
+      </p:sp>
+      <p:sp>
+        <p:nvSpPr>
+          <p:cNvPr id="19" name="TextBox 18">
+            <a:extLst>
+              <a:ext uri="{FF2B5EF4-FFF2-40B4-BE49-F238E27FC236}">
+                <a16:creationId xmlns:a16="http://schemas.microsoft.com/office/drawing/2014/main" id="{F0D01D4B-FFC3-4E93-633A-5C757DDF0628}"/>
+              </a:ext>
+            </a:extLst>
+          </p:cNvPr>
+          <p:cNvSpPr txBox="1"/>
+          <p:nvPr/>
+        </p:nvSpPr>
+        <p:spPr>
+          <a:xfrm>
+            <a:off x="7575211" y="4019665"/>
+            <a:ext cx="343364" cy="369332"/>
+          </a:xfrm>
+          <a:prstGeom prst="rect">
+            <a:avLst/>
+          </a:prstGeom>
+          <a:noFill/>
+        </p:spPr>
+        <p:txBody>
+          <a:bodyPr wrap="none" rtlCol="0">
+            <a:spAutoFit/>
+          </a:bodyPr>
+          <a:lstStyle/>
+          <a:p>
+            <a:r>
+              <a:rPr lang="en-US" dirty="0"/>
+              <a:t>…</a:t>
+            </a:r>
+          </a:p>
+        </p:txBody>
+      </p:sp>
+      <p:cxnSp>
+        <p:nvCxnSpPr>
+          <p:cNvPr id="33" name="Straight Connector 32">
+            <a:extLst>
+              <a:ext uri="{FF2B5EF4-FFF2-40B4-BE49-F238E27FC236}">
+                <a16:creationId xmlns:a16="http://schemas.microsoft.com/office/drawing/2014/main" id="{8ECB1C98-EEF9-ACBB-81C4-D794BFDF5D15}"/>
+              </a:ext>
+            </a:extLst>
+          </p:cNvPr>
+          <p:cNvCxnSpPr>
+            <a:stCxn id="93" idx="2"/>
+            <a:endCxn id="95" idx="0"/>
+          </p:cNvCxnSpPr>
+          <p:nvPr/>
+        </p:nvCxnSpPr>
+        <p:spPr>
+          <a:xfrm flipH="1">
+            <a:off x="4771921" y="2635647"/>
+            <a:ext cx="1317107" cy="862102"/>
+          </a:xfrm>
+          <a:prstGeom prst="line">
+            <a:avLst/>
+          </a:prstGeom>
+          <a:ln w="12700">
+            <a:solidFill>
+              <a:schemeClr val="bg2">
+                <a:lumMod val="75000"/>
+              </a:schemeClr>
+            </a:solidFill>
+            <a:prstDash val="sysDash"/>
+          </a:ln>
+        </p:spPr>
+        <p:style>
+          <a:lnRef idx="1">
+            <a:schemeClr val="accent1"/>
+          </a:lnRef>
+          <a:fillRef idx="0">
+            <a:schemeClr val="accent1"/>
+          </a:fillRef>
+          <a:effectRef idx="0">
+            <a:schemeClr val="accent1"/>
+          </a:effectRef>
+          <a:fontRef idx="minor">
+            <a:schemeClr val="tx1"/>
+          </a:fontRef>
+        </p:style>
+      </p:cxnSp>
+      <p:cxnSp>
+        <p:nvCxnSpPr>
+          <p:cNvPr id="34" name="Straight Connector 33">
+            <a:extLst>
+              <a:ext uri="{FF2B5EF4-FFF2-40B4-BE49-F238E27FC236}">
+                <a16:creationId xmlns:a16="http://schemas.microsoft.com/office/drawing/2014/main" id="{AECE9A8A-C49C-99FF-FED9-AE764ECF99E7}"/>
+              </a:ext>
+            </a:extLst>
+          </p:cNvPr>
+          <p:cNvCxnSpPr>
+            <a:cxnSpLocks/>
+            <a:stCxn id="93" idx="2"/>
+            <a:endCxn id="94" idx="0"/>
+          </p:cNvCxnSpPr>
+          <p:nvPr/>
+        </p:nvCxnSpPr>
+        <p:spPr>
+          <a:xfrm>
+            <a:off x="6089028" y="2635647"/>
+            <a:ext cx="1325120" cy="862102"/>
+          </a:xfrm>
+          <a:prstGeom prst="line">
+            <a:avLst/>
+          </a:prstGeom>
+          <a:ln w="12700">
+            <a:solidFill>
+              <a:schemeClr val="bg2">
+                <a:lumMod val="75000"/>
+              </a:schemeClr>
+            </a:solidFill>
+            <a:prstDash val="sysDash"/>
+          </a:ln>
+        </p:spPr>
+        <p:style>
+          <a:lnRef idx="1">
+            <a:schemeClr val="accent1"/>
+          </a:lnRef>
+          <a:fillRef idx="0">
+            <a:schemeClr val="accent1"/>
+          </a:fillRef>
+          <a:effectRef idx="0">
+            <a:schemeClr val="accent1"/>
+          </a:effectRef>
+          <a:fontRef idx="minor">
+            <a:schemeClr val="tx1"/>
+          </a:fontRef>
+        </p:style>
+      </p:cxnSp>
+    </p:spTree>
+    <p:extLst>
+      <p:ext uri="{BB962C8B-B14F-4D97-AF65-F5344CB8AC3E}">
+        <p14:creationId xmlns:p14="http://schemas.microsoft.com/office/powerpoint/2010/main" val="877232573"/>
+      </p:ext>
+    </p:extLst>
+  </p:cSld>
+  <p:clrMapOvr>
+    <a:masterClrMapping/>
+  </p:clrMapOvr>
+</p:sld>
+</file>
+
 <file path=ppt/theme/theme1.xml><?xml version="1.0" encoding="utf-8"?>
 <a:theme xmlns:a="http://schemas.openxmlformats.org/drawingml/2006/main" name="Office Theme">
   <a:themeElements>

</xml_diff>

<commit_message>
refinements for getting ready for the first release
</commit_message>
<xml_diff>
--- a/paper/images/graphics.pptx
+++ b/paper/images/graphics.pptx
@@ -8,6 +8,7 @@
     <p:sldId id="257" r:id="rId2"/>
     <p:sldId id="258" r:id="rId3"/>
     <p:sldId id="259" r:id="rId4"/>
+    <p:sldId id="260" r:id="rId5"/>
   </p:sldIdLst>
   <p:sldSz cx="12192000" cy="6858000"/>
   <p:notesSz cx="6858000" cy="9144000"/>
@@ -261,7 +262,7 @@
           <a:p>
             <a:fld id="{9F92018D-9D2C-0947-ADF2-96E7FE53AC27}" type="datetimeFigureOut">
               <a:rPr lang="en-US" smtClean="0"/>
-              <a:t>2/5/25</a:t>
+              <a:t>2/11/25</a:t>
             </a:fld>
             <a:endParaRPr lang="en-US"/>
           </a:p>
@@ -459,7 +460,7 @@
           <a:p>
             <a:fld id="{9F92018D-9D2C-0947-ADF2-96E7FE53AC27}" type="datetimeFigureOut">
               <a:rPr lang="en-US" smtClean="0"/>
-              <a:t>2/5/25</a:t>
+              <a:t>2/11/25</a:t>
             </a:fld>
             <a:endParaRPr lang="en-US"/>
           </a:p>
@@ -667,7 +668,7 @@
           <a:p>
             <a:fld id="{9F92018D-9D2C-0947-ADF2-96E7FE53AC27}" type="datetimeFigureOut">
               <a:rPr lang="en-US" smtClean="0"/>
-              <a:t>2/5/25</a:t>
+              <a:t>2/11/25</a:t>
             </a:fld>
             <a:endParaRPr lang="en-US"/>
           </a:p>
@@ -865,7 +866,7 @@
           <a:p>
             <a:fld id="{9F92018D-9D2C-0947-ADF2-96E7FE53AC27}" type="datetimeFigureOut">
               <a:rPr lang="en-US" smtClean="0"/>
-              <a:t>2/5/25</a:t>
+              <a:t>2/11/25</a:t>
             </a:fld>
             <a:endParaRPr lang="en-US"/>
           </a:p>
@@ -1140,7 +1141,7 @@
           <a:p>
             <a:fld id="{9F92018D-9D2C-0947-ADF2-96E7FE53AC27}" type="datetimeFigureOut">
               <a:rPr lang="en-US" smtClean="0"/>
-              <a:t>2/5/25</a:t>
+              <a:t>2/11/25</a:t>
             </a:fld>
             <a:endParaRPr lang="en-US"/>
           </a:p>
@@ -1405,7 +1406,7 @@
           <a:p>
             <a:fld id="{9F92018D-9D2C-0947-ADF2-96E7FE53AC27}" type="datetimeFigureOut">
               <a:rPr lang="en-US" smtClean="0"/>
-              <a:t>2/5/25</a:t>
+              <a:t>2/11/25</a:t>
             </a:fld>
             <a:endParaRPr lang="en-US"/>
           </a:p>
@@ -1817,7 +1818,7 @@
           <a:p>
             <a:fld id="{9F92018D-9D2C-0947-ADF2-96E7FE53AC27}" type="datetimeFigureOut">
               <a:rPr lang="en-US" smtClean="0"/>
-              <a:t>2/5/25</a:t>
+              <a:t>2/11/25</a:t>
             </a:fld>
             <a:endParaRPr lang="en-US"/>
           </a:p>
@@ -1958,7 +1959,7 @@
           <a:p>
             <a:fld id="{9F92018D-9D2C-0947-ADF2-96E7FE53AC27}" type="datetimeFigureOut">
               <a:rPr lang="en-US" smtClean="0"/>
-              <a:t>2/5/25</a:t>
+              <a:t>2/11/25</a:t>
             </a:fld>
             <a:endParaRPr lang="en-US"/>
           </a:p>
@@ -2071,7 +2072,7 @@
           <a:p>
             <a:fld id="{9F92018D-9D2C-0947-ADF2-96E7FE53AC27}" type="datetimeFigureOut">
               <a:rPr lang="en-US" smtClean="0"/>
-              <a:t>2/5/25</a:t>
+              <a:t>2/11/25</a:t>
             </a:fld>
             <a:endParaRPr lang="en-US"/>
           </a:p>
@@ -2382,7 +2383,7 @@
           <a:p>
             <a:fld id="{9F92018D-9D2C-0947-ADF2-96E7FE53AC27}" type="datetimeFigureOut">
               <a:rPr lang="en-US" smtClean="0"/>
-              <a:t>2/5/25</a:t>
+              <a:t>2/11/25</a:t>
             </a:fld>
             <a:endParaRPr lang="en-US"/>
           </a:p>
@@ -2670,7 +2671,7 @@
           <a:p>
             <a:fld id="{9F92018D-9D2C-0947-ADF2-96E7FE53AC27}" type="datetimeFigureOut">
               <a:rPr lang="en-US" smtClean="0"/>
-              <a:t>2/5/25</a:t>
+              <a:t>2/11/25</a:t>
             </a:fld>
             <a:endParaRPr lang="en-US"/>
           </a:p>
@@ -2911,7 +2912,7 @@
           <a:p>
             <a:fld id="{9F92018D-9D2C-0947-ADF2-96E7FE53AC27}" type="datetimeFigureOut">
               <a:rPr lang="en-US" smtClean="0"/>
-              <a:t>2/5/25</a:t>
+              <a:t>2/11/25</a:t>
             </a:fld>
             <a:endParaRPr lang="en-US"/>
           </a:p>
@@ -8760,6 +8761,1386 @@
 </p:sld>
 </file>
 
+<file path=ppt/slides/slide4.xml><?xml version="1.0" encoding="utf-8"?>
+<p:sld xmlns:a="http://schemas.openxmlformats.org/drawingml/2006/main" xmlns:r="http://schemas.openxmlformats.org/officeDocument/2006/relationships" xmlns:p="http://schemas.openxmlformats.org/presentationml/2006/main">
+  <p:cSld>
+    <p:spTree>
+      <p:nvGrpSpPr>
+        <p:cNvPr id="1" name=""/>
+        <p:cNvGrpSpPr/>
+        <p:nvPr/>
+      </p:nvGrpSpPr>
+      <p:grpSpPr>
+        <a:xfrm>
+          <a:off x="0" y="0"/>
+          <a:ext cx="0" cy="0"/>
+          <a:chOff x="0" y="0"/>
+          <a:chExt cx="0" cy="0"/>
+        </a:xfrm>
+      </p:grpSpPr>
+      <p:cxnSp>
+        <p:nvCxnSpPr>
+          <p:cNvPr id="13" name="Straight Arrow Connector 12">
+            <a:extLst>
+              <a:ext uri="{FF2B5EF4-FFF2-40B4-BE49-F238E27FC236}">
+                <a16:creationId xmlns:a16="http://schemas.microsoft.com/office/drawing/2014/main" id="{4CF771E9-B049-9A0D-DFBC-E15B23DF4845}"/>
+              </a:ext>
+            </a:extLst>
+          </p:cNvPr>
+          <p:cNvCxnSpPr>
+            <a:cxnSpLocks/>
+          </p:cNvCxnSpPr>
+          <p:nvPr/>
+        </p:nvCxnSpPr>
+        <p:spPr>
+          <a:xfrm>
+            <a:off x="5974551" y="2176923"/>
+            <a:ext cx="278141" cy="0"/>
+          </a:xfrm>
+          <a:prstGeom prst="straightConnector1">
+            <a:avLst/>
+          </a:prstGeom>
+          <a:ln w="38100">
+            <a:solidFill>
+              <a:schemeClr val="accent1"/>
+            </a:solidFill>
+            <a:tailEnd type="triangle"/>
+          </a:ln>
+        </p:spPr>
+        <p:style>
+          <a:lnRef idx="1">
+            <a:schemeClr val="accent1"/>
+          </a:lnRef>
+          <a:fillRef idx="0">
+            <a:schemeClr val="accent1"/>
+          </a:fillRef>
+          <a:effectRef idx="0">
+            <a:schemeClr val="accent1"/>
+          </a:effectRef>
+          <a:fontRef idx="minor">
+            <a:schemeClr val="tx1"/>
+          </a:fontRef>
+        </p:style>
+      </p:cxnSp>
+      <p:cxnSp>
+        <p:nvCxnSpPr>
+          <p:cNvPr id="16" name="Straight Arrow Connector 15">
+            <a:extLst>
+              <a:ext uri="{FF2B5EF4-FFF2-40B4-BE49-F238E27FC236}">
+                <a16:creationId xmlns:a16="http://schemas.microsoft.com/office/drawing/2014/main" id="{5DFF5295-C556-A3F4-6F1D-06E33EFB4C33}"/>
+              </a:ext>
+            </a:extLst>
+          </p:cNvPr>
+          <p:cNvCxnSpPr>
+            <a:cxnSpLocks/>
+          </p:cNvCxnSpPr>
+          <p:nvPr/>
+        </p:nvCxnSpPr>
+        <p:spPr>
+          <a:xfrm>
+            <a:off x="5320022" y="2176923"/>
+            <a:ext cx="278141" cy="0"/>
+          </a:xfrm>
+          <a:prstGeom prst="straightConnector1">
+            <a:avLst/>
+          </a:prstGeom>
+          <a:ln w="38100">
+            <a:solidFill>
+              <a:schemeClr val="accent1"/>
+            </a:solidFill>
+            <a:tailEnd type="triangle"/>
+          </a:ln>
+        </p:spPr>
+        <p:style>
+          <a:lnRef idx="1">
+            <a:schemeClr val="accent1"/>
+          </a:lnRef>
+          <a:fillRef idx="0">
+            <a:schemeClr val="accent1"/>
+          </a:fillRef>
+          <a:effectRef idx="0">
+            <a:schemeClr val="accent1"/>
+          </a:effectRef>
+          <a:fontRef idx="minor">
+            <a:schemeClr val="tx1"/>
+          </a:fontRef>
+        </p:style>
+      </p:cxnSp>
+      <p:cxnSp>
+        <p:nvCxnSpPr>
+          <p:cNvPr id="21" name="Straight Arrow Connector 20">
+            <a:extLst>
+              <a:ext uri="{FF2B5EF4-FFF2-40B4-BE49-F238E27FC236}">
+                <a16:creationId xmlns:a16="http://schemas.microsoft.com/office/drawing/2014/main" id="{B1F3DBC2-8B9E-A067-4EAB-98DF69B84311}"/>
+              </a:ext>
+            </a:extLst>
+          </p:cNvPr>
+          <p:cNvCxnSpPr>
+            <a:cxnSpLocks/>
+          </p:cNvCxnSpPr>
+          <p:nvPr/>
+        </p:nvCxnSpPr>
+        <p:spPr>
+          <a:xfrm>
+            <a:off x="6526824" y="2176923"/>
+            <a:ext cx="278141" cy="0"/>
+          </a:xfrm>
+          <a:prstGeom prst="straightConnector1">
+            <a:avLst/>
+          </a:prstGeom>
+          <a:ln w="38100">
+            <a:solidFill>
+              <a:schemeClr val="accent1"/>
+            </a:solidFill>
+            <a:tailEnd type="triangle"/>
+          </a:ln>
+        </p:spPr>
+        <p:style>
+          <a:lnRef idx="1">
+            <a:schemeClr val="accent1"/>
+          </a:lnRef>
+          <a:fillRef idx="0">
+            <a:schemeClr val="accent1"/>
+          </a:fillRef>
+          <a:effectRef idx="0">
+            <a:schemeClr val="accent1"/>
+          </a:effectRef>
+          <a:fontRef idx="minor">
+            <a:schemeClr val="tx1"/>
+          </a:fontRef>
+        </p:style>
+      </p:cxnSp>
+      <p:sp>
+        <p:nvSpPr>
+          <p:cNvPr id="22" name="Rectangle 21">
+            <a:extLst>
+              <a:ext uri="{FF2B5EF4-FFF2-40B4-BE49-F238E27FC236}">
+                <a16:creationId xmlns:a16="http://schemas.microsoft.com/office/drawing/2014/main" id="{40C29E39-97EA-FC9C-7448-C86FA55CE5D6}"/>
+              </a:ext>
+            </a:extLst>
+          </p:cNvPr>
+          <p:cNvSpPr/>
+          <p:nvPr/>
+        </p:nvSpPr>
+        <p:spPr>
+          <a:xfrm>
+            <a:off x="4937876" y="1987947"/>
+            <a:ext cx="377952" cy="377952"/>
+          </a:xfrm>
+          <a:prstGeom prst="rect">
+            <a:avLst/>
+          </a:prstGeom>
+        </p:spPr>
+        <p:style>
+          <a:lnRef idx="2">
+            <a:schemeClr val="accent1">
+              <a:shade val="50000"/>
+            </a:schemeClr>
+          </a:lnRef>
+          <a:fillRef idx="1">
+            <a:schemeClr val="accent1"/>
+          </a:fillRef>
+          <a:effectRef idx="0">
+            <a:schemeClr val="accent1"/>
+          </a:effectRef>
+          <a:fontRef idx="minor">
+            <a:schemeClr val="lt1"/>
+          </a:fontRef>
+        </p:style>
+        <p:txBody>
+          <a:bodyPr rtlCol="0" anchor="ctr"/>
+          <a:lstStyle/>
+          <a:p>
+            <a:pPr algn="ctr"/>
+            <a:r>
+              <a:rPr lang="en-US" dirty="0"/>
+              <a:t>0</a:t>
+            </a:r>
+          </a:p>
+        </p:txBody>
+      </p:sp>
+      <p:sp>
+        <p:nvSpPr>
+          <p:cNvPr id="24" name="Rectangle 23">
+            <a:extLst>
+              <a:ext uri="{FF2B5EF4-FFF2-40B4-BE49-F238E27FC236}">
+                <a16:creationId xmlns:a16="http://schemas.microsoft.com/office/drawing/2014/main" id="{4730DF4F-5E8B-D7FD-D6BE-D479E5FB4005}"/>
+              </a:ext>
+            </a:extLst>
+          </p:cNvPr>
+          <p:cNvSpPr/>
+          <p:nvPr/>
+        </p:nvSpPr>
+        <p:spPr>
+          <a:xfrm>
+            <a:off x="5593969" y="1987947"/>
+            <a:ext cx="377952" cy="377952"/>
+          </a:xfrm>
+          <a:prstGeom prst="rect">
+            <a:avLst/>
+          </a:prstGeom>
+        </p:spPr>
+        <p:style>
+          <a:lnRef idx="2">
+            <a:schemeClr val="accent1">
+              <a:shade val="50000"/>
+            </a:schemeClr>
+          </a:lnRef>
+          <a:fillRef idx="1">
+            <a:schemeClr val="accent1"/>
+          </a:fillRef>
+          <a:effectRef idx="0">
+            <a:schemeClr val="accent1"/>
+          </a:effectRef>
+          <a:fontRef idx="minor">
+            <a:schemeClr val="lt1"/>
+          </a:fontRef>
+        </p:style>
+        <p:txBody>
+          <a:bodyPr rtlCol="0" anchor="ctr"/>
+          <a:lstStyle/>
+          <a:p>
+            <a:pPr algn="ctr"/>
+            <a:r>
+              <a:rPr lang="en-US" dirty="0"/>
+              <a:t>1</a:t>
+            </a:r>
+          </a:p>
+        </p:txBody>
+      </p:sp>
+      <p:sp>
+        <p:nvSpPr>
+          <p:cNvPr id="25" name="Rectangle 24">
+            <a:extLst>
+              <a:ext uri="{FF2B5EF4-FFF2-40B4-BE49-F238E27FC236}">
+                <a16:creationId xmlns:a16="http://schemas.microsoft.com/office/drawing/2014/main" id="{CB3E88F3-6A45-5B4C-B9E5-3A44F8907FBD}"/>
+              </a:ext>
+            </a:extLst>
+          </p:cNvPr>
+          <p:cNvSpPr/>
+          <p:nvPr/>
+        </p:nvSpPr>
+        <p:spPr>
+          <a:xfrm>
+            <a:off x="6804965" y="1987947"/>
+            <a:ext cx="377952" cy="377952"/>
+          </a:xfrm>
+          <a:prstGeom prst="rect">
+            <a:avLst/>
+          </a:prstGeom>
+        </p:spPr>
+        <p:style>
+          <a:lnRef idx="2">
+            <a:schemeClr val="accent1">
+              <a:shade val="50000"/>
+            </a:schemeClr>
+          </a:lnRef>
+          <a:fillRef idx="1">
+            <a:schemeClr val="accent1"/>
+          </a:fillRef>
+          <a:effectRef idx="0">
+            <a:schemeClr val="accent1"/>
+          </a:effectRef>
+          <a:fontRef idx="minor">
+            <a:schemeClr val="lt1"/>
+          </a:fontRef>
+        </p:style>
+        <p:txBody>
+          <a:bodyPr rtlCol="0" anchor="ctr"/>
+          <a:lstStyle/>
+          <a:p>
+            <a:pPr algn="ctr"/>
+            <a:r>
+              <a:rPr lang="en-US" dirty="0"/>
+              <a:t>n</a:t>
+            </a:r>
+          </a:p>
+        </p:txBody>
+      </p:sp>
+      <p:sp>
+        <p:nvSpPr>
+          <p:cNvPr id="37" name="TextBox 36">
+            <a:extLst>
+              <a:ext uri="{FF2B5EF4-FFF2-40B4-BE49-F238E27FC236}">
+                <a16:creationId xmlns:a16="http://schemas.microsoft.com/office/drawing/2014/main" id="{6936B7C9-34E6-519D-1AD6-178554331B49}"/>
+              </a:ext>
+            </a:extLst>
+          </p:cNvPr>
+          <p:cNvSpPr txBox="1"/>
+          <p:nvPr/>
+        </p:nvSpPr>
+        <p:spPr>
+          <a:xfrm>
+            <a:off x="6224800" y="1929262"/>
+            <a:ext cx="343364" cy="369332"/>
+          </a:xfrm>
+          <a:prstGeom prst="rect">
+            <a:avLst/>
+          </a:prstGeom>
+          <a:noFill/>
+        </p:spPr>
+        <p:txBody>
+          <a:bodyPr wrap="none" rtlCol="0">
+            <a:spAutoFit/>
+          </a:bodyPr>
+          <a:lstStyle/>
+          <a:p>
+            <a:r>
+              <a:rPr lang="en-US" dirty="0"/>
+              <a:t>…</a:t>
+            </a:r>
+          </a:p>
+        </p:txBody>
+      </p:sp>
+      <p:sp>
+        <p:nvSpPr>
+          <p:cNvPr id="39" name="TextBox 38">
+            <a:extLst>
+              <a:ext uri="{FF2B5EF4-FFF2-40B4-BE49-F238E27FC236}">
+                <a16:creationId xmlns:a16="http://schemas.microsoft.com/office/drawing/2014/main" id="{FF8B4FB4-6636-E821-611E-A6634937010D}"/>
+              </a:ext>
+            </a:extLst>
+          </p:cNvPr>
+          <p:cNvSpPr txBox="1"/>
+          <p:nvPr/>
+        </p:nvSpPr>
+        <p:spPr>
+          <a:xfrm>
+            <a:off x="4399895" y="1445800"/>
+            <a:ext cx="3392211" cy="369332"/>
+          </a:xfrm>
+          <a:prstGeom prst="rect">
+            <a:avLst/>
+          </a:prstGeom>
+          <a:noFill/>
+        </p:spPr>
+        <p:txBody>
+          <a:bodyPr wrap="none" rtlCol="0">
+            <a:spAutoFit/>
+          </a:bodyPr>
+          <a:lstStyle/>
+          <a:p>
+            <a:pPr algn="ctr"/>
+            <a:r>
+              <a:rPr lang="en-US" dirty="0"/>
+              <a:t>Evolving Data Structure Over Time</a:t>
+            </a:r>
+          </a:p>
+        </p:txBody>
+      </p:sp>
+      <p:sp>
+        <p:nvSpPr>
+          <p:cNvPr id="40" name="TextBox 39">
+            <a:extLst>
+              <a:ext uri="{FF2B5EF4-FFF2-40B4-BE49-F238E27FC236}">
+                <a16:creationId xmlns:a16="http://schemas.microsoft.com/office/drawing/2014/main" id="{BB806D3B-EAFB-AC9F-7FF6-1BBDA4445FFA}"/>
+              </a:ext>
+            </a:extLst>
+          </p:cNvPr>
+          <p:cNvSpPr txBox="1"/>
+          <p:nvPr/>
+        </p:nvSpPr>
+        <p:spPr>
+          <a:xfrm>
+            <a:off x="6717723" y="3405671"/>
+            <a:ext cx="1590565" cy="369332"/>
+          </a:xfrm>
+          <a:prstGeom prst="rect">
+            <a:avLst/>
+          </a:prstGeom>
+          <a:noFill/>
+        </p:spPr>
+        <p:txBody>
+          <a:bodyPr wrap="none" rtlCol="0">
+            <a:spAutoFit/>
+          </a:bodyPr>
+          <a:lstStyle/>
+          <a:p>
+            <a:pPr algn="ctr"/>
+            <a:r>
+              <a:rPr lang="en-US" dirty="0"/>
+              <a:t>Delta Encoding</a:t>
+            </a:r>
+          </a:p>
+        </p:txBody>
+      </p:sp>
+      <p:sp>
+        <p:nvSpPr>
+          <p:cNvPr id="43" name="TextBox 42">
+            <a:extLst>
+              <a:ext uri="{FF2B5EF4-FFF2-40B4-BE49-F238E27FC236}">
+                <a16:creationId xmlns:a16="http://schemas.microsoft.com/office/drawing/2014/main" id="{292286DE-73BF-2F67-6A9A-536053C832E1}"/>
+              </a:ext>
+            </a:extLst>
+          </p:cNvPr>
+          <p:cNvSpPr txBox="1"/>
+          <p:nvPr/>
+        </p:nvSpPr>
+        <p:spPr>
+          <a:xfrm>
+            <a:off x="3749219" y="3405671"/>
+            <a:ext cx="1977081" cy="369332"/>
+          </a:xfrm>
+          <a:prstGeom prst="rect">
+            <a:avLst/>
+          </a:prstGeom>
+          <a:noFill/>
+        </p:spPr>
+        <p:txBody>
+          <a:bodyPr wrap="none" rtlCol="0">
+            <a:spAutoFit/>
+          </a:bodyPr>
+          <a:lstStyle/>
+          <a:p>
+            <a:pPr algn="ctr"/>
+            <a:r>
+              <a:rPr lang="en-US" dirty="0"/>
+              <a:t>Full-State Encoding</a:t>
+            </a:r>
+          </a:p>
+        </p:txBody>
+      </p:sp>
+      <p:sp>
+        <p:nvSpPr>
+          <p:cNvPr id="93" name="Rectangle 92">
+            <a:extLst>
+              <a:ext uri="{FF2B5EF4-FFF2-40B4-BE49-F238E27FC236}">
+                <a16:creationId xmlns:a16="http://schemas.microsoft.com/office/drawing/2014/main" id="{A1924DF7-BB86-F631-E200-B27AD2358BB0}"/>
+              </a:ext>
+            </a:extLst>
+          </p:cNvPr>
+          <p:cNvSpPr/>
+          <p:nvPr/>
+        </p:nvSpPr>
+        <p:spPr>
+          <a:xfrm>
+            <a:off x="4270189" y="1306379"/>
+            <a:ext cx="3637678" cy="1329268"/>
+          </a:xfrm>
+          <a:prstGeom prst="rect">
+            <a:avLst/>
+          </a:prstGeom>
+          <a:noFill/>
+          <a:ln>
+            <a:solidFill>
+              <a:schemeClr val="bg2">
+                <a:lumMod val="50000"/>
+              </a:schemeClr>
+            </a:solidFill>
+          </a:ln>
+        </p:spPr>
+        <p:style>
+          <a:lnRef idx="2">
+            <a:schemeClr val="accent1">
+              <a:shade val="50000"/>
+            </a:schemeClr>
+          </a:lnRef>
+          <a:fillRef idx="1">
+            <a:schemeClr val="accent1"/>
+          </a:fillRef>
+          <a:effectRef idx="0">
+            <a:schemeClr val="accent1"/>
+          </a:effectRef>
+          <a:fontRef idx="minor">
+            <a:schemeClr val="lt1"/>
+          </a:fontRef>
+        </p:style>
+        <p:txBody>
+          <a:bodyPr rtlCol="0" anchor="ctr"/>
+          <a:lstStyle/>
+          <a:p>
+            <a:pPr algn="ctr"/>
+            <a:endParaRPr lang="en-US"/>
+          </a:p>
+        </p:txBody>
+      </p:sp>
+      <p:sp>
+        <p:nvSpPr>
+          <p:cNvPr id="94" name="Rectangle 93">
+            <a:extLst>
+              <a:ext uri="{FF2B5EF4-FFF2-40B4-BE49-F238E27FC236}">
+                <a16:creationId xmlns:a16="http://schemas.microsoft.com/office/drawing/2014/main" id="{C3D50CD4-1F0A-AA6B-1249-C21B124ECAB5}"/>
+              </a:ext>
+            </a:extLst>
+          </p:cNvPr>
+          <p:cNvSpPr/>
+          <p:nvPr/>
+        </p:nvSpPr>
+        <p:spPr>
+          <a:xfrm>
+            <a:off x="6194087" y="3312394"/>
+            <a:ext cx="2622254" cy="1112958"/>
+          </a:xfrm>
+          <a:prstGeom prst="rect">
+            <a:avLst/>
+          </a:prstGeom>
+          <a:noFill/>
+          <a:ln>
+            <a:solidFill>
+              <a:schemeClr val="bg2">
+                <a:lumMod val="50000"/>
+              </a:schemeClr>
+            </a:solidFill>
+          </a:ln>
+        </p:spPr>
+        <p:style>
+          <a:lnRef idx="2">
+            <a:schemeClr val="accent1">
+              <a:shade val="50000"/>
+            </a:schemeClr>
+          </a:lnRef>
+          <a:fillRef idx="1">
+            <a:schemeClr val="accent1"/>
+          </a:fillRef>
+          <a:effectRef idx="0">
+            <a:schemeClr val="accent1"/>
+          </a:effectRef>
+          <a:fontRef idx="minor">
+            <a:schemeClr val="lt1"/>
+          </a:fontRef>
+        </p:style>
+        <p:txBody>
+          <a:bodyPr rtlCol="0" anchor="ctr"/>
+          <a:lstStyle/>
+          <a:p>
+            <a:pPr algn="ctr"/>
+            <a:endParaRPr lang="en-US"/>
+          </a:p>
+        </p:txBody>
+      </p:sp>
+      <p:sp>
+        <p:nvSpPr>
+          <p:cNvPr id="95" name="Rectangle 94">
+            <a:extLst>
+              <a:ext uri="{FF2B5EF4-FFF2-40B4-BE49-F238E27FC236}">
+                <a16:creationId xmlns:a16="http://schemas.microsoft.com/office/drawing/2014/main" id="{5A5D7FB6-1D2E-A929-D75B-927CBBD8145D}"/>
+              </a:ext>
+            </a:extLst>
+          </p:cNvPr>
+          <p:cNvSpPr/>
+          <p:nvPr/>
+        </p:nvSpPr>
+        <p:spPr>
+          <a:xfrm>
+            <a:off x="3379432" y="3312394"/>
+            <a:ext cx="2622254" cy="1112957"/>
+          </a:xfrm>
+          <a:prstGeom prst="rect">
+            <a:avLst/>
+          </a:prstGeom>
+          <a:noFill/>
+          <a:ln>
+            <a:solidFill>
+              <a:schemeClr val="bg2">
+                <a:lumMod val="50000"/>
+              </a:schemeClr>
+            </a:solidFill>
+          </a:ln>
+        </p:spPr>
+        <p:style>
+          <a:lnRef idx="2">
+            <a:schemeClr val="accent1">
+              <a:shade val="50000"/>
+            </a:schemeClr>
+          </a:lnRef>
+          <a:fillRef idx="1">
+            <a:schemeClr val="accent1"/>
+          </a:fillRef>
+          <a:effectRef idx="0">
+            <a:schemeClr val="accent1"/>
+          </a:effectRef>
+          <a:fontRef idx="minor">
+            <a:schemeClr val="lt1"/>
+          </a:fontRef>
+        </p:style>
+        <p:txBody>
+          <a:bodyPr rtlCol="0" anchor="ctr"/>
+          <a:lstStyle/>
+          <a:p>
+            <a:pPr algn="ctr"/>
+            <a:endParaRPr lang="en-US"/>
+          </a:p>
+        </p:txBody>
+      </p:sp>
+      <p:cxnSp>
+        <p:nvCxnSpPr>
+          <p:cNvPr id="4" name="Straight Arrow Connector 3">
+            <a:extLst>
+              <a:ext uri="{FF2B5EF4-FFF2-40B4-BE49-F238E27FC236}">
+                <a16:creationId xmlns:a16="http://schemas.microsoft.com/office/drawing/2014/main" id="{D813B4C4-F1B5-7C26-33EF-DF7E692D160E}"/>
+              </a:ext>
+            </a:extLst>
+          </p:cNvPr>
+          <p:cNvCxnSpPr>
+            <a:cxnSpLocks/>
+          </p:cNvCxnSpPr>
+          <p:nvPr/>
+        </p:nvCxnSpPr>
+        <p:spPr>
+          <a:xfrm>
+            <a:off x="4598689" y="4074618"/>
+            <a:ext cx="278141" cy="0"/>
+          </a:xfrm>
+          <a:prstGeom prst="straightConnector1">
+            <a:avLst/>
+          </a:prstGeom>
+          <a:ln w="38100">
+            <a:solidFill>
+              <a:schemeClr val="bg2">
+                <a:lumMod val="90000"/>
+              </a:schemeClr>
+            </a:solidFill>
+            <a:tailEnd type="triangle"/>
+          </a:ln>
+        </p:spPr>
+        <p:style>
+          <a:lnRef idx="1">
+            <a:schemeClr val="accent1"/>
+          </a:lnRef>
+          <a:fillRef idx="0">
+            <a:schemeClr val="accent1"/>
+          </a:fillRef>
+          <a:effectRef idx="0">
+            <a:schemeClr val="accent1"/>
+          </a:effectRef>
+          <a:fontRef idx="minor">
+            <a:schemeClr val="tx1"/>
+          </a:fontRef>
+        </p:style>
+      </p:cxnSp>
+      <p:cxnSp>
+        <p:nvCxnSpPr>
+          <p:cNvPr id="5" name="Straight Arrow Connector 4">
+            <a:extLst>
+              <a:ext uri="{FF2B5EF4-FFF2-40B4-BE49-F238E27FC236}">
+                <a16:creationId xmlns:a16="http://schemas.microsoft.com/office/drawing/2014/main" id="{3DD295ED-3273-4F1E-ABBB-ECAB07ECFC88}"/>
+              </a:ext>
+            </a:extLst>
+          </p:cNvPr>
+          <p:cNvCxnSpPr>
+            <a:cxnSpLocks/>
+          </p:cNvCxnSpPr>
+          <p:nvPr/>
+        </p:nvCxnSpPr>
+        <p:spPr>
+          <a:xfrm>
+            <a:off x="3944160" y="4074618"/>
+            <a:ext cx="278141" cy="0"/>
+          </a:xfrm>
+          <a:prstGeom prst="straightConnector1">
+            <a:avLst/>
+          </a:prstGeom>
+          <a:ln w="38100">
+            <a:solidFill>
+              <a:schemeClr val="bg2">
+                <a:lumMod val="90000"/>
+              </a:schemeClr>
+            </a:solidFill>
+            <a:tailEnd type="triangle"/>
+          </a:ln>
+        </p:spPr>
+        <p:style>
+          <a:lnRef idx="1">
+            <a:schemeClr val="accent1"/>
+          </a:lnRef>
+          <a:fillRef idx="0">
+            <a:schemeClr val="accent1"/>
+          </a:fillRef>
+          <a:effectRef idx="0">
+            <a:schemeClr val="accent1"/>
+          </a:effectRef>
+          <a:fontRef idx="minor">
+            <a:schemeClr val="tx1"/>
+          </a:fontRef>
+        </p:style>
+      </p:cxnSp>
+      <p:cxnSp>
+        <p:nvCxnSpPr>
+          <p:cNvPr id="6" name="Straight Arrow Connector 5">
+            <a:extLst>
+              <a:ext uri="{FF2B5EF4-FFF2-40B4-BE49-F238E27FC236}">
+                <a16:creationId xmlns:a16="http://schemas.microsoft.com/office/drawing/2014/main" id="{C2BBC269-83EE-2F6A-711A-F3D9AE59F1E2}"/>
+              </a:ext>
+            </a:extLst>
+          </p:cNvPr>
+          <p:cNvCxnSpPr>
+            <a:cxnSpLocks/>
+          </p:cNvCxnSpPr>
+          <p:nvPr/>
+        </p:nvCxnSpPr>
+        <p:spPr>
+          <a:xfrm>
+            <a:off x="5150962" y="4074618"/>
+            <a:ext cx="278141" cy="0"/>
+          </a:xfrm>
+          <a:prstGeom prst="straightConnector1">
+            <a:avLst/>
+          </a:prstGeom>
+          <a:ln w="38100">
+            <a:solidFill>
+              <a:schemeClr val="bg2">
+                <a:lumMod val="90000"/>
+              </a:schemeClr>
+            </a:solidFill>
+            <a:tailEnd type="triangle"/>
+          </a:ln>
+        </p:spPr>
+        <p:style>
+          <a:lnRef idx="1">
+            <a:schemeClr val="accent1"/>
+          </a:lnRef>
+          <a:fillRef idx="0">
+            <a:schemeClr val="accent1"/>
+          </a:fillRef>
+          <a:effectRef idx="0">
+            <a:schemeClr val="accent1"/>
+          </a:effectRef>
+          <a:fontRef idx="minor">
+            <a:schemeClr val="tx1"/>
+          </a:fontRef>
+        </p:style>
+      </p:cxnSp>
+      <p:sp>
+        <p:nvSpPr>
+          <p:cNvPr id="7" name="Rectangle 6">
+            <a:extLst>
+              <a:ext uri="{FF2B5EF4-FFF2-40B4-BE49-F238E27FC236}">
+                <a16:creationId xmlns:a16="http://schemas.microsoft.com/office/drawing/2014/main" id="{21EAA329-7C9C-7126-BDDB-2394C60A59A7}"/>
+              </a:ext>
+            </a:extLst>
+          </p:cNvPr>
+          <p:cNvSpPr/>
+          <p:nvPr/>
+        </p:nvSpPr>
+        <p:spPr>
+          <a:xfrm>
+            <a:off x="3562014" y="3885642"/>
+            <a:ext cx="377952" cy="377952"/>
+          </a:xfrm>
+          <a:prstGeom prst="rect">
+            <a:avLst/>
+          </a:prstGeom>
+        </p:spPr>
+        <p:style>
+          <a:lnRef idx="2">
+            <a:schemeClr val="accent1">
+              <a:shade val="50000"/>
+            </a:schemeClr>
+          </a:lnRef>
+          <a:fillRef idx="1">
+            <a:schemeClr val="accent1"/>
+          </a:fillRef>
+          <a:effectRef idx="0">
+            <a:schemeClr val="accent1"/>
+          </a:effectRef>
+          <a:fontRef idx="minor">
+            <a:schemeClr val="lt1"/>
+          </a:fontRef>
+        </p:style>
+        <p:txBody>
+          <a:bodyPr rtlCol="0" anchor="ctr"/>
+          <a:lstStyle/>
+          <a:p>
+            <a:pPr algn="ctr"/>
+            <a:r>
+              <a:rPr lang="en-US" dirty="0"/>
+              <a:t>0</a:t>
+            </a:r>
+          </a:p>
+        </p:txBody>
+      </p:sp>
+      <p:sp>
+        <p:nvSpPr>
+          <p:cNvPr id="8" name="Rectangle 7">
+            <a:extLst>
+              <a:ext uri="{FF2B5EF4-FFF2-40B4-BE49-F238E27FC236}">
+                <a16:creationId xmlns:a16="http://schemas.microsoft.com/office/drawing/2014/main" id="{4EAC4F71-3052-F2E8-433B-C0C037D31A50}"/>
+              </a:ext>
+            </a:extLst>
+          </p:cNvPr>
+          <p:cNvSpPr/>
+          <p:nvPr/>
+        </p:nvSpPr>
+        <p:spPr>
+          <a:xfrm>
+            <a:off x="4218107" y="3885642"/>
+            <a:ext cx="377952" cy="377952"/>
+          </a:xfrm>
+          <a:prstGeom prst="rect">
+            <a:avLst/>
+          </a:prstGeom>
+        </p:spPr>
+        <p:style>
+          <a:lnRef idx="2">
+            <a:schemeClr val="accent1">
+              <a:shade val="50000"/>
+            </a:schemeClr>
+          </a:lnRef>
+          <a:fillRef idx="1">
+            <a:schemeClr val="accent1"/>
+          </a:fillRef>
+          <a:effectRef idx="0">
+            <a:schemeClr val="accent1"/>
+          </a:effectRef>
+          <a:fontRef idx="minor">
+            <a:schemeClr val="lt1"/>
+          </a:fontRef>
+        </p:style>
+        <p:txBody>
+          <a:bodyPr rtlCol="0" anchor="ctr"/>
+          <a:lstStyle/>
+          <a:p>
+            <a:pPr algn="ctr"/>
+            <a:r>
+              <a:rPr lang="en-US" dirty="0"/>
+              <a:t>1</a:t>
+            </a:r>
+          </a:p>
+        </p:txBody>
+      </p:sp>
+      <p:sp>
+        <p:nvSpPr>
+          <p:cNvPr id="9" name="Rectangle 8">
+            <a:extLst>
+              <a:ext uri="{FF2B5EF4-FFF2-40B4-BE49-F238E27FC236}">
+                <a16:creationId xmlns:a16="http://schemas.microsoft.com/office/drawing/2014/main" id="{EECD5507-333C-C6A6-5175-D0BA55ACD234}"/>
+              </a:ext>
+            </a:extLst>
+          </p:cNvPr>
+          <p:cNvSpPr/>
+          <p:nvPr/>
+        </p:nvSpPr>
+        <p:spPr>
+          <a:xfrm>
+            <a:off x="5429103" y="3885642"/>
+            <a:ext cx="377952" cy="377952"/>
+          </a:xfrm>
+          <a:prstGeom prst="rect">
+            <a:avLst/>
+          </a:prstGeom>
+        </p:spPr>
+        <p:style>
+          <a:lnRef idx="2">
+            <a:schemeClr val="accent1">
+              <a:shade val="50000"/>
+            </a:schemeClr>
+          </a:lnRef>
+          <a:fillRef idx="1">
+            <a:schemeClr val="accent1"/>
+          </a:fillRef>
+          <a:effectRef idx="0">
+            <a:schemeClr val="accent1"/>
+          </a:effectRef>
+          <a:fontRef idx="minor">
+            <a:schemeClr val="lt1"/>
+          </a:fontRef>
+        </p:style>
+        <p:txBody>
+          <a:bodyPr rtlCol="0" anchor="ctr"/>
+          <a:lstStyle/>
+          <a:p>
+            <a:pPr algn="ctr"/>
+            <a:r>
+              <a:rPr lang="en-US" dirty="0"/>
+              <a:t>n</a:t>
+            </a:r>
+          </a:p>
+        </p:txBody>
+      </p:sp>
+      <p:sp>
+        <p:nvSpPr>
+          <p:cNvPr id="10" name="TextBox 9">
+            <a:extLst>
+              <a:ext uri="{FF2B5EF4-FFF2-40B4-BE49-F238E27FC236}">
+                <a16:creationId xmlns:a16="http://schemas.microsoft.com/office/drawing/2014/main" id="{872A3E8B-9B91-20BF-EAD6-02EF137FA3CA}"/>
+              </a:ext>
+            </a:extLst>
+          </p:cNvPr>
+          <p:cNvSpPr txBox="1"/>
+          <p:nvPr/>
+        </p:nvSpPr>
+        <p:spPr>
+          <a:xfrm>
+            <a:off x="4848938" y="3826957"/>
+            <a:ext cx="343364" cy="369332"/>
+          </a:xfrm>
+          <a:prstGeom prst="rect">
+            <a:avLst/>
+          </a:prstGeom>
+          <a:noFill/>
+        </p:spPr>
+        <p:txBody>
+          <a:bodyPr wrap="none" rtlCol="0">
+            <a:spAutoFit/>
+          </a:bodyPr>
+          <a:lstStyle/>
+          <a:p>
+            <a:r>
+              <a:rPr lang="en-US" dirty="0"/>
+              <a:t>…</a:t>
+            </a:r>
+          </a:p>
+        </p:txBody>
+      </p:sp>
+      <p:cxnSp>
+        <p:nvCxnSpPr>
+          <p:cNvPr id="11" name="Straight Arrow Connector 10">
+            <a:extLst>
+              <a:ext uri="{FF2B5EF4-FFF2-40B4-BE49-F238E27FC236}">
+                <a16:creationId xmlns:a16="http://schemas.microsoft.com/office/drawing/2014/main" id="{87AE162F-56A2-1CAA-6D7E-BE387ECA7492}"/>
+              </a:ext>
+            </a:extLst>
+          </p:cNvPr>
+          <p:cNvCxnSpPr>
+            <a:cxnSpLocks/>
+          </p:cNvCxnSpPr>
+          <p:nvPr/>
+        </p:nvCxnSpPr>
+        <p:spPr>
+          <a:xfrm>
+            <a:off x="7423818" y="4069614"/>
+            <a:ext cx="278141" cy="0"/>
+          </a:xfrm>
+          <a:prstGeom prst="straightConnector1">
+            <a:avLst/>
+          </a:prstGeom>
+          <a:ln w="38100">
+            <a:solidFill>
+              <a:schemeClr val="accent1"/>
+            </a:solidFill>
+            <a:tailEnd type="triangle"/>
+          </a:ln>
+        </p:spPr>
+        <p:style>
+          <a:lnRef idx="1">
+            <a:schemeClr val="accent1"/>
+          </a:lnRef>
+          <a:fillRef idx="0">
+            <a:schemeClr val="accent1"/>
+          </a:fillRef>
+          <a:effectRef idx="0">
+            <a:schemeClr val="accent1"/>
+          </a:effectRef>
+          <a:fontRef idx="minor">
+            <a:schemeClr val="tx1"/>
+          </a:fontRef>
+        </p:style>
+      </p:cxnSp>
+      <p:cxnSp>
+        <p:nvCxnSpPr>
+          <p:cNvPr id="12" name="Straight Arrow Connector 11">
+            <a:extLst>
+              <a:ext uri="{FF2B5EF4-FFF2-40B4-BE49-F238E27FC236}">
+                <a16:creationId xmlns:a16="http://schemas.microsoft.com/office/drawing/2014/main" id="{D3A2C78E-20E6-6C66-0F38-A035EBC8362F}"/>
+              </a:ext>
+            </a:extLst>
+          </p:cNvPr>
+          <p:cNvCxnSpPr>
+            <a:cxnSpLocks/>
+          </p:cNvCxnSpPr>
+          <p:nvPr/>
+        </p:nvCxnSpPr>
+        <p:spPr>
+          <a:xfrm>
+            <a:off x="6769289" y="4069614"/>
+            <a:ext cx="278141" cy="0"/>
+          </a:xfrm>
+          <a:prstGeom prst="straightConnector1">
+            <a:avLst/>
+          </a:prstGeom>
+          <a:ln w="38100">
+            <a:solidFill>
+              <a:schemeClr val="accent1"/>
+            </a:solidFill>
+            <a:tailEnd type="triangle"/>
+          </a:ln>
+        </p:spPr>
+        <p:style>
+          <a:lnRef idx="1">
+            <a:schemeClr val="accent1"/>
+          </a:lnRef>
+          <a:fillRef idx="0">
+            <a:schemeClr val="accent1"/>
+          </a:fillRef>
+          <a:effectRef idx="0">
+            <a:schemeClr val="accent1"/>
+          </a:effectRef>
+          <a:fontRef idx="minor">
+            <a:schemeClr val="tx1"/>
+          </a:fontRef>
+        </p:style>
+      </p:cxnSp>
+      <p:cxnSp>
+        <p:nvCxnSpPr>
+          <p:cNvPr id="14" name="Straight Arrow Connector 13">
+            <a:extLst>
+              <a:ext uri="{FF2B5EF4-FFF2-40B4-BE49-F238E27FC236}">
+                <a16:creationId xmlns:a16="http://schemas.microsoft.com/office/drawing/2014/main" id="{2D5F2C43-2BFA-0A5C-2A51-71016A0F5D67}"/>
+              </a:ext>
+            </a:extLst>
+          </p:cNvPr>
+          <p:cNvCxnSpPr>
+            <a:cxnSpLocks/>
+          </p:cNvCxnSpPr>
+          <p:nvPr/>
+        </p:nvCxnSpPr>
+        <p:spPr>
+          <a:xfrm>
+            <a:off x="7976091" y="4069614"/>
+            <a:ext cx="278141" cy="0"/>
+          </a:xfrm>
+          <a:prstGeom prst="straightConnector1">
+            <a:avLst/>
+          </a:prstGeom>
+          <a:ln w="38100">
+            <a:solidFill>
+              <a:schemeClr val="accent1"/>
+            </a:solidFill>
+            <a:tailEnd type="triangle"/>
+          </a:ln>
+        </p:spPr>
+        <p:style>
+          <a:lnRef idx="1">
+            <a:schemeClr val="accent1"/>
+          </a:lnRef>
+          <a:fillRef idx="0">
+            <a:schemeClr val="accent1"/>
+          </a:fillRef>
+          <a:effectRef idx="0">
+            <a:schemeClr val="accent1"/>
+          </a:effectRef>
+          <a:fontRef idx="minor">
+            <a:schemeClr val="tx1"/>
+          </a:fontRef>
+        </p:style>
+      </p:cxnSp>
+      <p:sp>
+        <p:nvSpPr>
+          <p:cNvPr id="15" name="Rectangle 14">
+            <a:extLst>
+              <a:ext uri="{FF2B5EF4-FFF2-40B4-BE49-F238E27FC236}">
+                <a16:creationId xmlns:a16="http://schemas.microsoft.com/office/drawing/2014/main" id="{245C9B72-4575-6BE2-8C7F-1EC209F8272C}"/>
+              </a:ext>
+            </a:extLst>
+          </p:cNvPr>
+          <p:cNvSpPr/>
+          <p:nvPr/>
+        </p:nvSpPr>
+        <p:spPr>
+          <a:xfrm>
+            <a:off x="6387143" y="3880638"/>
+            <a:ext cx="377952" cy="377952"/>
+          </a:xfrm>
+          <a:prstGeom prst="rect">
+            <a:avLst/>
+          </a:prstGeom>
+          <a:solidFill>
+            <a:schemeClr val="bg2">
+              <a:lumMod val="90000"/>
+            </a:schemeClr>
+          </a:solidFill>
+          <a:ln>
+            <a:solidFill>
+              <a:schemeClr val="bg2">
+                <a:lumMod val="75000"/>
+              </a:schemeClr>
+            </a:solidFill>
+          </a:ln>
+        </p:spPr>
+        <p:style>
+          <a:lnRef idx="2">
+            <a:schemeClr val="accent1">
+              <a:shade val="50000"/>
+            </a:schemeClr>
+          </a:lnRef>
+          <a:fillRef idx="1">
+            <a:schemeClr val="accent1"/>
+          </a:fillRef>
+          <a:effectRef idx="0">
+            <a:schemeClr val="accent1"/>
+          </a:effectRef>
+          <a:fontRef idx="minor">
+            <a:schemeClr val="lt1"/>
+          </a:fontRef>
+        </p:style>
+        <p:txBody>
+          <a:bodyPr rtlCol="0" anchor="ctr"/>
+          <a:lstStyle/>
+          <a:p>
+            <a:pPr algn="ctr"/>
+            <a:r>
+              <a:rPr lang="en-US" dirty="0"/>
+              <a:t>0</a:t>
+            </a:r>
+          </a:p>
+        </p:txBody>
+      </p:sp>
+      <p:sp>
+        <p:nvSpPr>
+          <p:cNvPr id="17" name="Rectangle 16">
+            <a:extLst>
+              <a:ext uri="{FF2B5EF4-FFF2-40B4-BE49-F238E27FC236}">
+                <a16:creationId xmlns:a16="http://schemas.microsoft.com/office/drawing/2014/main" id="{C5C8A764-E469-D29A-D580-4402AE288B81}"/>
+              </a:ext>
+            </a:extLst>
+          </p:cNvPr>
+          <p:cNvSpPr/>
+          <p:nvPr/>
+        </p:nvSpPr>
+        <p:spPr>
+          <a:xfrm>
+            <a:off x="7043236" y="3880638"/>
+            <a:ext cx="377952" cy="377952"/>
+          </a:xfrm>
+          <a:prstGeom prst="rect">
+            <a:avLst/>
+          </a:prstGeom>
+          <a:solidFill>
+            <a:schemeClr val="bg2">
+              <a:lumMod val="90000"/>
+            </a:schemeClr>
+          </a:solidFill>
+          <a:ln>
+            <a:solidFill>
+              <a:schemeClr val="bg2">
+                <a:lumMod val="75000"/>
+              </a:schemeClr>
+            </a:solidFill>
+          </a:ln>
+        </p:spPr>
+        <p:style>
+          <a:lnRef idx="2">
+            <a:schemeClr val="accent1">
+              <a:shade val="50000"/>
+            </a:schemeClr>
+          </a:lnRef>
+          <a:fillRef idx="1">
+            <a:schemeClr val="accent1"/>
+          </a:fillRef>
+          <a:effectRef idx="0">
+            <a:schemeClr val="accent1"/>
+          </a:effectRef>
+          <a:fontRef idx="minor">
+            <a:schemeClr val="lt1"/>
+          </a:fontRef>
+        </p:style>
+        <p:txBody>
+          <a:bodyPr rtlCol="0" anchor="ctr"/>
+          <a:lstStyle/>
+          <a:p>
+            <a:pPr algn="ctr"/>
+            <a:r>
+              <a:rPr lang="en-US" dirty="0"/>
+              <a:t>1</a:t>
+            </a:r>
+          </a:p>
+        </p:txBody>
+      </p:sp>
+      <p:sp>
+        <p:nvSpPr>
+          <p:cNvPr id="18" name="Rectangle 17">
+            <a:extLst>
+              <a:ext uri="{FF2B5EF4-FFF2-40B4-BE49-F238E27FC236}">
+                <a16:creationId xmlns:a16="http://schemas.microsoft.com/office/drawing/2014/main" id="{65309EF9-0F92-47DB-7B58-908872A3F361}"/>
+              </a:ext>
+            </a:extLst>
+          </p:cNvPr>
+          <p:cNvSpPr/>
+          <p:nvPr/>
+        </p:nvSpPr>
+        <p:spPr>
+          <a:xfrm>
+            <a:off x="8254232" y="3880638"/>
+            <a:ext cx="377952" cy="377952"/>
+          </a:xfrm>
+          <a:prstGeom prst="rect">
+            <a:avLst/>
+          </a:prstGeom>
+          <a:solidFill>
+            <a:schemeClr val="bg2">
+              <a:lumMod val="90000"/>
+            </a:schemeClr>
+          </a:solidFill>
+          <a:ln>
+            <a:solidFill>
+              <a:schemeClr val="bg2">
+                <a:lumMod val="75000"/>
+              </a:schemeClr>
+            </a:solidFill>
+          </a:ln>
+        </p:spPr>
+        <p:style>
+          <a:lnRef idx="2">
+            <a:schemeClr val="accent1">
+              <a:shade val="50000"/>
+            </a:schemeClr>
+          </a:lnRef>
+          <a:fillRef idx="1">
+            <a:schemeClr val="accent1"/>
+          </a:fillRef>
+          <a:effectRef idx="0">
+            <a:schemeClr val="accent1"/>
+          </a:effectRef>
+          <a:fontRef idx="minor">
+            <a:schemeClr val="lt1"/>
+          </a:fontRef>
+        </p:style>
+        <p:txBody>
+          <a:bodyPr rtlCol="0" anchor="ctr"/>
+          <a:lstStyle/>
+          <a:p>
+            <a:pPr algn="ctr"/>
+            <a:r>
+              <a:rPr lang="en-US" dirty="0"/>
+              <a:t>n</a:t>
+            </a:r>
+          </a:p>
+        </p:txBody>
+      </p:sp>
+      <p:sp>
+        <p:nvSpPr>
+          <p:cNvPr id="19" name="TextBox 18">
+            <a:extLst>
+              <a:ext uri="{FF2B5EF4-FFF2-40B4-BE49-F238E27FC236}">
+                <a16:creationId xmlns:a16="http://schemas.microsoft.com/office/drawing/2014/main" id="{F0D01D4B-FFC3-4E93-633A-5C757DDF0628}"/>
+              </a:ext>
+            </a:extLst>
+          </p:cNvPr>
+          <p:cNvSpPr txBox="1"/>
+          <p:nvPr/>
+        </p:nvSpPr>
+        <p:spPr>
+          <a:xfrm>
+            <a:off x="7674067" y="3821953"/>
+            <a:ext cx="343364" cy="369332"/>
+          </a:xfrm>
+          <a:prstGeom prst="rect">
+            <a:avLst/>
+          </a:prstGeom>
+          <a:noFill/>
+        </p:spPr>
+        <p:txBody>
+          <a:bodyPr wrap="none" rtlCol="0">
+            <a:spAutoFit/>
+          </a:bodyPr>
+          <a:lstStyle/>
+          <a:p>
+            <a:r>
+              <a:rPr lang="en-US" dirty="0"/>
+              <a:t>…</a:t>
+            </a:r>
+          </a:p>
+        </p:txBody>
+      </p:sp>
+      <p:cxnSp>
+        <p:nvCxnSpPr>
+          <p:cNvPr id="33" name="Straight Connector 32">
+            <a:extLst>
+              <a:ext uri="{FF2B5EF4-FFF2-40B4-BE49-F238E27FC236}">
+                <a16:creationId xmlns:a16="http://schemas.microsoft.com/office/drawing/2014/main" id="{8ECB1C98-EEF9-ACBB-81C4-D794BFDF5D15}"/>
+              </a:ext>
+            </a:extLst>
+          </p:cNvPr>
+          <p:cNvCxnSpPr>
+            <a:cxnSpLocks/>
+            <a:stCxn id="93" idx="2"/>
+            <a:endCxn id="95" idx="0"/>
+          </p:cNvCxnSpPr>
+          <p:nvPr/>
+        </p:nvCxnSpPr>
+        <p:spPr>
+          <a:xfrm flipH="1">
+            <a:off x="4690559" y="2635647"/>
+            <a:ext cx="1398469" cy="676747"/>
+          </a:xfrm>
+          <a:prstGeom prst="line">
+            <a:avLst/>
+          </a:prstGeom>
+          <a:ln w="12700">
+            <a:solidFill>
+              <a:schemeClr val="bg2">
+                <a:lumMod val="75000"/>
+              </a:schemeClr>
+            </a:solidFill>
+            <a:prstDash val="sysDash"/>
+          </a:ln>
+        </p:spPr>
+        <p:style>
+          <a:lnRef idx="1">
+            <a:schemeClr val="accent1"/>
+          </a:lnRef>
+          <a:fillRef idx="0">
+            <a:schemeClr val="accent1"/>
+          </a:fillRef>
+          <a:effectRef idx="0">
+            <a:schemeClr val="accent1"/>
+          </a:effectRef>
+          <a:fontRef idx="minor">
+            <a:schemeClr val="tx1"/>
+          </a:fontRef>
+        </p:style>
+      </p:cxnSp>
+      <p:cxnSp>
+        <p:nvCxnSpPr>
+          <p:cNvPr id="34" name="Straight Connector 33">
+            <a:extLst>
+              <a:ext uri="{FF2B5EF4-FFF2-40B4-BE49-F238E27FC236}">
+                <a16:creationId xmlns:a16="http://schemas.microsoft.com/office/drawing/2014/main" id="{AECE9A8A-C49C-99FF-FED9-AE764ECF99E7}"/>
+              </a:ext>
+            </a:extLst>
+          </p:cNvPr>
+          <p:cNvCxnSpPr>
+            <a:cxnSpLocks/>
+            <a:stCxn id="93" idx="2"/>
+            <a:endCxn id="94" idx="0"/>
+          </p:cNvCxnSpPr>
+          <p:nvPr/>
+        </p:nvCxnSpPr>
+        <p:spPr>
+          <a:xfrm>
+            <a:off x="6089028" y="2635647"/>
+            <a:ext cx="1416186" cy="676747"/>
+          </a:xfrm>
+          <a:prstGeom prst="line">
+            <a:avLst/>
+          </a:prstGeom>
+          <a:ln w="12700">
+            <a:solidFill>
+              <a:schemeClr val="bg2">
+                <a:lumMod val="75000"/>
+              </a:schemeClr>
+            </a:solidFill>
+            <a:prstDash val="sysDash"/>
+          </a:ln>
+        </p:spPr>
+        <p:style>
+          <a:lnRef idx="1">
+            <a:schemeClr val="accent1"/>
+          </a:lnRef>
+          <a:fillRef idx="0">
+            <a:schemeClr val="accent1"/>
+          </a:fillRef>
+          <a:effectRef idx="0">
+            <a:schemeClr val="accent1"/>
+          </a:effectRef>
+          <a:fontRef idx="minor">
+            <a:schemeClr val="tx1"/>
+          </a:fontRef>
+        </p:style>
+      </p:cxnSp>
+    </p:spTree>
+    <p:extLst>
+      <p:ext uri="{BB962C8B-B14F-4D97-AF65-F5344CB8AC3E}">
+        <p14:creationId xmlns:p14="http://schemas.microsoft.com/office/powerpoint/2010/main" val="1274218188"/>
+      </p:ext>
+    </p:extLst>
+  </p:cSld>
+  <p:clrMapOvr>
+    <a:masterClrMapping/>
+  </p:clrMapOvr>
+</p:sld>
+</file>
+
 <file path=ppt/theme/theme1.xml><?xml version="1.0" encoding="utf-8"?>
 <a:theme xmlns:a="http://schemas.openxmlformats.org/drawingml/2006/main" name="Office Theme">
   <a:themeElements>

</xml_diff>